<commit_message>
This commit fixes many things.
- Cube rotations are frame rate independent.
- The Cube manipulation has changed.
- Exiting bugs are fixed.
- Some Text has borders around it.
</commit_message>
<xml_diff>
--- a/documentation/RCPres.pptx
+++ b/documentation/RCPres.pptx
@@ -5,7 +5,7 @@
     <p:sldMasterId id="2147483720" r:id="rId1"/>
   </p:sldMasterIdLst>
   <p:notesMasterIdLst>
-    <p:notesMasterId r:id="rId65"/>
+    <p:notesMasterId r:id="rId69"/>
   </p:notesMasterIdLst>
   <p:sldIdLst>
     <p:sldId id="256" r:id="rId2"/>
@@ -57,20 +57,24 @@
     <p:sldId id="332" r:id="rId48"/>
     <p:sldId id="333" r:id="rId49"/>
     <p:sldId id="310" r:id="rId50"/>
-    <p:sldId id="321" r:id="rId51"/>
-    <p:sldId id="337" r:id="rId52"/>
-    <p:sldId id="322" r:id="rId53"/>
-    <p:sldId id="334" r:id="rId54"/>
-    <p:sldId id="335" r:id="rId55"/>
-    <p:sldId id="336" r:id="rId56"/>
-    <p:sldId id="323" r:id="rId57"/>
-    <p:sldId id="324" r:id="rId58"/>
-    <p:sldId id="325" r:id="rId59"/>
-    <p:sldId id="326" r:id="rId60"/>
-    <p:sldId id="329" r:id="rId61"/>
-    <p:sldId id="327" r:id="rId62"/>
-    <p:sldId id="328" r:id="rId63"/>
-    <p:sldId id="330" r:id="rId64"/>
+    <p:sldId id="338" r:id="rId51"/>
+    <p:sldId id="339" r:id="rId52"/>
+    <p:sldId id="340" r:id="rId53"/>
+    <p:sldId id="321" r:id="rId54"/>
+    <p:sldId id="337" r:id="rId55"/>
+    <p:sldId id="322" r:id="rId56"/>
+    <p:sldId id="334" r:id="rId57"/>
+    <p:sldId id="335" r:id="rId58"/>
+    <p:sldId id="336" r:id="rId59"/>
+    <p:sldId id="323" r:id="rId60"/>
+    <p:sldId id="324" r:id="rId61"/>
+    <p:sldId id="325" r:id="rId62"/>
+    <p:sldId id="326" r:id="rId63"/>
+    <p:sldId id="329" r:id="rId64"/>
+    <p:sldId id="341" r:id="rId65"/>
+    <p:sldId id="327" r:id="rId66"/>
+    <p:sldId id="328" r:id="rId67"/>
+    <p:sldId id="330" r:id="rId68"/>
   </p:sldIdLst>
   <p:sldSz cx="9144000" cy="6858000" type="screen4x3"/>
   <p:notesSz cx="6858000" cy="9144000"/>
@@ -526,22 +530,22 @@
           </c:yVal>
           <c:smooth val="1"/>
         </c:ser>
-        <c:axId val="20480768"/>
-        <c:axId val="20482304"/>
+        <c:axId val="33365376"/>
+        <c:axId val="33436800"/>
       </c:scatterChart>
       <c:valAx>
-        <c:axId val="20480768"/>
+        <c:axId val="33365376"/>
         <c:scaling>
           <c:orientation val="minMax"/>
         </c:scaling>
         <c:axPos val="b"/>
         <c:tickLblPos val="nextTo"/>
-        <c:crossAx val="20482304"/>
+        <c:crossAx val="33436800"/>
         <c:crosses val="autoZero"/>
         <c:crossBetween val="midCat"/>
       </c:valAx>
       <c:valAx>
-        <c:axId val="20482304"/>
+        <c:axId val="33436800"/>
         <c:scaling>
           <c:orientation val="minMax"/>
         </c:scaling>
@@ -549,7 +553,7 @@
         <c:majorGridlines/>
         <c:numFmt formatCode="General" sourceLinked="1"/>
         <c:tickLblPos val="nextTo"/>
-        <c:crossAx val="20480768"/>
+        <c:crossAx val="33365376"/>
         <c:crosses val="autoZero"/>
         <c:crossBetween val="midCat"/>
       </c:valAx>
@@ -825,22 +829,22 @@
           </c:yVal>
           <c:smooth val="1"/>
         </c:ser>
-        <c:axId val="30560256"/>
-        <c:axId val="30561792"/>
+        <c:axId val="33467008"/>
+        <c:axId val="33468800"/>
       </c:scatterChart>
       <c:valAx>
-        <c:axId val="30560256"/>
+        <c:axId val="33467008"/>
         <c:scaling>
           <c:orientation val="minMax"/>
         </c:scaling>
         <c:axPos val="b"/>
         <c:tickLblPos val="nextTo"/>
-        <c:crossAx val="30561792"/>
+        <c:crossAx val="33468800"/>
         <c:crosses val="autoZero"/>
         <c:crossBetween val="midCat"/>
       </c:valAx>
       <c:valAx>
-        <c:axId val="30561792"/>
+        <c:axId val="33468800"/>
         <c:scaling>
           <c:orientation val="minMax"/>
         </c:scaling>
@@ -848,7 +852,7 @@
         <c:majorGridlines/>
         <c:numFmt formatCode="General" sourceLinked="1"/>
         <c:tickLblPos val="nextTo"/>
-        <c:crossAx val="30560256"/>
+        <c:crossAx val="33467008"/>
         <c:crosses val="autoZero"/>
         <c:crossBetween val="midCat"/>
       </c:valAx>
@@ -1124,7 +1128,7 @@
           <c:xMode val="edge"/>
           <c:yMode val="edge"/>
           <c:x val="0.41412520064205482"/>
-          <c:y val="2.9850777346641547E-2"/>
+          <c:y val="2.9850777346641551E-2"/>
         </c:manualLayout>
       </c:layout>
       <c:spPr>
@@ -1143,7 +1147,7 @@
           <c:x val="0.1187800963081862"/>
           <c:y val="0.15778268026081951"/>
           <c:w val="0.61476725521669362"/>
-          <c:h val="0.63539511780708446"/>
+          <c:h val="0.6353951178070848"/>
         </c:manualLayout>
       </c:layout>
       <c:scatterChart>
@@ -1366,11 +1370,11 @@
           </c:yVal>
           <c:smooth val="1"/>
         </c:ser>
-        <c:axId val="30807168"/>
-        <c:axId val="30809472"/>
+        <c:axId val="33764864"/>
+        <c:axId val="33804288"/>
       </c:scatterChart>
       <c:valAx>
-        <c:axId val="30807168"/>
+        <c:axId val="33764864"/>
         <c:scaling>
           <c:orientation val="minMax"/>
         </c:scaling>
@@ -1412,8 +1416,8 @@
             <c:manualLayout>
               <c:xMode val="edge"/>
               <c:yMode val="edge"/>
-              <c:x val="0.39646869983948718"/>
-              <c:y val="0.9083165106906631"/>
+              <c:x val="0.39646869983948752"/>
+              <c:y val="0.90831651069066288"/>
             </c:manualLayout>
           </c:layout>
           <c:spPr>
@@ -1450,12 +1454,12 @@
             <a:endParaRPr lang="en-US"/>
           </a:p>
         </c:txPr>
-        <c:crossAx val="30809472"/>
+        <c:crossAx val="33804288"/>
         <c:crosses val="autoZero"/>
         <c:crossBetween val="midCat"/>
       </c:valAx>
       <c:valAx>
-        <c:axId val="30809472"/>
+        <c:axId val="33804288"/>
         <c:scaling>
           <c:orientation val="minMax"/>
         </c:scaling>
@@ -1497,7 +1501,7 @@
             <c:manualLayout>
               <c:xMode val="edge"/>
               <c:yMode val="edge"/>
-              <c:x val="2.568218298555381E-2"/>
+              <c:x val="2.568218298555382E-2"/>
               <c:y val="0.41364648608917542"/>
             </c:manualLayout>
           </c:layout>
@@ -1535,7 +1539,7 @@
             <a:endParaRPr lang="en-US"/>
           </a:p>
         </c:txPr>
-        <c:crossAx val="30807168"/>
+        <c:crossAx val="33764864"/>
         <c:crosses val="autoZero"/>
         <c:crossBetween val="midCat"/>
       </c:valAx>
@@ -1559,8 +1563,8 @@
           <c:yMode val="edge"/>
           <c:x val="0.79133226324237549"/>
           <c:y val="0.42643967638059332"/>
-          <c:w val="0.19582664526484733"/>
-          <c:h val="0.10021332394943953"/>
+          <c:w val="0.19582664526484728"/>
+          <c:h val="0.10021332394943958"/>
         </c:manualLayout>
       </c:layout>
       <c:spPr>
@@ -1659,7 +1663,7 @@
         <c:manualLayout>
           <c:xMode val="edge"/>
           <c:yMode val="edge"/>
-          <c:x val="0.43269298485856283"/>
+          <c:x val="0.43269298485856295"/>
           <c:y val="2.9787234042553196E-2"/>
         </c:manualLayout>
       </c:layout>
@@ -1677,9 +1681,9 @@
           <c:xMode val="edge"/>
           <c:yMode val="edge"/>
           <c:x val="0.11858992918345788"/>
-          <c:y val="0.15744680851063853"/>
+          <c:y val="0.15744680851063864"/>
           <c:w val="0.81891153801009464"/>
-          <c:h val="0.67659574468085182"/>
+          <c:h val="0.67659574468085204"/>
         </c:manualLayout>
       </c:layout>
       <c:scatterChart>
@@ -1775,11 +1779,11 @@
           </c:yVal>
           <c:smooth val="1"/>
         </c:ser>
-        <c:axId val="30874624"/>
-        <c:axId val="30934528"/>
+        <c:axId val="33828224"/>
+        <c:axId val="33847168"/>
       </c:scatterChart>
       <c:valAx>
-        <c:axId val="30874624"/>
+        <c:axId val="33828224"/>
         <c:scaling>
           <c:orientation val="minMax"/>
         </c:scaling>
@@ -1821,7 +1825,7 @@
             <c:manualLayout>
               <c:xMode val="edge"/>
               <c:yMode val="edge"/>
-              <c:x val="0.49839821589264133"/>
+              <c:x val="0.49839821589264166"/>
               <c:y val="0.9085106382978726"/>
             </c:manualLayout>
           </c:layout>
@@ -1859,12 +1863,12 @@
             <a:endParaRPr lang="en-US"/>
           </a:p>
         </c:txPr>
-        <c:crossAx val="30934528"/>
+        <c:crossAx val="33847168"/>
         <c:crosses val="autoZero"/>
         <c:crossBetween val="midCat"/>
       </c:valAx>
       <c:valAx>
-        <c:axId val="30934528"/>
+        <c:axId val="33847168"/>
         <c:scaling>
           <c:orientation val="minMax"/>
         </c:scaling>
@@ -1906,7 +1910,7 @@
             <c:manualLayout>
               <c:xMode val="edge"/>
               <c:yMode val="edge"/>
-              <c:x val="2.5641065769396336E-2"/>
+              <c:x val="2.5641065769396353E-2"/>
               <c:y val="0.43404255319148938"/>
             </c:manualLayout>
           </c:layout>
@@ -1944,7 +1948,7 @@
             <a:endParaRPr lang="en-US"/>
           </a:p>
         </c:txPr>
-        <c:crossAx val="30874624"/>
+        <c:crossAx val="33828224"/>
         <c:crosses val="autoZero"/>
         <c:crossBetween val="midCat"/>
       </c:valAx>
@@ -2088,7 +2092,7 @@
               <a:spcAft>
                 <a:spcPts val="0"/>
               </a:spcAft>
-              <a:defRPr sz="1200" smtClean="0">
+              <a:defRPr sz="1200">
                 <a:latin typeface="+mn-lt"/>
               </a:defRPr>
             </a:lvl1pPr>
@@ -2097,12 +2101,12 @@
             <a:pPr>
               <a:defRPr/>
             </a:pPr>
-            <a:fld id="{C6E0BF30-ACA6-4EE4-BED2-E7DB68336A43}" type="datetimeFigureOut">
+            <a:fld id="{5E2D0703-711D-48E6-8CD9-AC39B1B37205}" type="datetimeFigureOut">
               <a:rPr lang="en-US"/>
               <a:pPr>
                 <a:defRPr/>
               </a:pPr>
-              <a:t>12/6/2007</a:t>
+              <a:t>12/7/2007</a:t>
             </a:fld>
             <a:endParaRPr lang="en-US"/>
           </a:p>
@@ -2275,7 +2279,7 @@
               <a:spcAft>
                 <a:spcPts val="0"/>
               </a:spcAft>
-              <a:defRPr sz="1200" smtClean="0">
+              <a:defRPr sz="1200">
                 <a:latin typeface="+mn-lt"/>
               </a:defRPr>
             </a:lvl1pPr>
@@ -2284,7 +2288,7 @@
             <a:pPr>
               <a:defRPr/>
             </a:pPr>
-            <a:fld id="{0253785A-FDE9-4291-B396-30529D8169D6}" type="slidenum">
+            <a:fld id="{DD72FF4D-93C1-48F0-B9B2-B67A8B3084A0}" type="slidenum">
               <a:rPr lang="en-US"/>
               <a:pPr>
                 <a:defRPr/>
@@ -2299,7 +2303,7 @@
   </p:cSld>
   <p:clrMap bg1="lt1" tx1="dk1" bg2="lt2" tx2="dk2" accent1="accent1" accent2="accent2" accent3="accent3" accent4="accent4" accent5="accent5" accent6="accent6" hlink="hlink" folHlink="folHlink"/>
   <p:notesStyle>
-    <a:lvl1pPr algn="l" rtl="0" fontAlgn="base">
+    <a:lvl1pPr algn="l" rtl="0" eaLnBrk="0" fontAlgn="base" hangingPunct="0">
       <a:spcBef>
         <a:spcPct val="30000"/>
       </a:spcBef>
@@ -2315,7 +2319,7 @@
         <a:cs typeface="+mn-cs"/>
       </a:defRPr>
     </a:lvl1pPr>
-    <a:lvl2pPr marL="457200" algn="l" rtl="0" fontAlgn="base">
+    <a:lvl2pPr marL="457200" algn="l" rtl="0" eaLnBrk="0" fontAlgn="base" hangingPunct="0">
       <a:spcBef>
         <a:spcPct val="30000"/>
       </a:spcBef>
@@ -2331,7 +2335,7 @@
         <a:cs typeface="+mn-cs"/>
       </a:defRPr>
     </a:lvl2pPr>
-    <a:lvl3pPr marL="914400" algn="l" rtl="0" fontAlgn="base">
+    <a:lvl3pPr marL="914400" algn="l" rtl="0" eaLnBrk="0" fontAlgn="base" hangingPunct="0">
       <a:spcBef>
         <a:spcPct val="30000"/>
       </a:spcBef>
@@ -2347,7 +2351,7 @@
         <a:cs typeface="+mn-cs"/>
       </a:defRPr>
     </a:lvl3pPr>
-    <a:lvl4pPr marL="1371600" algn="l" rtl="0" fontAlgn="base">
+    <a:lvl4pPr marL="1371600" algn="l" rtl="0" eaLnBrk="0" fontAlgn="base" hangingPunct="0">
       <a:spcBef>
         <a:spcPct val="30000"/>
       </a:spcBef>
@@ -2363,7 +2367,7 @@
         <a:cs typeface="+mn-cs"/>
       </a:defRPr>
     </a:lvl4pPr>
-    <a:lvl5pPr marL="1828800" algn="l" rtl="0" fontAlgn="base">
+    <a:lvl5pPr marL="1828800" algn="l" rtl="0" eaLnBrk="0" fontAlgn="base" hangingPunct="0">
       <a:spcBef>
         <a:spcPct val="30000"/>
       </a:spcBef>
@@ -2483,7 +2487,7 @@
           </a:bodyPr>
           <a:lstStyle/>
           <a:p>
-            <a:pPr>
+            <a:pPr eaLnBrk="1" hangingPunct="1">
               <a:spcBef>
                 <a:spcPct val="0"/>
               </a:spcBef>
@@ -2503,7 +2507,6 @@
           </p:nvPr>
         </p:nvSpPr>
         <p:spPr bwMode="auto">
-          <a:noFill/>
           <a:ln>
             <a:miter lim="800000"/>
             <a:headEnd/>
@@ -2525,8 +2528,9 @@
               <a:spcAft>
                 <a:spcPct val="0"/>
               </a:spcAft>
+              <a:defRPr/>
             </a:pPr>
-            <a:fld id="{F71081BF-73A4-4CFC-AFA6-8ECFD1B480C5}" type="slidenum">
+            <a:fld id="{4DAD1C6B-7105-434D-9B7E-E0E56256D1E3}" type="slidenum">
               <a:rPr lang="en-US"/>
               <a:pPr fontAlgn="base">
                 <a:spcBef>
@@ -2535,6 +2539,7 @@
                 <a:spcAft>
                   <a:spcPct val="0"/>
                 </a:spcAft>
+                <a:defRPr/>
               </a:pPr>
               <a:t>18</a:t>
             </a:fld>
@@ -2610,7 +2615,7 @@
           </a:bodyPr>
           <a:lstStyle/>
           <a:p>
-            <a:pPr>
+            <a:pPr eaLnBrk="1" hangingPunct="1">
               <a:spcBef>
                 <a:spcPct val="0"/>
               </a:spcBef>
@@ -2630,7 +2635,6 @@
           </p:nvPr>
         </p:nvSpPr>
         <p:spPr bwMode="auto">
-          <a:noFill/>
           <a:ln>
             <a:miter lim="800000"/>
             <a:headEnd/>
@@ -2652,8 +2656,9 @@
               <a:spcAft>
                 <a:spcPct val="0"/>
               </a:spcAft>
+              <a:defRPr/>
             </a:pPr>
-            <a:fld id="{82FF5368-B7B3-4069-840F-2F26C07BBE3D}" type="slidenum">
+            <a:fld id="{94FB5D0F-0213-4FC8-936F-428E7CB03CD1}" type="slidenum">
               <a:rPr lang="en-US"/>
               <a:pPr fontAlgn="base">
                 <a:spcBef>
@@ -2662,6 +2667,7 @@
                 <a:spcAft>
                   <a:spcPct val="0"/>
                 </a:spcAft>
+                <a:defRPr/>
               </a:pPr>
               <a:t>48</a:t>
             </a:fld>
@@ -2863,12 +2869,12 @@
             <a:pPr>
               <a:defRPr/>
             </a:pPr>
-            <a:fld id="{4C7A76E2-5D65-4DAA-8367-C37668AA6D92}" type="datetimeFigureOut">
+            <a:fld id="{1A4E9C10-9819-418B-BFBB-A3DD938851FE}" type="datetimeFigureOut">
               <a:rPr lang="en-US"/>
               <a:pPr>
                 <a:defRPr/>
               </a:pPr>
-              <a:t>12/6/2007</a:t>
+              <a:t>12/7/2007</a:t>
             </a:fld>
             <a:endParaRPr lang="en-US"/>
           </a:p>
@@ -2922,7 +2928,7 @@
             <a:pPr>
               <a:defRPr/>
             </a:pPr>
-            <a:fld id="{0167226C-FBFB-4512-827F-1867EAD23B1E}" type="slidenum">
+            <a:fld id="{05A6A4AA-FE9E-4879-9817-9ACA33839C3C}" type="slidenum">
               <a:rPr lang="en-US"/>
               <a:pPr>
                 <a:defRPr/>
@@ -3055,12 +3061,12 @@
             <a:pPr>
               <a:defRPr/>
             </a:pPr>
-            <a:fld id="{394E5DB8-A689-4E1A-AD87-AB51317790E4}" type="datetimeFigureOut">
+            <a:fld id="{1690027F-9016-4406-96FC-D5DCC1792FF2}" type="datetimeFigureOut">
               <a:rPr lang="en-US"/>
               <a:pPr>
                 <a:defRPr/>
               </a:pPr>
-              <a:t>12/6/2007</a:t>
+              <a:t>12/7/2007</a:t>
             </a:fld>
             <a:endParaRPr lang="en-US"/>
           </a:p>
@@ -3114,7 +3120,7 @@
             <a:pPr>
               <a:defRPr/>
             </a:pPr>
-            <a:fld id="{F3E7E9F1-82CE-425C-B015-FF538EB9705A}" type="slidenum">
+            <a:fld id="{F21A6FEB-4EF2-4B22-8A37-740ED0298205}" type="slidenum">
               <a:rPr lang="en-US"/>
               <a:pPr>
                 <a:defRPr/>
@@ -3257,12 +3263,12 @@
             <a:pPr>
               <a:defRPr/>
             </a:pPr>
-            <a:fld id="{986A92D1-5016-4A3D-AEBE-726245B37C52}" type="datetimeFigureOut">
+            <a:fld id="{1878EAFB-C5C7-4851-81DA-B91154FD344C}" type="datetimeFigureOut">
               <a:rPr lang="en-US"/>
               <a:pPr>
                 <a:defRPr/>
               </a:pPr>
-              <a:t>12/6/2007</a:t>
+              <a:t>12/7/2007</a:t>
             </a:fld>
             <a:endParaRPr lang="en-US"/>
           </a:p>
@@ -3316,7 +3322,7 @@
             <a:pPr>
               <a:defRPr/>
             </a:pPr>
-            <a:fld id="{94BD570A-7E55-4D3C-93AD-E254E54ECCEC}" type="slidenum">
+            <a:fld id="{9609F566-818B-442B-9486-CB73F5125B0C}" type="slidenum">
               <a:rPr lang="en-US"/>
               <a:pPr>
                 <a:defRPr/>
@@ -3449,12 +3455,12 @@
             <a:pPr>
               <a:defRPr/>
             </a:pPr>
-            <a:fld id="{0CF546E8-414C-4AE9-8AB1-257D543E5C1F}" type="datetimeFigureOut">
+            <a:fld id="{396F8012-AC3E-464C-8E65-7FB506553A50}" type="datetimeFigureOut">
               <a:rPr lang="en-US"/>
               <a:pPr>
                 <a:defRPr/>
               </a:pPr>
-              <a:t>12/6/2007</a:t>
+              <a:t>12/7/2007</a:t>
             </a:fld>
             <a:endParaRPr lang="en-US"/>
           </a:p>
@@ -3508,7 +3514,7 @@
             <a:pPr>
               <a:defRPr/>
             </a:pPr>
-            <a:fld id="{85930143-C029-4DAB-9A0C-9B3D768CE948}" type="slidenum">
+            <a:fld id="{660AA2E4-7DAE-453E-905F-C8EDC47E3DBA}" type="slidenum">
               <a:rPr lang="en-US"/>
               <a:pPr>
                 <a:defRPr/>
@@ -3717,12 +3723,12 @@
             <a:pPr>
               <a:defRPr/>
             </a:pPr>
-            <a:fld id="{1AF57B0A-312E-4418-B764-2989A496BEF3}" type="datetimeFigureOut">
+            <a:fld id="{0A13742A-1BA5-4005-9FCC-E6805E2AD4B0}" type="datetimeFigureOut">
               <a:rPr lang="en-US"/>
               <a:pPr>
                 <a:defRPr/>
               </a:pPr>
-              <a:t>12/6/2007</a:t>
+              <a:t>12/7/2007</a:t>
             </a:fld>
             <a:endParaRPr lang="en-US"/>
           </a:p>
@@ -3776,7 +3782,7 @@
             <a:pPr>
               <a:defRPr/>
             </a:pPr>
-            <a:fld id="{9E8A7E39-7A84-4A10-A350-F80863142808}" type="slidenum">
+            <a:fld id="{DA6B7283-21A2-42B1-9C7E-09B22896A44F}" type="slidenum">
               <a:rPr lang="en-US"/>
               <a:pPr>
                 <a:defRPr/>
@@ -4027,12 +4033,12 @@
             <a:pPr>
               <a:defRPr/>
             </a:pPr>
-            <a:fld id="{B2B6A5AB-78D5-4431-8F15-DDF3C11D8451}" type="datetimeFigureOut">
+            <a:fld id="{2E264167-15C5-439D-8023-BEAE334F948E}" type="datetimeFigureOut">
               <a:rPr lang="en-US"/>
               <a:pPr>
                 <a:defRPr/>
               </a:pPr>
-              <a:t>12/6/2007</a:t>
+              <a:t>12/7/2007</a:t>
             </a:fld>
             <a:endParaRPr lang="en-US"/>
           </a:p>
@@ -4086,7 +4092,7 @@
             <a:pPr>
               <a:defRPr/>
             </a:pPr>
-            <a:fld id="{698AE74C-92C2-4C6F-9B6A-A11A019AEAA7}" type="slidenum">
+            <a:fld id="{BD03C61E-0477-4BE2-B40A-102266B36AC2}" type="slidenum">
               <a:rPr lang="en-US"/>
               <a:pPr>
                 <a:defRPr/>
@@ -4471,12 +4477,12 @@
             <a:pPr>
               <a:defRPr/>
             </a:pPr>
-            <a:fld id="{02417BD0-E93A-4EBC-987B-0A222F05ECE5}" type="datetimeFigureOut">
+            <a:fld id="{9C029301-C4BE-41B5-A831-70EC6EA3A080}" type="datetimeFigureOut">
               <a:rPr lang="en-US"/>
               <a:pPr>
                 <a:defRPr/>
               </a:pPr>
-              <a:t>12/6/2007</a:t>
+              <a:t>12/7/2007</a:t>
             </a:fld>
             <a:endParaRPr lang="en-US"/>
           </a:p>
@@ -4530,7 +4536,7 @@
             <a:pPr>
               <a:defRPr/>
             </a:pPr>
-            <a:fld id="{9C8AA0DC-57E9-491F-8DE7-FA32830A201D}" type="slidenum">
+            <a:fld id="{6E4EDB38-09AF-45FA-B0BB-9124ED1A89DF}" type="slidenum">
               <a:rPr lang="en-US"/>
               <a:pPr>
                 <a:defRPr/>
@@ -4611,12 +4617,12 @@
             <a:pPr>
               <a:defRPr/>
             </a:pPr>
-            <a:fld id="{D8BDBBFB-6EBE-4F0C-8254-D7200830342B}" type="datetimeFigureOut">
+            <a:fld id="{BEF2FCC2-5D1C-45CF-8802-59B138FA3C63}" type="datetimeFigureOut">
               <a:rPr lang="en-US"/>
               <a:pPr>
                 <a:defRPr/>
               </a:pPr>
-              <a:t>12/6/2007</a:t>
+              <a:t>12/7/2007</a:t>
             </a:fld>
             <a:endParaRPr lang="en-US"/>
           </a:p>
@@ -4670,7 +4676,7 @@
             <a:pPr>
               <a:defRPr/>
             </a:pPr>
-            <a:fld id="{F541986E-8864-42C3-9478-E8F70A438A44}" type="slidenum">
+            <a:fld id="{4341490E-8C12-4EF5-AF6D-1D940F8EC47C}" type="slidenum">
               <a:rPr lang="en-US"/>
               <a:pPr>
                 <a:defRPr/>
@@ -4728,12 +4734,12 @@
             <a:pPr>
               <a:defRPr/>
             </a:pPr>
-            <a:fld id="{35377DD4-0873-4621-B910-3F97A36ADB3F}" type="datetimeFigureOut">
+            <a:fld id="{937CBBEA-B44C-4387-905A-B7F12255ADF8}" type="datetimeFigureOut">
               <a:rPr lang="en-US"/>
               <a:pPr>
                 <a:defRPr/>
               </a:pPr>
-              <a:t>12/6/2007</a:t>
+              <a:t>12/7/2007</a:t>
             </a:fld>
             <a:endParaRPr lang="en-US"/>
           </a:p>
@@ -4787,7 +4793,7 @@
             <a:pPr>
               <a:defRPr/>
             </a:pPr>
-            <a:fld id="{AB3DBFC5-6C4C-472A-BCE7-36AB1D831EB7}" type="slidenum">
+            <a:fld id="{69A2FC43-6FD6-4FC6-BD9E-36E353B601DC}" type="slidenum">
               <a:rPr lang="en-US"/>
               <a:pPr>
                 <a:defRPr/>
@@ -5027,12 +5033,12 @@
             <a:pPr>
               <a:defRPr/>
             </a:pPr>
-            <a:fld id="{7ACDD3F0-22C2-47AF-B7C4-8014429F1DA1}" type="datetimeFigureOut">
+            <a:fld id="{0F3F7FCF-54E3-4FD8-B577-B8C4720B30A3}" type="datetimeFigureOut">
               <a:rPr lang="en-US"/>
               <a:pPr>
                 <a:defRPr/>
               </a:pPr>
-              <a:t>12/6/2007</a:t>
+              <a:t>12/7/2007</a:t>
             </a:fld>
             <a:endParaRPr lang="en-US"/>
           </a:p>
@@ -5086,7 +5092,7 @@
             <a:pPr>
               <a:defRPr/>
             </a:pPr>
-            <a:fld id="{D6F6E111-9321-4E6C-8907-98962C69FC41}" type="slidenum">
+            <a:fld id="{EEB1A1CE-6A53-4FE1-87C7-4DECA0E5373A}" type="slidenum">
               <a:rPr lang="en-US"/>
               <a:pPr>
                 <a:defRPr/>
@@ -5305,12 +5311,12 @@
             <a:pPr>
               <a:defRPr/>
             </a:pPr>
-            <a:fld id="{8EF25B57-7A05-441E-9070-1570A5E6E7A8}" type="datetimeFigureOut">
+            <a:fld id="{730E7611-247C-44FB-8637-479B170A9316}" type="datetimeFigureOut">
               <a:rPr lang="en-US"/>
               <a:pPr>
                 <a:defRPr/>
               </a:pPr>
-              <a:t>12/6/2007</a:t>
+              <a:t>12/7/2007</a:t>
             </a:fld>
             <a:endParaRPr lang="en-US"/>
           </a:p>
@@ -5364,7 +5370,7 @@
             <a:pPr>
               <a:defRPr/>
             </a:pPr>
-            <a:fld id="{1432AA08-D1C9-4216-8156-9851B9136060}" type="slidenum">
+            <a:fld id="{8C23F985-F648-46C3-955B-C94A200FC133}" type="slidenum">
               <a:rPr lang="en-US"/>
               <a:pPr>
                 <a:defRPr/>
@@ -5561,7 +5567,7 @@
               <a:spcAft>
                 <a:spcPts val="0"/>
               </a:spcAft>
-              <a:defRPr sz="1200" smtClean="0">
+              <a:defRPr sz="1200">
                 <a:solidFill>
                   <a:schemeClr val="tx1">
                     <a:tint val="75000"/>
@@ -5575,12 +5581,12 @@
             <a:pPr>
               <a:defRPr/>
             </a:pPr>
-            <a:fld id="{48DA1869-1A9F-40F4-BC11-8B92C8CE2D6C}" type="datetimeFigureOut">
+            <a:fld id="{3586B506-1BB4-44A0-8139-F45216B2C4A0}" type="datetimeFigureOut">
               <a:rPr lang="en-US"/>
               <a:pPr>
                 <a:defRPr/>
               </a:pPr>
-              <a:t>12/6/2007</a:t>
+              <a:t>12/7/2007</a:t>
             </a:fld>
             <a:endParaRPr lang="en-US"/>
           </a:p>
@@ -5662,7 +5668,7 @@
               <a:spcAft>
                 <a:spcPts val="0"/>
               </a:spcAft>
-              <a:defRPr sz="1200" smtClean="0">
+              <a:defRPr sz="1200">
                 <a:solidFill>
                   <a:schemeClr val="tx1">
                     <a:tint val="75000"/>
@@ -5676,7 +5682,7 @@
             <a:pPr>
               <a:defRPr/>
             </a:pPr>
-            <a:fld id="{53687C25-AAFE-4B5A-B51F-8DB0DC39B1E8}" type="slidenum">
+            <a:fld id="{8739D424-85A6-4847-95F7-4A33BC8B1DBC}" type="slidenum">
               <a:rPr lang="en-US"/>
               <a:pPr>
                 <a:defRPr/>
@@ -5711,27 +5717,33 @@
             <a:avLst/>
           </a:prstGeom>
           <a:noFill/>
+          <a:ln w="9525">
+            <a:noFill/>
+            <a:miter lim="800000"/>
+            <a:headEnd/>
+            <a:tailEnd/>
+          </a:ln>
         </p:spPr>
       </p:pic>
     </p:spTree>
   </p:cSld>
   <p:clrMap bg1="lt1" tx1="dk1" bg2="lt2" tx2="dk2" accent1="accent1" accent2="accent2" accent3="accent3" accent4="accent4" accent5="accent5" accent6="accent6" hlink="hlink" folHlink="folHlink"/>
   <p:sldLayoutIdLst>
-    <p:sldLayoutId id="2147483731" r:id="rId1"/>
-    <p:sldLayoutId id="2147483730" r:id="rId2"/>
-    <p:sldLayoutId id="2147483729" r:id="rId3"/>
-    <p:sldLayoutId id="2147483728" r:id="rId4"/>
-    <p:sldLayoutId id="2147483727" r:id="rId5"/>
+    <p:sldLayoutId id="2147483721" r:id="rId1"/>
+    <p:sldLayoutId id="2147483722" r:id="rId2"/>
+    <p:sldLayoutId id="2147483723" r:id="rId3"/>
+    <p:sldLayoutId id="2147483724" r:id="rId4"/>
+    <p:sldLayoutId id="2147483725" r:id="rId5"/>
     <p:sldLayoutId id="2147483726" r:id="rId6"/>
-    <p:sldLayoutId id="2147483725" r:id="rId7"/>
-    <p:sldLayoutId id="2147483724" r:id="rId8"/>
-    <p:sldLayoutId id="2147483723" r:id="rId9"/>
-    <p:sldLayoutId id="2147483722" r:id="rId10"/>
-    <p:sldLayoutId id="2147483721" r:id="rId11"/>
+    <p:sldLayoutId id="2147483727" r:id="rId7"/>
+    <p:sldLayoutId id="2147483728" r:id="rId8"/>
+    <p:sldLayoutId id="2147483729" r:id="rId9"/>
+    <p:sldLayoutId id="2147483730" r:id="rId10"/>
+    <p:sldLayoutId id="2147483731" r:id="rId11"/>
   </p:sldLayoutIdLst>
   <p:txStyles>
     <p:titleStyle>
-      <a:lvl1pPr algn="r" rtl="0" fontAlgn="base">
+      <a:lvl1pPr algn="r" rtl="0" eaLnBrk="0" fontAlgn="base" hangingPunct="0">
         <a:spcBef>
           <a:spcPct val="0"/>
         </a:spcBef>
@@ -5747,7 +5759,7 @@
           <a:cs typeface="+mj-cs"/>
         </a:defRPr>
       </a:lvl1pPr>
-      <a:lvl2pPr algn="r" rtl="0" fontAlgn="base">
+      <a:lvl2pPr algn="r" rtl="0" eaLnBrk="0" fontAlgn="base" hangingPunct="0">
         <a:spcBef>
           <a:spcPct val="0"/>
         </a:spcBef>
@@ -5761,7 +5773,7 @@
           <a:latin typeface="Calibri" pitchFamily="34" charset="0"/>
         </a:defRPr>
       </a:lvl2pPr>
-      <a:lvl3pPr algn="r" rtl="0" fontAlgn="base">
+      <a:lvl3pPr algn="r" rtl="0" eaLnBrk="0" fontAlgn="base" hangingPunct="0">
         <a:spcBef>
           <a:spcPct val="0"/>
         </a:spcBef>
@@ -5775,7 +5787,7 @@
           <a:latin typeface="Calibri" pitchFamily="34" charset="0"/>
         </a:defRPr>
       </a:lvl3pPr>
-      <a:lvl4pPr algn="r" rtl="0" fontAlgn="base">
+      <a:lvl4pPr algn="r" rtl="0" eaLnBrk="0" fontAlgn="base" hangingPunct="0">
         <a:spcBef>
           <a:spcPct val="0"/>
         </a:spcBef>
@@ -5789,7 +5801,7 @@
           <a:latin typeface="Calibri" pitchFamily="34" charset="0"/>
         </a:defRPr>
       </a:lvl4pPr>
-      <a:lvl5pPr algn="r" rtl="0" fontAlgn="base">
+      <a:lvl5pPr algn="r" rtl="0" eaLnBrk="0" fontAlgn="base" hangingPunct="0">
         <a:spcBef>
           <a:spcPct val="0"/>
         </a:spcBef>
@@ -5861,7 +5873,7 @@
       </a:lvl9pPr>
     </p:titleStyle>
     <p:bodyStyle>
-      <a:lvl1pPr marL="342900" indent="-342900" algn="l" rtl="0" fontAlgn="base">
+      <a:lvl1pPr marL="342900" indent="-342900" algn="l" rtl="0" eaLnBrk="0" fontAlgn="base" hangingPunct="0">
         <a:spcBef>
           <a:spcPct val="20000"/>
         </a:spcBef>
@@ -5879,7 +5891,7 @@
           <a:cs typeface="+mn-cs"/>
         </a:defRPr>
       </a:lvl1pPr>
-      <a:lvl2pPr marL="742950" indent="-285750" algn="l" rtl="0" fontAlgn="base">
+      <a:lvl2pPr marL="742950" indent="-285750" algn="l" rtl="0" eaLnBrk="0" fontAlgn="base" hangingPunct="0">
         <a:spcBef>
           <a:spcPct val="20000"/>
         </a:spcBef>
@@ -5897,7 +5909,7 @@
           <a:cs typeface="+mn-cs"/>
         </a:defRPr>
       </a:lvl2pPr>
-      <a:lvl3pPr marL="1143000" indent="-228600" algn="l" rtl="0" fontAlgn="base">
+      <a:lvl3pPr marL="1143000" indent="-228600" algn="l" rtl="0" eaLnBrk="0" fontAlgn="base" hangingPunct="0">
         <a:spcBef>
           <a:spcPct val="20000"/>
         </a:spcBef>
@@ -5915,7 +5927,7 @@
           <a:cs typeface="+mn-cs"/>
         </a:defRPr>
       </a:lvl3pPr>
-      <a:lvl4pPr marL="1600200" indent="-228600" algn="l" rtl="0" fontAlgn="base">
+      <a:lvl4pPr marL="1600200" indent="-228600" algn="l" rtl="0" eaLnBrk="0" fontAlgn="base" hangingPunct="0">
         <a:spcBef>
           <a:spcPct val="20000"/>
         </a:spcBef>
@@ -5933,7 +5945,7 @@
           <a:cs typeface="+mn-cs"/>
         </a:defRPr>
       </a:lvl4pPr>
-      <a:lvl5pPr marL="2057400" indent="-228600" algn="l" rtl="0" fontAlgn="base">
+      <a:lvl5pPr marL="2057400" indent="-228600" algn="l" rtl="0" eaLnBrk="0" fontAlgn="base" hangingPunct="0">
         <a:spcBef>
           <a:spcPct val="20000"/>
         </a:spcBef>
@@ -6148,6 +6160,7 @@
           <a:bodyPr/>
           <a:lstStyle/>
           <a:p>
+            <a:pPr eaLnBrk="1" hangingPunct="1"/>
             <a:r>
               <a:rPr lang="en-US" smtClean="0"/>
               <a:t>Ragade’s Cube</a:t>
@@ -6172,7 +6185,7 @@
           </a:bodyPr>
           <a:lstStyle/>
           <a:p>
-            <a:pPr lvl="1" fontAlgn="auto">
+            <a:pPr lvl="1" eaLnBrk="1" fontAlgn="auto" hangingPunct="1">
               <a:spcAft>
                 <a:spcPts val="0"/>
               </a:spcAft>
@@ -6231,6 +6244,7 @@
           <a:bodyPr/>
           <a:lstStyle/>
           <a:p>
+            <a:pPr eaLnBrk="1" hangingPunct="1"/>
             <a:r>
               <a:rPr lang="en-US" smtClean="0"/>
               <a:t>GUI Requirements</a:t>
@@ -6253,30 +6267,35 @@
           <a:bodyPr/>
           <a:lstStyle/>
           <a:p>
+            <a:pPr eaLnBrk="1" hangingPunct="1"/>
             <a:r>
               <a:rPr lang="en-US" smtClean="0"/>
               <a:t>Shall provide game menus that allows the user to begin game play and select options</a:t>
             </a:r>
           </a:p>
           <a:p>
+            <a:pPr eaLnBrk="1" hangingPunct="1"/>
             <a:r>
               <a:rPr lang="en-US" smtClean="0"/>
               <a:t>GUI provides the cursor to select controls</a:t>
             </a:r>
           </a:p>
           <a:p>
+            <a:pPr eaLnBrk="1" hangingPunct="1"/>
             <a:r>
               <a:rPr lang="en-US" smtClean="0"/>
               <a:t>Highlight selected row or column of cube on display</a:t>
             </a:r>
           </a:p>
           <a:p>
+            <a:pPr eaLnBrk="1" hangingPunct="1"/>
             <a:r>
               <a:rPr lang="en-US" smtClean="0"/>
               <a:t>Will be able to display up to 4 cubes in split screen</a:t>
             </a:r>
           </a:p>
           <a:p>
+            <a:pPr eaLnBrk="1" hangingPunct="1"/>
             <a:r>
               <a:rPr lang="en-US" smtClean="0"/>
               <a:t>Display statistics for each person on screen</a:t>
@@ -6331,6 +6350,7 @@
           <a:bodyPr/>
           <a:lstStyle/>
           <a:p>
+            <a:pPr eaLnBrk="1" hangingPunct="1"/>
             <a:r>
               <a:rPr lang="en-US" smtClean="0"/>
               <a:t>Game Logic Requirements</a:t>
@@ -6358,12 +6378,14 @@
           <a:bodyPr/>
           <a:lstStyle/>
           <a:p>
+            <a:pPr eaLnBrk="1" hangingPunct="1"/>
             <a:r>
               <a:rPr lang="en-US" smtClean="0"/>
               <a:t>Should interpret input events and carry out actions accordingly </a:t>
             </a:r>
           </a:p>
           <a:p>
+            <a:pPr eaLnBrk="1" hangingPunct="1"/>
             <a:r>
               <a:rPr lang="en-US" smtClean="0"/>
               <a:t>Control flow of the game is done by managing states</a:t>
@@ -6474,6 +6496,7 @@
           <a:bodyPr/>
           <a:lstStyle/>
           <a:p>
+            <a:pPr eaLnBrk="1" hangingPunct="1"/>
             <a:r>
               <a:rPr lang="en-US" smtClean="0"/>
               <a:t>Game Play Requirements</a:t>
@@ -6496,6 +6519,7 @@
           <a:bodyPr/>
           <a:lstStyle/>
           <a:p>
+            <a:pPr eaLnBrk="1" hangingPunct="1"/>
             <a:r>
               <a:rPr lang="en-US" smtClean="0"/>
               <a:t>Multiple players are allowed to compete one  another</a:t>
@@ -6550,6 +6574,7 @@
           <a:bodyPr/>
           <a:lstStyle/>
           <a:p>
+            <a:pPr eaLnBrk="1" hangingPunct="1"/>
             <a:r>
               <a:rPr lang="en-US" smtClean="0"/>
               <a:t>A.I. Requirements</a:t>
@@ -6572,12 +6597,14 @@
           <a:bodyPr/>
           <a:lstStyle/>
           <a:p>
+            <a:pPr eaLnBrk="1" hangingPunct="1"/>
             <a:r>
               <a:rPr lang="en-US" smtClean="0"/>
               <a:t>AI shall have a common interface that will allow it to communicate to the client and server</a:t>
             </a:r>
           </a:p>
           <a:p>
+            <a:pPr eaLnBrk="1" hangingPunct="1"/>
             <a:r>
               <a:rPr lang="en-US" smtClean="0"/>
               <a:t>Shall be able to solve the cube with varying levels of expertise</a:t>
@@ -6632,6 +6659,7 @@
           <a:bodyPr/>
           <a:lstStyle/>
           <a:p>
+            <a:pPr eaLnBrk="1" hangingPunct="1"/>
             <a:r>
               <a:rPr lang="en-US" smtClean="0"/>
               <a:t>Network Requirements</a:t>
@@ -6654,6 +6682,7 @@
           <a:bodyPr/>
           <a:lstStyle/>
           <a:p>
+            <a:pPr eaLnBrk="1" hangingPunct="1"/>
             <a:r>
               <a:rPr lang="en-US" smtClean="0"/>
               <a:t>Allow communication to server over TCP/IP to start or join a game session</a:t>
@@ -6708,6 +6737,7 @@
           <a:bodyPr/>
           <a:lstStyle/>
           <a:p>
+            <a:pPr eaLnBrk="1" hangingPunct="1"/>
             <a:r>
               <a:rPr lang="en-US" smtClean="0"/>
               <a:t>Server Requirements</a:t>
@@ -6730,30 +6760,35 @@
           <a:bodyPr/>
           <a:lstStyle/>
           <a:p>
+            <a:pPr eaLnBrk="1" hangingPunct="1"/>
             <a:r>
               <a:rPr lang="en-US" smtClean="0"/>
               <a:t>Will mediate game sessions</a:t>
             </a:r>
           </a:p>
           <a:p>
+            <a:pPr eaLnBrk="1" hangingPunct="1"/>
             <a:r>
               <a:rPr lang="en-US" smtClean="0"/>
               <a:t>Will close a game session when no clients are present</a:t>
             </a:r>
           </a:p>
           <a:p>
+            <a:pPr eaLnBrk="1" hangingPunct="1"/>
             <a:r>
               <a:rPr lang="en-US" smtClean="0"/>
               <a:t>Will allow restart of a game session after a completion of a game match</a:t>
             </a:r>
           </a:p>
           <a:p>
+            <a:pPr eaLnBrk="1" hangingPunct="1"/>
             <a:r>
               <a:rPr lang="en-US" smtClean="0"/>
               <a:t>Keep an accurate log of activities</a:t>
             </a:r>
           </a:p>
           <a:p>
+            <a:pPr eaLnBrk="1" hangingPunct="1"/>
             <a:r>
               <a:rPr lang="en-US" smtClean="0"/>
               <a:t>Will block IP addresses that attempt to cause harm</a:t>
@@ -6808,6 +6843,7 @@
           <a:bodyPr/>
           <a:lstStyle/>
           <a:p>
+            <a:pPr eaLnBrk="1" hangingPunct="1"/>
             <a:r>
               <a:rPr lang="en-US" smtClean="0"/>
               <a:t>Anticipated Architecture</a:t>
@@ -6830,7 +6866,7 @@
           <a:bodyPr/>
           <a:lstStyle/>
           <a:p>
-            <a:pPr>
+            <a:pPr eaLnBrk="1" hangingPunct="1">
               <a:buFont typeface="Arial" charset="0"/>
               <a:buNone/>
             </a:pPr>
@@ -6941,6 +6977,7 @@
           <a:bodyPr/>
           <a:lstStyle/>
           <a:p>
+            <a:pPr eaLnBrk="1" hangingPunct="1"/>
             <a:r>
               <a:rPr lang="en-US" smtClean="0"/>
               <a:t>Configurations</a:t>
@@ -6963,47 +7000,49 @@
           <a:bodyPr/>
           <a:lstStyle/>
           <a:p>
+            <a:pPr eaLnBrk="1" hangingPunct="1"/>
             <a:r>
               <a:rPr lang="en-US" smtClean="0"/>
               <a:t>Windows XP or higher</a:t>
             </a:r>
           </a:p>
           <a:p>
-            <a:pPr lvl="1"/>
+            <a:pPr lvl="1" eaLnBrk="1" hangingPunct="1"/>
             <a:r>
               <a:rPr lang="en-US" smtClean="0"/>
               <a:t>Keyboard and Mouse</a:t>
             </a:r>
           </a:p>
           <a:p>
-            <a:pPr lvl="1"/>
+            <a:pPr lvl="1" eaLnBrk="1" hangingPunct="1"/>
             <a:r>
               <a:rPr lang="en-US" smtClean="0"/>
               <a:t>360 Gamepad Controller for Windows</a:t>
             </a:r>
           </a:p>
           <a:p>
-            <a:pPr lvl="1"/>
+            <a:pPr lvl="1" eaLnBrk="1" hangingPunct="1"/>
             <a:r>
               <a:rPr lang="en-US" smtClean="0"/>
               <a:t>Must include Video card that supports</a:t>
             </a:r>
           </a:p>
           <a:p>
-            <a:pPr lvl="2"/>
+            <a:pPr lvl="2" eaLnBrk="1" hangingPunct="1"/>
             <a:r>
               <a:rPr lang="en-US" smtClean="0"/>
               <a:t>Shader Model 1.1</a:t>
             </a:r>
           </a:p>
           <a:p>
+            <a:pPr eaLnBrk="1" hangingPunct="1"/>
             <a:r>
               <a:rPr lang="en-US" smtClean="0"/>
               <a:t>XBox 360</a:t>
             </a:r>
           </a:p>
           <a:p>
-            <a:pPr lvl="1"/>
+            <a:pPr lvl="1" eaLnBrk="1" hangingPunct="1"/>
             <a:r>
               <a:rPr lang="en-US" smtClean="0"/>
               <a:t>360 Gamepad Controller</a:t>
@@ -7058,6 +7097,7 @@
           <a:bodyPr/>
           <a:lstStyle/>
           <a:p>
+            <a:pPr eaLnBrk="1" hangingPunct="1"/>
             <a:r>
               <a:rPr lang="en-US" smtClean="0"/>
               <a:t>Development Environment</a:t>
@@ -7080,36 +7120,42 @@
           <a:bodyPr/>
           <a:lstStyle/>
           <a:p>
+            <a:pPr eaLnBrk="1" hangingPunct="1"/>
             <a:r>
               <a:rPr lang="en-US" smtClean="0"/>
               <a:t>C# Express 2005</a:t>
             </a:r>
           </a:p>
           <a:p>
+            <a:pPr eaLnBrk="1" hangingPunct="1"/>
             <a:r>
               <a:rPr lang="en-US" smtClean="0"/>
               <a:t>XNA Game Studio Express Ver. 1.0</a:t>
             </a:r>
           </a:p>
           <a:p>
+            <a:pPr eaLnBrk="1" hangingPunct="1"/>
             <a:r>
               <a:rPr lang="en-US" smtClean="0"/>
               <a:t>.Net Framework 2.0</a:t>
             </a:r>
           </a:p>
           <a:p>
+            <a:pPr eaLnBrk="1" hangingPunct="1"/>
             <a:r>
               <a:rPr lang="en-US" smtClean="0"/>
               <a:t>DirectX 9.0</a:t>
             </a:r>
           </a:p>
           <a:p>
+            <a:pPr eaLnBrk="1" hangingPunct="1"/>
             <a:r>
               <a:rPr lang="en-US" smtClean="0"/>
               <a:t>Anim8or</a:t>
             </a:r>
           </a:p>
           <a:p>
+            <a:pPr eaLnBrk="1" hangingPunct="1"/>
             <a:r>
               <a:rPr lang="en-US" smtClean="0"/>
               <a:t>XAct </a:t>
@@ -7164,6 +7210,7 @@
           <a:bodyPr/>
           <a:lstStyle/>
           <a:p>
+            <a:pPr eaLnBrk="1" hangingPunct="1"/>
             <a:r>
               <a:rPr lang="en-US" smtClean="0"/>
               <a:t>Elaboration</a:t>
@@ -7186,6 +7233,7 @@
           <a:bodyPr/>
           <a:lstStyle/>
           <a:p>
+            <a:pPr eaLnBrk="1" hangingPunct="1"/>
             <a:r>
               <a:rPr lang="en-US" smtClean="0">
                 <a:solidFill>
@@ -7249,6 +7297,7 @@
           <a:bodyPr/>
           <a:lstStyle/>
           <a:p>
+            <a:pPr eaLnBrk="1" hangingPunct="1"/>
             <a:r>
               <a:rPr lang="en-US" smtClean="0"/>
               <a:t>Inception</a:t>
@@ -7276,7 +7325,7 @@
           <a:bodyPr/>
           <a:lstStyle/>
           <a:p>
-            <a:pPr marL="0" indent="0" algn="ctr">
+            <a:pPr marL="0" indent="0" algn="ctr" eaLnBrk="1" hangingPunct="1">
               <a:buFont typeface="Arial" charset="0"/>
               <a:buNone/>
             </a:pPr>
@@ -7370,6 +7419,7 @@
           <a:bodyPr/>
           <a:lstStyle/>
           <a:p>
+            <a:pPr eaLnBrk="1" hangingPunct="1"/>
             <a:r>
               <a:rPr lang="en-US" smtClean="0"/>
               <a:t>Starting Design</a:t>
@@ -7392,12 +7442,14 @@
           <a:bodyPr/>
           <a:lstStyle/>
           <a:p>
+            <a:pPr eaLnBrk="1" hangingPunct="1"/>
             <a:r>
               <a:rPr lang="en-US" smtClean="0"/>
               <a:t>From the software requirements we can formulate a high level architecture for a basis for further design</a:t>
             </a:r>
           </a:p>
           <a:p>
+            <a:pPr eaLnBrk="1" hangingPunct="1"/>
             <a:r>
               <a:rPr lang="en-US" smtClean="0"/>
               <a:t>The high level design will be shown and each component examined</a:t>
@@ -7452,6 +7504,7 @@
           <a:bodyPr/>
           <a:lstStyle/>
           <a:p>
+            <a:pPr eaLnBrk="1" hangingPunct="1"/>
             <a:r>
               <a:rPr lang="en-US" smtClean="0"/>
               <a:t>High Level Architecture</a:t>
@@ -7474,6 +7527,7 @@
           <a:bodyPr/>
           <a:lstStyle/>
           <a:p>
+            <a:pPr eaLnBrk="1" hangingPunct="1"/>
             <a:endParaRPr lang="en-US" smtClean="0"/>
           </a:p>
         </p:txBody>
@@ -7545,6 +7599,7 @@
           <a:bodyPr/>
           <a:lstStyle/>
           <a:p>
+            <a:pPr eaLnBrk="1" hangingPunct="1"/>
             <a:r>
               <a:rPr lang="en-US" smtClean="0"/>
               <a:t>Engine</a:t>
@@ -7567,6 +7622,7 @@
           <a:bodyPr/>
           <a:lstStyle/>
           <a:p>
+            <a:pPr eaLnBrk="1" hangingPunct="1"/>
             <a:endParaRPr lang="en-US" smtClean="0"/>
           </a:p>
         </p:txBody>
@@ -7674,6 +7730,7 @@
           <a:bodyPr/>
           <a:lstStyle/>
           <a:p>
+            <a:pPr eaLnBrk="1" hangingPunct="1"/>
             <a:r>
               <a:rPr lang="en-US" smtClean="0"/>
               <a:t>Input</a:t>
@@ -7696,6 +7753,7 @@
           <a:bodyPr/>
           <a:lstStyle/>
           <a:p>
+            <a:pPr eaLnBrk="1" hangingPunct="1"/>
             <a:endParaRPr lang="en-US" smtClean="0"/>
           </a:p>
         </p:txBody>
@@ -7859,6 +7917,7 @@
           <a:bodyPr/>
           <a:lstStyle/>
           <a:p>
+            <a:pPr eaLnBrk="1" hangingPunct="1"/>
             <a:r>
               <a:rPr lang="en-US" smtClean="0"/>
               <a:t>Input (cont)</a:t>
@@ -7881,6 +7940,7 @@
           <a:bodyPr/>
           <a:lstStyle/>
           <a:p>
+            <a:pPr eaLnBrk="1" hangingPunct="1"/>
             <a:endParaRPr lang="en-US" smtClean="0"/>
           </a:p>
         </p:txBody>
@@ -7988,6 +8048,7 @@
           <a:bodyPr/>
           <a:lstStyle/>
           <a:p>
+            <a:pPr eaLnBrk="1" hangingPunct="1"/>
             <a:r>
               <a:rPr lang="en-US" smtClean="0"/>
               <a:t>State Management</a:t>
@@ -8010,6 +8071,7 @@
           <a:bodyPr/>
           <a:lstStyle/>
           <a:p>
+            <a:pPr eaLnBrk="1" hangingPunct="1"/>
             <a:endParaRPr lang="en-US" smtClean="0"/>
           </a:p>
         </p:txBody>
@@ -8125,6 +8187,7 @@
           <a:bodyPr/>
           <a:lstStyle/>
           <a:p>
+            <a:pPr eaLnBrk="1" hangingPunct="1"/>
             <a:r>
               <a:rPr lang="en-US" smtClean="0"/>
               <a:t>Picking</a:t>
@@ -8152,6 +8215,7 @@
           <a:bodyPr/>
           <a:lstStyle/>
           <a:p>
+            <a:pPr eaLnBrk="1" hangingPunct="1"/>
             <a:endParaRPr lang="en-US" smtClean="0"/>
           </a:p>
         </p:txBody>
@@ -8235,6 +8299,7 @@
           <a:bodyPr/>
           <a:lstStyle/>
           <a:p>
+            <a:pPr eaLnBrk="1" hangingPunct="1"/>
             <a:r>
               <a:rPr lang="en-US" smtClean="0"/>
               <a:t>Scene Graph</a:t>
@@ -8257,6 +8322,7 @@
           <a:bodyPr/>
           <a:lstStyle/>
           <a:p>
+            <a:pPr eaLnBrk="1" hangingPunct="1"/>
             <a:endParaRPr lang="en-US" smtClean="0"/>
           </a:p>
         </p:txBody>
@@ -8340,6 +8406,7 @@
           <a:bodyPr/>
           <a:lstStyle/>
           <a:p>
+            <a:pPr eaLnBrk="1" hangingPunct="1"/>
             <a:r>
               <a:rPr lang="en-US" smtClean="0"/>
               <a:t>Rendering</a:t>
@@ -8362,6 +8429,7 @@
           <a:bodyPr/>
           <a:lstStyle/>
           <a:p>
+            <a:pPr eaLnBrk="1" hangingPunct="1"/>
             <a:endParaRPr lang="en-US" smtClean="0"/>
           </a:p>
         </p:txBody>
@@ -8445,6 +8513,7 @@
           <a:bodyPr/>
           <a:lstStyle/>
           <a:p>
+            <a:pPr eaLnBrk="1" hangingPunct="1"/>
             <a:r>
               <a:rPr lang="en-US" smtClean="0"/>
               <a:t>GUI</a:t>
@@ -8467,6 +8536,7 @@
           <a:bodyPr/>
           <a:lstStyle/>
           <a:p>
+            <a:pPr eaLnBrk="1" hangingPunct="1"/>
             <a:endParaRPr lang="en-US" smtClean="0"/>
           </a:p>
         </p:txBody>
@@ -8550,6 +8620,7 @@
           <a:bodyPr/>
           <a:lstStyle/>
           <a:p>
+            <a:pPr eaLnBrk="1" hangingPunct="1"/>
             <a:r>
               <a:rPr lang="en-US" smtClean="0"/>
               <a:t>Team Organization</a:t>
@@ -8624,15 +8695,15 @@
               <a:avLst/>
               <a:gdLst>
                 <a:gd name="T0" fmla="*/ 0 w 9"/>
-                <a:gd name="T1" fmla="*/ 16 h 17"/>
-                <a:gd name="T2" fmla="*/ 4 w 9"/>
-                <a:gd name="T3" fmla="*/ 16 h 17"/>
-                <a:gd name="T4" fmla="*/ 8 w 9"/>
-                <a:gd name="T5" fmla="*/ 5 h 17"/>
-                <a:gd name="T6" fmla="*/ 4 w 9"/>
+                <a:gd name="T1" fmla="*/ 35 h 17"/>
+                <a:gd name="T2" fmla="*/ 8 w 9"/>
+                <a:gd name="T3" fmla="*/ 35 h 17"/>
+                <a:gd name="T4" fmla="*/ 16 w 9"/>
+                <a:gd name="T5" fmla="*/ 11 h 17"/>
+                <a:gd name="T6" fmla="*/ 8 w 9"/>
                 <a:gd name="T7" fmla="*/ 0 h 17"/>
                 <a:gd name="T8" fmla="*/ 0 w 9"/>
-                <a:gd name="T9" fmla="*/ 16 h 17"/>
+                <a:gd name="T9" fmla="*/ 35 h 17"/>
                 <a:gd name="T10" fmla="*/ 0 60000 65536"/>
                 <a:gd name="T11" fmla="*/ 0 60000 65536"/>
                 <a:gd name="T12" fmla="*/ 0 60000 65536"/>
@@ -8718,16 +8789,16 @@
             <a:custGeom>
               <a:avLst/>
               <a:gdLst>
-                <a:gd name="T0" fmla="*/ 11 w 17"/>
-                <a:gd name="T1" fmla="*/ 24 h 25"/>
+                <a:gd name="T0" fmla="*/ 23 w 17"/>
+                <a:gd name="T1" fmla="*/ 52 h 25"/>
                 <a:gd name="T2" fmla="*/ 0 w 17"/>
-                <a:gd name="T3" fmla="*/ 18 h 25"/>
-                <a:gd name="T4" fmla="*/ 11 w 17"/>
+                <a:gd name="T3" fmla="*/ 39 h 25"/>
+                <a:gd name="T4" fmla="*/ 23 w 17"/>
                 <a:gd name="T5" fmla="*/ 0 h 25"/>
-                <a:gd name="T6" fmla="*/ 16 w 17"/>
-                <a:gd name="T7" fmla="*/ 6 h 25"/>
-                <a:gd name="T8" fmla="*/ 11 w 17"/>
-                <a:gd name="T9" fmla="*/ 24 h 25"/>
+                <a:gd name="T6" fmla="*/ 33 w 17"/>
+                <a:gd name="T7" fmla="*/ 13 h 25"/>
+                <a:gd name="T8" fmla="*/ 23 w 17"/>
+                <a:gd name="T9" fmla="*/ 52 h 25"/>
                 <a:gd name="T10" fmla="*/ 0 60000 65536"/>
                 <a:gd name="T11" fmla="*/ 0 60000 65536"/>
                 <a:gd name="T12" fmla="*/ 0 60000 65536"/>
@@ -8813,16 +8884,16 @@
             <a:custGeom>
               <a:avLst/>
               <a:gdLst>
-                <a:gd name="T0" fmla="*/ 1280 w 1289"/>
-                <a:gd name="T1" fmla="*/ 648 h 649"/>
-                <a:gd name="T2" fmla="*/ 1288 w 1289"/>
-                <a:gd name="T3" fmla="*/ 624 h 649"/>
-                <a:gd name="T4" fmla="*/ 8 w 1289"/>
+                <a:gd name="T0" fmla="*/ 2666 w 1289"/>
+                <a:gd name="T1" fmla="*/ 1389 h 649"/>
+                <a:gd name="T2" fmla="*/ 2683 w 1289"/>
+                <a:gd name="T3" fmla="*/ 1337 h 649"/>
+                <a:gd name="T4" fmla="*/ 17 w 1289"/>
                 <a:gd name="T5" fmla="*/ 0 h 649"/>
                 <a:gd name="T6" fmla="*/ 0 w 1289"/>
-                <a:gd name="T7" fmla="*/ 24 h 649"/>
-                <a:gd name="T8" fmla="*/ 1280 w 1289"/>
-                <a:gd name="T9" fmla="*/ 648 h 649"/>
+                <a:gd name="T7" fmla="*/ 51 h 649"/>
+                <a:gd name="T8" fmla="*/ 2666 w 1289"/>
+                <a:gd name="T9" fmla="*/ 1389 h 649"/>
                 <a:gd name="T10" fmla="*/ 0 60000 65536"/>
                 <a:gd name="T11" fmla="*/ 0 60000 65536"/>
                 <a:gd name="T12" fmla="*/ 0 60000 65536"/>
@@ -8908,16 +8979,16 @@
             <a:custGeom>
               <a:avLst/>
               <a:gdLst>
-                <a:gd name="T0" fmla="*/ 11 w 17"/>
-                <a:gd name="T1" fmla="*/ 16 h 17"/>
-                <a:gd name="T2" fmla="*/ 16 w 17"/>
-                <a:gd name="T3" fmla="*/ 16 h 17"/>
-                <a:gd name="T4" fmla="*/ 5 w 17"/>
+                <a:gd name="T0" fmla="*/ 23 w 17"/>
+                <a:gd name="T1" fmla="*/ 35 h 17"/>
+                <a:gd name="T2" fmla="*/ 34 w 17"/>
+                <a:gd name="T3" fmla="*/ 35 h 17"/>
+                <a:gd name="T4" fmla="*/ 11 w 17"/>
                 <a:gd name="T5" fmla="*/ 0 h 17"/>
                 <a:gd name="T6" fmla="*/ 0 w 17"/>
-                <a:gd name="T7" fmla="*/ 5 h 17"/>
-                <a:gd name="T8" fmla="*/ 11 w 17"/>
-                <a:gd name="T9" fmla="*/ 16 h 17"/>
+                <a:gd name="T7" fmla="*/ 11 h 17"/>
+                <a:gd name="T8" fmla="*/ 23 w 17"/>
+                <a:gd name="T9" fmla="*/ 35 h 17"/>
                 <a:gd name="T10" fmla="*/ 0 60000 65536"/>
                 <a:gd name="T11" fmla="*/ 0 60000 65536"/>
                 <a:gd name="T12" fmla="*/ 0 60000 65536"/>
@@ -9003,16 +9074,16 @@
             <a:custGeom>
               <a:avLst/>
               <a:gdLst>
-                <a:gd name="T0" fmla="*/ 16 w 17"/>
-                <a:gd name="T1" fmla="*/ 11 h 17"/>
-                <a:gd name="T2" fmla="*/ 11 w 17"/>
-                <a:gd name="T3" fmla="*/ 16 h 17"/>
+                <a:gd name="T0" fmla="*/ 33 w 17"/>
+                <a:gd name="T1" fmla="*/ 23 h 17"/>
+                <a:gd name="T2" fmla="*/ 23 w 17"/>
+                <a:gd name="T3" fmla="*/ 34 h 17"/>
                 <a:gd name="T4" fmla="*/ 0 w 17"/>
-                <a:gd name="T5" fmla="*/ 5 h 17"/>
-                <a:gd name="T6" fmla="*/ 5 w 17"/>
+                <a:gd name="T5" fmla="*/ 11 h 17"/>
+                <a:gd name="T6" fmla="*/ 10 w 17"/>
                 <a:gd name="T7" fmla="*/ 0 h 17"/>
-                <a:gd name="T8" fmla="*/ 16 w 17"/>
-                <a:gd name="T9" fmla="*/ 11 h 17"/>
+                <a:gd name="T8" fmla="*/ 33 w 17"/>
+                <a:gd name="T9" fmla="*/ 23 h 17"/>
                 <a:gd name="T10" fmla="*/ 0 60000 65536"/>
                 <a:gd name="T11" fmla="*/ 0 60000 65536"/>
                 <a:gd name="T12" fmla="*/ 0 60000 65536"/>
@@ -9098,16 +9169,16 @@
             <a:custGeom>
               <a:avLst/>
               <a:gdLst>
-                <a:gd name="T0" fmla="*/ 1200 w 1201"/>
-                <a:gd name="T1" fmla="*/ 16 h 849"/>
-                <a:gd name="T2" fmla="*/ 1184 w 1201"/>
+                <a:gd name="T0" fmla="*/ 2501 w 1201"/>
+                <a:gd name="T1" fmla="*/ 34 h 849"/>
+                <a:gd name="T2" fmla="*/ 2468 w 1201"/>
                 <a:gd name="T3" fmla="*/ 0 h 849"/>
                 <a:gd name="T4" fmla="*/ 0 w 1201"/>
-                <a:gd name="T5" fmla="*/ 832 h 849"/>
-                <a:gd name="T6" fmla="*/ 16 w 1201"/>
-                <a:gd name="T7" fmla="*/ 848 h 849"/>
-                <a:gd name="T8" fmla="*/ 1200 w 1201"/>
-                <a:gd name="T9" fmla="*/ 16 h 849"/>
+                <a:gd name="T5" fmla="*/ 1783 h 849"/>
+                <a:gd name="T6" fmla="*/ 33 w 1201"/>
+                <a:gd name="T7" fmla="*/ 1817 h 849"/>
+                <a:gd name="T8" fmla="*/ 2501 w 1201"/>
+                <a:gd name="T9" fmla="*/ 34 h 849"/>
                 <a:gd name="T10" fmla="*/ 0 60000 65536"/>
                 <a:gd name="T11" fmla="*/ 0 60000 65536"/>
                 <a:gd name="T12" fmla="*/ 0 60000 65536"/>
@@ -9193,16 +9264,16 @@
             <a:custGeom>
               <a:avLst/>
               <a:gdLst>
-                <a:gd name="T0" fmla="*/ 16 w 17"/>
-                <a:gd name="T1" fmla="*/ 16 h 17"/>
-                <a:gd name="T2" fmla="*/ 16 w 17"/>
-                <a:gd name="T3" fmla="*/ 5 h 17"/>
-                <a:gd name="T4" fmla="*/ 5 w 17"/>
+                <a:gd name="T0" fmla="*/ 33 w 17"/>
+                <a:gd name="T1" fmla="*/ 35 h 17"/>
+                <a:gd name="T2" fmla="*/ 33 w 17"/>
+                <a:gd name="T3" fmla="*/ 11 h 17"/>
+                <a:gd name="T4" fmla="*/ 10 w 17"/>
                 <a:gd name="T5" fmla="*/ 0 h 17"/>
                 <a:gd name="T6" fmla="*/ 0 w 17"/>
-                <a:gd name="T7" fmla="*/ 5 h 17"/>
-                <a:gd name="T8" fmla="*/ 16 w 17"/>
-                <a:gd name="T9" fmla="*/ 16 h 17"/>
+                <a:gd name="T7" fmla="*/ 11 h 17"/>
+                <a:gd name="T8" fmla="*/ 33 w 17"/>
+                <a:gd name="T9" fmla="*/ 35 h 17"/>
                 <a:gd name="T10" fmla="*/ 0 60000 65536"/>
                 <a:gd name="T11" fmla="*/ 0 60000 65536"/>
                 <a:gd name="T12" fmla="*/ 0 60000 65536"/>
@@ -9288,16 +9359,16 @@
             <a:custGeom>
               <a:avLst/>
               <a:gdLst>
-                <a:gd name="T0" fmla="*/ 24 w 25"/>
-                <a:gd name="T1" fmla="*/ 11 h 17"/>
-                <a:gd name="T2" fmla="*/ 18 w 25"/>
-                <a:gd name="T3" fmla="*/ 16 h 17"/>
+                <a:gd name="T0" fmla="*/ 50 w 25"/>
+                <a:gd name="T1" fmla="*/ 23 h 17"/>
+                <a:gd name="T2" fmla="*/ 37 w 25"/>
+                <a:gd name="T3" fmla="*/ 34 h 17"/>
                 <a:gd name="T4" fmla="*/ 0 w 25"/>
-                <a:gd name="T5" fmla="*/ 5 h 17"/>
-                <a:gd name="T6" fmla="*/ 6 w 25"/>
+                <a:gd name="T5" fmla="*/ 11 h 17"/>
+                <a:gd name="T6" fmla="*/ 12 w 25"/>
                 <a:gd name="T7" fmla="*/ 0 h 17"/>
-                <a:gd name="T8" fmla="*/ 24 w 25"/>
-                <a:gd name="T9" fmla="*/ 11 h 17"/>
+                <a:gd name="T8" fmla="*/ 50 w 25"/>
+                <a:gd name="T9" fmla="*/ 23 h 17"/>
                 <a:gd name="T10" fmla="*/ 0 60000 65536"/>
                 <a:gd name="T11" fmla="*/ 0 60000 65536"/>
                 <a:gd name="T12" fmla="*/ 0 60000 65536"/>
@@ -9383,16 +9454,16 @@
             <a:custGeom>
               <a:avLst/>
               <a:gdLst>
-                <a:gd name="T0" fmla="*/ 1008 w 1009"/>
-                <a:gd name="T1" fmla="*/ 16 h 1705"/>
-                <a:gd name="T2" fmla="*/ 984 w 1009"/>
+                <a:gd name="T0" fmla="*/ 2100 w 1009"/>
+                <a:gd name="T1" fmla="*/ 34 h 1705"/>
+                <a:gd name="T2" fmla="*/ 2050 w 1009"/>
                 <a:gd name="T3" fmla="*/ 0 h 1705"/>
                 <a:gd name="T4" fmla="*/ 0 w 1009"/>
-                <a:gd name="T5" fmla="*/ 1688 h 1705"/>
-                <a:gd name="T6" fmla="*/ 24 w 1009"/>
-                <a:gd name="T7" fmla="*/ 1704 h 1705"/>
-                <a:gd name="T8" fmla="*/ 1008 w 1009"/>
-                <a:gd name="T9" fmla="*/ 16 h 1705"/>
+                <a:gd name="T5" fmla="*/ 3617 h 1705"/>
+                <a:gd name="T6" fmla="*/ 50 w 1009"/>
+                <a:gd name="T7" fmla="*/ 3651 h 1705"/>
+                <a:gd name="T8" fmla="*/ 2100 w 1009"/>
+                <a:gd name="T9" fmla="*/ 34 h 1705"/>
                 <a:gd name="T10" fmla="*/ 0 60000 65536"/>
                 <a:gd name="T11" fmla="*/ 0 60000 65536"/>
                 <a:gd name="T12" fmla="*/ 0 60000 65536"/>
@@ -9478,16 +9549,16 @@
             <a:custGeom>
               <a:avLst/>
               <a:gdLst>
-                <a:gd name="T0" fmla="*/ 24 w 25"/>
-                <a:gd name="T1" fmla="*/ 11 h 17"/>
-                <a:gd name="T2" fmla="*/ 18 w 25"/>
+                <a:gd name="T0" fmla="*/ 50 w 25"/>
+                <a:gd name="T1" fmla="*/ 24 h 17"/>
+                <a:gd name="T2" fmla="*/ 37 w 25"/>
                 <a:gd name="T3" fmla="*/ 0 h 17"/>
                 <a:gd name="T4" fmla="*/ 0 w 25"/>
-                <a:gd name="T5" fmla="*/ 11 h 17"/>
-                <a:gd name="T6" fmla="*/ 6 w 25"/>
-                <a:gd name="T7" fmla="*/ 16 h 17"/>
-                <a:gd name="T8" fmla="*/ 24 w 25"/>
-                <a:gd name="T9" fmla="*/ 11 h 17"/>
+                <a:gd name="T5" fmla="*/ 24 h 17"/>
+                <a:gd name="T6" fmla="*/ 12 w 25"/>
+                <a:gd name="T7" fmla="*/ 35 h 17"/>
+                <a:gd name="T8" fmla="*/ 50 w 25"/>
+                <a:gd name="T9" fmla="*/ 24 h 17"/>
                 <a:gd name="T10" fmla="*/ 0 60000 65536"/>
                 <a:gd name="T11" fmla="*/ 0 60000 65536"/>
                 <a:gd name="T12" fmla="*/ 0 60000 65536"/>
@@ -9573,15 +9644,15 @@
             <a:custGeom>
               <a:avLst/>
               <a:gdLst>
-                <a:gd name="T0" fmla="*/ 16 w 17"/>
+                <a:gd name="T0" fmla="*/ 33 w 17"/>
                 <a:gd name="T1" fmla="*/ 0 h 9"/>
-                <a:gd name="T2" fmla="*/ 16 w 17"/>
-                <a:gd name="T3" fmla="*/ 4 h 9"/>
-                <a:gd name="T4" fmla="*/ 5 w 17"/>
-                <a:gd name="T5" fmla="*/ 8 h 9"/>
+                <a:gd name="T2" fmla="*/ 33 w 17"/>
+                <a:gd name="T3" fmla="*/ 8 h 9"/>
+                <a:gd name="T4" fmla="*/ 10 w 17"/>
+                <a:gd name="T5" fmla="*/ 17 h 9"/>
                 <a:gd name="T6" fmla="*/ 0 w 17"/>
-                <a:gd name="T7" fmla="*/ 4 h 9"/>
-                <a:gd name="T8" fmla="*/ 16 w 17"/>
+                <a:gd name="T7" fmla="*/ 8 h 9"/>
+                <a:gd name="T8" fmla="*/ 33 w 17"/>
                 <a:gd name="T9" fmla="*/ 0 h 9"/>
                 <a:gd name="T10" fmla="*/ 0 60000 65536"/>
                 <a:gd name="T11" fmla="*/ 0 60000 65536"/>
@@ -9668,15 +9739,15 @@
             <a:custGeom>
               <a:avLst/>
               <a:gdLst>
-                <a:gd name="T0" fmla="*/ 24 w 705"/>
+                <a:gd name="T0" fmla="*/ 50 w 705"/>
                 <a:gd name="T1" fmla="*/ 0 h 1657"/>
                 <a:gd name="T2" fmla="*/ 0 w 705"/>
-                <a:gd name="T3" fmla="*/ 8 h 1657"/>
-                <a:gd name="T4" fmla="*/ 680 w 705"/>
-                <a:gd name="T5" fmla="*/ 1656 h 1657"/>
-                <a:gd name="T6" fmla="*/ 704 w 705"/>
-                <a:gd name="T7" fmla="*/ 1648 h 1657"/>
-                <a:gd name="T8" fmla="*/ 24 w 705"/>
+                <a:gd name="T3" fmla="*/ 17 h 1657"/>
+                <a:gd name="T4" fmla="*/ 1416 w 705"/>
+                <a:gd name="T5" fmla="*/ 3549 h 1657"/>
+                <a:gd name="T6" fmla="*/ 1466 w 705"/>
+                <a:gd name="T7" fmla="*/ 3532 h 1657"/>
+                <a:gd name="T8" fmla="*/ 50 w 705"/>
                 <a:gd name="T9" fmla="*/ 0 h 1657"/>
                 <a:gd name="T10" fmla="*/ 0 60000 65536"/>
                 <a:gd name="T11" fmla="*/ 0 60000 65536"/>
@@ -9763,15 +9834,15 @@
             <a:custGeom>
               <a:avLst/>
               <a:gdLst>
-                <a:gd name="T0" fmla="*/ 5 w 17"/>
+                <a:gd name="T0" fmla="*/ 10 w 17"/>
                 <a:gd name="T1" fmla="*/ 0 h 17"/>
                 <a:gd name="T2" fmla="*/ 0 w 17"/>
-                <a:gd name="T3" fmla="*/ 5 h 17"/>
-                <a:gd name="T4" fmla="*/ 11 w 17"/>
-                <a:gd name="T5" fmla="*/ 16 h 17"/>
-                <a:gd name="T6" fmla="*/ 16 w 17"/>
-                <a:gd name="T7" fmla="*/ 11 h 17"/>
-                <a:gd name="T8" fmla="*/ 5 w 17"/>
+                <a:gd name="T3" fmla="*/ 11 h 17"/>
+                <a:gd name="T4" fmla="*/ 23 w 17"/>
+                <a:gd name="T5" fmla="*/ 35 h 17"/>
+                <a:gd name="T6" fmla="*/ 33 w 17"/>
+                <a:gd name="T7" fmla="*/ 24 h 17"/>
+                <a:gd name="T8" fmla="*/ 10 w 17"/>
                 <a:gd name="T9" fmla="*/ 0 h 17"/>
                 <a:gd name="T10" fmla="*/ 0 60000 65536"/>
                 <a:gd name="T11" fmla="*/ 0 60000 65536"/>
@@ -9859,15 +9930,15 @@
               <a:avLst/>
               <a:gdLst>
                 <a:gd name="T0" fmla="*/ 0 w 17"/>
-                <a:gd name="T1" fmla="*/ 5 h 17"/>
-                <a:gd name="T2" fmla="*/ 5 w 17"/>
+                <a:gd name="T1" fmla="*/ 11 h 17"/>
+                <a:gd name="T2" fmla="*/ 11 w 17"/>
                 <a:gd name="T3" fmla="*/ 0 h 17"/>
-                <a:gd name="T4" fmla="*/ 16 w 17"/>
-                <a:gd name="T5" fmla="*/ 16 h 17"/>
-                <a:gd name="T6" fmla="*/ 11 w 17"/>
-                <a:gd name="T7" fmla="*/ 16 h 17"/>
+                <a:gd name="T4" fmla="*/ 34 w 17"/>
+                <a:gd name="T5" fmla="*/ 35 h 17"/>
+                <a:gd name="T6" fmla="*/ 23 w 17"/>
+                <a:gd name="T7" fmla="*/ 35 h 17"/>
                 <a:gd name="T8" fmla="*/ 0 w 17"/>
-                <a:gd name="T9" fmla="*/ 5 h 17"/>
+                <a:gd name="T9" fmla="*/ 11 h 17"/>
                 <a:gd name="T10" fmla="*/ 0 60000 65536"/>
                 <a:gd name="T11" fmla="*/ 0 60000 65536"/>
                 <a:gd name="T12" fmla="*/ 0 60000 65536"/>
@@ -9954,15 +10025,15 @@
               <a:avLst/>
               <a:gdLst>
                 <a:gd name="T0" fmla="*/ 0 w 921"/>
-                <a:gd name="T1" fmla="*/ 640 h 657"/>
-                <a:gd name="T2" fmla="*/ 16 w 921"/>
-                <a:gd name="T3" fmla="*/ 656 h 657"/>
-                <a:gd name="T4" fmla="*/ 920 w 921"/>
-                <a:gd name="T5" fmla="*/ 16 h 657"/>
-                <a:gd name="T6" fmla="*/ 904 w 921"/>
+                <a:gd name="T1" fmla="*/ 1373 h 657"/>
+                <a:gd name="T2" fmla="*/ 33 w 921"/>
+                <a:gd name="T3" fmla="*/ 1407 h 657"/>
+                <a:gd name="T4" fmla="*/ 1917 w 921"/>
+                <a:gd name="T5" fmla="*/ 34 h 657"/>
+                <a:gd name="T6" fmla="*/ 1884 w 921"/>
                 <a:gd name="T7" fmla="*/ 0 h 657"/>
                 <a:gd name="T8" fmla="*/ 0 w 921"/>
-                <a:gd name="T9" fmla="*/ 640 h 657"/>
+                <a:gd name="T9" fmla="*/ 1373 h 657"/>
                 <a:gd name="T10" fmla="*/ 0 60000 65536"/>
                 <a:gd name="T11" fmla="*/ 0 60000 65536"/>
                 <a:gd name="T12" fmla="*/ 0 60000 65536"/>
@@ -10049,15 +10120,15 @@
               <a:avLst/>
               <a:gdLst>
                 <a:gd name="T0" fmla="*/ 0 w 9"/>
-                <a:gd name="T1" fmla="*/ 16 h 17"/>
-                <a:gd name="T2" fmla="*/ 4 w 9"/>
-                <a:gd name="T3" fmla="*/ 16 h 17"/>
-                <a:gd name="T4" fmla="*/ 8 w 9"/>
-                <a:gd name="T5" fmla="*/ 5 h 17"/>
-                <a:gd name="T6" fmla="*/ 4 w 9"/>
+                <a:gd name="T1" fmla="*/ 34 h 17"/>
+                <a:gd name="T2" fmla="*/ 9 w 9"/>
+                <a:gd name="T3" fmla="*/ 34 h 17"/>
+                <a:gd name="T4" fmla="*/ 18 w 9"/>
+                <a:gd name="T5" fmla="*/ 11 h 17"/>
+                <a:gd name="T6" fmla="*/ 9 w 9"/>
                 <a:gd name="T7" fmla="*/ 0 h 17"/>
                 <a:gd name="T8" fmla="*/ 0 w 9"/>
-                <a:gd name="T9" fmla="*/ 16 h 17"/>
+                <a:gd name="T9" fmla="*/ 34 h 17"/>
                 <a:gd name="T10" fmla="*/ 0 60000 65536"/>
                 <a:gd name="T11" fmla="*/ 0 60000 65536"/>
                 <a:gd name="T12" fmla="*/ 0 60000 65536"/>
@@ -10143,16 +10214,16 @@
             <a:custGeom>
               <a:avLst/>
               <a:gdLst>
-                <a:gd name="T0" fmla="*/ 11 w 17"/>
-                <a:gd name="T1" fmla="*/ 24 h 25"/>
+                <a:gd name="T0" fmla="*/ 23 w 17"/>
+                <a:gd name="T1" fmla="*/ 52 h 25"/>
                 <a:gd name="T2" fmla="*/ 0 w 17"/>
-                <a:gd name="T3" fmla="*/ 18 h 25"/>
-                <a:gd name="T4" fmla="*/ 11 w 17"/>
+                <a:gd name="T3" fmla="*/ 39 h 25"/>
+                <a:gd name="T4" fmla="*/ 23 w 17"/>
                 <a:gd name="T5" fmla="*/ 0 h 25"/>
-                <a:gd name="T6" fmla="*/ 16 w 17"/>
-                <a:gd name="T7" fmla="*/ 6 h 25"/>
-                <a:gd name="T8" fmla="*/ 11 w 17"/>
-                <a:gd name="T9" fmla="*/ 24 h 25"/>
+                <a:gd name="T6" fmla="*/ 33 w 17"/>
+                <a:gd name="T7" fmla="*/ 13 h 25"/>
+                <a:gd name="T8" fmla="*/ 23 w 17"/>
+                <a:gd name="T9" fmla="*/ 52 h 25"/>
                 <a:gd name="T10" fmla="*/ 0 60000 65536"/>
                 <a:gd name="T11" fmla="*/ 0 60000 65536"/>
                 <a:gd name="T12" fmla="*/ 0 60000 65536"/>
@@ -10238,16 +10309,16 @@
             <a:custGeom>
               <a:avLst/>
               <a:gdLst>
-                <a:gd name="T0" fmla="*/ 2120 w 2129"/>
-                <a:gd name="T1" fmla="*/ 1008 h 1009"/>
-                <a:gd name="T2" fmla="*/ 2128 w 2129"/>
-                <a:gd name="T3" fmla="*/ 984 h 1009"/>
-                <a:gd name="T4" fmla="*/ 8 w 2129"/>
+                <a:gd name="T0" fmla="*/ 4417 w 2129"/>
+                <a:gd name="T1" fmla="*/ 2160 h 1009"/>
+                <a:gd name="T2" fmla="*/ 4434 w 2129"/>
+                <a:gd name="T3" fmla="*/ 2108 h 1009"/>
+                <a:gd name="T4" fmla="*/ 17 w 2129"/>
                 <a:gd name="T5" fmla="*/ 0 h 1009"/>
                 <a:gd name="T6" fmla="*/ 0 w 2129"/>
-                <a:gd name="T7" fmla="*/ 24 h 1009"/>
-                <a:gd name="T8" fmla="*/ 2120 w 2129"/>
-                <a:gd name="T9" fmla="*/ 1008 h 1009"/>
+                <a:gd name="T7" fmla="*/ 51 h 1009"/>
+                <a:gd name="T8" fmla="*/ 4417 w 2129"/>
+                <a:gd name="T9" fmla="*/ 2160 h 1009"/>
                 <a:gd name="T10" fmla="*/ 0 60000 65536"/>
                 <a:gd name="T11" fmla="*/ 0 60000 65536"/>
                 <a:gd name="T12" fmla="*/ 0 60000 65536"/>
@@ -10333,15 +10404,15 @@
             <a:custGeom>
               <a:avLst/>
               <a:gdLst>
-                <a:gd name="T0" fmla="*/ 4 w 9"/>
+                <a:gd name="T0" fmla="*/ 8 w 9"/>
                 <a:gd name="T1" fmla="*/ 0 h 17"/>
                 <a:gd name="T2" fmla="*/ 0 w 9"/>
-                <a:gd name="T3" fmla="*/ 5 h 17"/>
-                <a:gd name="T4" fmla="*/ 4 w 9"/>
-                <a:gd name="T5" fmla="*/ 16 h 17"/>
-                <a:gd name="T6" fmla="*/ 8 w 9"/>
-                <a:gd name="T7" fmla="*/ 16 h 17"/>
-                <a:gd name="T8" fmla="*/ 4 w 9"/>
+                <a:gd name="T3" fmla="*/ 11 h 17"/>
+                <a:gd name="T4" fmla="*/ 8 w 9"/>
+                <a:gd name="T5" fmla="*/ 34 h 17"/>
+                <a:gd name="T6" fmla="*/ 17 w 9"/>
+                <a:gd name="T7" fmla="*/ 34 h 17"/>
+                <a:gd name="T8" fmla="*/ 8 w 9"/>
                 <a:gd name="T9" fmla="*/ 0 h 17"/>
                 <a:gd name="T10" fmla="*/ 0 60000 65536"/>
                 <a:gd name="T11" fmla="*/ 0 60000 65536"/>
@@ -10429,15 +10500,15 @@
               <a:avLst/>
               <a:gdLst>
                 <a:gd name="T0" fmla="*/ 0 w 17"/>
-                <a:gd name="T1" fmla="*/ 6 h 25"/>
-                <a:gd name="T2" fmla="*/ 5 w 17"/>
+                <a:gd name="T1" fmla="*/ 13 h 25"/>
+                <a:gd name="T2" fmla="*/ 10 w 17"/>
                 <a:gd name="T3" fmla="*/ 0 h 25"/>
-                <a:gd name="T4" fmla="*/ 16 w 17"/>
-                <a:gd name="T5" fmla="*/ 18 h 25"/>
-                <a:gd name="T6" fmla="*/ 5 w 17"/>
-                <a:gd name="T7" fmla="*/ 24 h 25"/>
+                <a:gd name="T4" fmla="*/ 33 w 17"/>
+                <a:gd name="T5" fmla="*/ 39 h 25"/>
+                <a:gd name="T6" fmla="*/ 10 w 17"/>
+                <a:gd name="T7" fmla="*/ 52 h 25"/>
                 <a:gd name="T8" fmla="*/ 0 w 17"/>
-                <a:gd name="T9" fmla="*/ 6 h 25"/>
+                <a:gd name="T9" fmla="*/ 13 h 25"/>
                 <a:gd name="T10" fmla="*/ 0 60000 65536"/>
                 <a:gd name="T11" fmla="*/ 0 60000 65536"/>
                 <a:gd name="T12" fmla="*/ 0 60000 65536"/>
@@ -10524,15 +10595,15 @@
               <a:avLst/>
               <a:gdLst>
                 <a:gd name="T0" fmla="*/ 0 w 2553"/>
-                <a:gd name="T1" fmla="*/ 1048 h 1073"/>
-                <a:gd name="T2" fmla="*/ 8 w 2553"/>
-                <a:gd name="T3" fmla="*/ 1072 h 1073"/>
-                <a:gd name="T4" fmla="*/ 2552 w 2553"/>
-                <a:gd name="T5" fmla="*/ 24 h 1073"/>
-                <a:gd name="T6" fmla="*/ 2544 w 2553"/>
+                <a:gd name="T1" fmla="*/ 2245 h 1073"/>
+                <a:gd name="T2" fmla="*/ 17 w 2553"/>
+                <a:gd name="T3" fmla="*/ 2297 h 1073"/>
+                <a:gd name="T4" fmla="*/ 5316 w 2553"/>
+                <a:gd name="T5" fmla="*/ 51 h 1073"/>
+                <a:gd name="T6" fmla="*/ 5299 w 2553"/>
                 <a:gd name="T7" fmla="*/ 0 h 1073"/>
                 <a:gd name="T8" fmla="*/ 0 w 2553"/>
-                <a:gd name="T9" fmla="*/ 1048 h 1073"/>
+                <a:gd name="T9" fmla="*/ 2245 h 1073"/>
                 <a:gd name="T10" fmla="*/ 0 60000 65536"/>
                 <a:gd name="T11" fmla="*/ 0 60000 65536"/>
                 <a:gd name="T12" fmla="*/ 0 60000 65536"/>
@@ -10618,16 +10689,16 @@
             <a:custGeom>
               <a:avLst/>
               <a:gdLst>
-                <a:gd name="T0" fmla="*/ 16 w 17"/>
-                <a:gd name="T1" fmla="*/ 5 h 17"/>
-                <a:gd name="T2" fmla="*/ 16 w 17"/>
+                <a:gd name="T0" fmla="*/ 34 w 17"/>
+                <a:gd name="T1" fmla="*/ 11 h 17"/>
+                <a:gd name="T2" fmla="*/ 34 w 17"/>
                 <a:gd name="T3" fmla="*/ 0 h 17"/>
                 <a:gd name="T4" fmla="*/ 0 w 17"/>
-                <a:gd name="T5" fmla="*/ 11 h 17"/>
-                <a:gd name="T6" fmla="*/ 5 w 17"/>
-                <a:gd name="T7" fmla="*/ 16 h 17"/>
-                <a:gd name="T8" fmla="*/ 16 w 17"/>
-                <a:gd name="T9" fmla="*/ 5 h 17"/>
+                <a:gd name="T5" fmla="*/ 23 h 17"/>
+                <a:gd name="T6" fmla="*/ 11 w 17"/>
+                <a:gd name="T7" fmla="*/ 34 h 17"/>
+                <a:gd name="T8" fmla="*/ 34 w 17"/>
+                <a:gd name="T9" fmla="*/ 11 h 17"/>
                 <a:gd name="T10" fmla="*/ 0 60000 65536"/>
                 <a:gd name="T11" fmla="*/ 0 60000 65536"/>
                 <a:gd name="T12" fmla="*/ 0 60000 65536"/>
@@ -10713,15 +10784,15 @@
             <a:custGeom>
               <a:avLst/>
               <a:gdLst>
-                <a:gd name="T0" fmla="*/ 11 w 17"/>
+                <a:gd name="T0" fmla="*/ 23 w 17"/>
                 <a:gd name="T1" fmla="*/ 0 h 17"/>
-                <a:gd name="T2" fmla="*/ 16 w 17"/>
-                <a:gd name="T3" fmla="*/ 5 h 17"/>
-                <a:gd name="T4" fmla="*/ 5 w 17"/>
-                <a:gd name="T5" fmla="*/ 16 h 17"/>
+                <a:gd name="T2" fmla="*/ 33 w 17"/>
+                <a:gd name="T3" fmla="*/ 11 h 17"/>
+                <a:gd name="T4" fmla="*/ 10 w 17"/>
+                <a:gd name="T5" fmla="*/ 34 h 17"/>
                 <a:gd name="T6" fmla="*/ 0 w 17"/>
-                <a:gd name="T7" fmla="*/ 11 h 17"/>
-                <a:gd name="T8" fmla="*/ 11 w 17"/>
+                <a:gd name="T7" fmla="*/ 23 h 17"/>
+                <a:gd name="T8" fmla="*/ 23 w 17"/>
                 <a:gd name="T9" fmla="*/ 0 h 17"/>
                 <a:gd name="T10" fmla="*/ 0 60000 65536"/>
                 <a:gd name="T11" fmla="*/ 0 60000 65536"/>
@@ -10808,15 +10879,15 @@
             <a:custGeom>
               <a:avLst/>
               <a:gdLst>
-                <a:gd name="T0" fmla="*/ 16 w 641"/>
+                <a:gd name="T0" fmla="*/ 33 w 641"/>
                 <a:gd name="T1" fmla="*/ 0 h 865"/>
                 <a:gd name="T2" fmla="*/ 0 w 641"/>
-                <a:gd name="T3" fmla="*/ 16 h 865"/>
-                <a:gd name="T4" fmla="*/ 624 w 641"/>
-                <a:gd name="T5" fmla="*/ 864 h 865"/>
-                <a:gd name="T6" fmla="*/ 640 w 641"/>
-                <a:gd name="T7" fmla="*/ 848 h 865"/>
-                <a:gd name="T8" fmla="*/ 16 w 641"/>
+                <a:gd name="T3" fmla="*/ 34 h 865"/>
+                <a:gd name="T4" fmla="*/ 1300 w 641"/>
+                <a:gd name="T5" fmla="*/ 1851 h 865"/>
+                <a:gd name="T6" fmla="*/ 1333 w 641"/>
+                <a:gd name="T7" fmla="*/ 1817 h 865"/>
+                <a:gd name="T8" fmla="*/ 33 w 641"/>
                 <a:gd name="T9" fmla="*/ 0 h 865"/>
                 <a:gd name="T10" fmla="*/ 0 60000 65536"/>
                 <a:gd name="T11" fmla="*/ 0 60000 65536"/>
@@ -11490,6 +11561,7 @@
           <a:bodyPr/>
           <a:lstStyle/>
           <a:p>
+            <a:pPr eaLnBrk="1" hangingPunct="1"/>
             <a:r>
               <a:rPr lang="en-US" smtClean="0"/>
               <a:t>Used ego-less approach</a:t>
@@ -11544,6 +11616,7 @@
           <a:bodyPr/>
           <a:lstStyle/>
           <a:p>
+            <a:pPr eaLnBrk="1" hangingPunct="1"/>
             <a:r>
               <a:rPr lang="en-US" smtClean="0"/>
               <a:t>Game</a:t>
@@ -11566,6 +11639,7 @@
           <a:bodyPr/>
           <a:lstStyle/>
           <a:p>
+            <a:pPr eaLnBrk="1" hangingPunct="1"/>
             <a:r>
               <a:rPr lang="en-US" smtClean="0"/>
               <a:t>The following slides describe the components to the game</a:t>
@@ -11620,6 +11694,7 @@
           <a:bodyPr/>
           <a:lstStyle/>
           <a:p>
+            <a:pPr eaLnBrk="1" hangingPunct="1"/>
             <a:r>
               <a:rPr lang="en-US" smtClean="0"/>
               <a:t>Game Logic</a:t>
@@ -11642,6 +11717,7 @@
           <a:bodyPr/>
           <a:lstStyle/>
           <a:p>
+            <a:pPr eaLnBrk="1" hangingPunct="1"/>
             <a:endParaRPr lang="en-US" smtClean="0"/>
           </a:p>
         </p:txBody>
@@ -11725,6 +11801,7 @@
           <a:bodyPr/>
           <a:lstStyle/>
           <a:p>
+            <a:pPr eaLnBrk="1" hangingPunct="1"/>
             <a:r>
               <a:rPr lang="en-US" smtClean="0"/>
               <a:t>Cube Scene Graph</a:t>
@@ -11747,6 +11824,7 @@
           <a:bodyPr/>
           <a:lstStyle/>
           <a:p>
+            <a:pPr eaLnBrk="1" hangingPunct="1"/>
             <a:endParaRPr lang="en-US" smtClean="0"/>
           </a:p>
         </p:txBody>
@@ -11830,6 +11908,7 @@
           <a:bodyPr/>
           <a:lstStyle/>
           <a:p>
+            <a:pPr eaLnBrk="1" hangingPunct="1"/>
             <a:r>
               <a:rPr lang="en-US" smtClean="0"/>
               <a:t>Cube Scene Graph (cont)</a:t>
@@ -11852,6 +11931,7 @@
           <a:bodyPr/>
           <a:lstStyle/>
           <a:p>
+            <a:pPr eaLnBrk="1" hangingPunct="1"/>
             <a:endParaRPr lang="en-US" smtClean="0"/>
           </a:p>
         </p:txBody>
@@ -11935,6 +12015,7 @@
           <a:bodyPr/>
           <a:lstStyle/>
           <a:p>
+            <a:pPr eaLnBrk="1" hangingPunct="1"/>
             <a:r>
               <a:rPr lang="en-US" smtClean="0"/>
               <a:t>Engine Design Metrics</a:t>
@@ -11957,6 +12038,7 @@
           <a:bodyPr/>
           <a:lstStyle/>
           <a:p>
+            <a:pPr eaLnBrk="1" hangingPunct="1"/>
             <a:endParaRPr lang="en-US" smtClean="0"/>
           </a:p>
         </p:txBody>
@@ -12028,6 +12110,7 @@
           <a:bodyPr/>
           <a:lstStyle/>
           <a:p>
+            <a:pPr eaLnBrk="1" hangingPunct="1"/>
             <a:r>
               <a:rPr lang="en-US" smtClean="0"/>
               <a:t>Regade’s Cube Design Metrics</a:t>
@@ -12050,6 +12133,7 @@
           <a:bodyPr/>
           <a:lstStyle/>
           <a:p>
+            <a:pPr eaLnBrk="1" hangingPunct="1"/>
             <a:endParaRPr lang="en-US" smtClean="0"/>
           </a:p>
         </p:txBody>
@@ -12157,6 +12241,7 @@
           <a:bodyPr/>
           <a:lstStyle/>
           <a:p>
+            <a:pPr eaLnBrk="1" hangingPunct="1"/>
             <a:r>
               <a:rPr lang="en-US" smtClean="0"/>
               <a:t>Complexity</a:t>
@@ -12179,19 +12264,21 @@
           <a:bodyPr/>
           <a:lstStyle/>
           <a:p>
+            <a:pPr eaLnBrk="1" hangingPunct="1"/>
             <a:r>
               <a:rPr lang="en-US" smtClean="0"/>
               <a:t>The complexity is proportional to V(G)</a:t>
             </a:r>
           </a:p>
           <a:p>
+            <a:pPr eaLnBrk="1" hangingPunct="1"/>
             <a:r>
               <a:rPr lang="en-US" smtClean="0"/>
               <a:t>Fan in/Fan out of the components is less than or equal to one</a:t>
             </a:r>
           </a:p>
           <a:p>
-            <a:pPr lvl="1"/>
+            <a:pPr lvl="1" eaLnBrk="1" hangingPunct="1"/>
             <a:r>
               <a:rPr lang="en-US" smtClean="0"/>
               <a:t>Indicates low design complexity</a:t>
@@ -12251,6 +12338,7 @@
           <a:bodyPr/>
           <a:lstStyle/>
           <a:p>
+            <a:pPr eaLnBrk="1" hangingPunct="1"/>
             <a:r>
               <a:rPr lang="en-US" smtClean="0"/>
               <a:t>Dependency</a:t>
@@ -12278,7 +12366,7 @@
           <a:bodyPr/>
           <a:lstStyle/>
           <a:p>
-            <a:pPr>
+            <a:pPr eaLnBrk="1" hangingPunct="1">
               <a:buFont typeface="Arial" charset="0"/>
               <a:buNone/>
             </a:pPr>
@@ -12389,6 +12477,7 @@
           <a:bodyPr/>
           <a:lstStyle/>
           <a:p>
+            <a:pPr eaLnBrk="1" hangingPunct="1"/>
             <a:r>
               <a:rPr lang="en-US" smtClean="0"/>
               <a:t>Project Development Schedule</a:t>
@@ -12416,6 +12505,7 @@
           <a:bodyPr/>
           <a:lstStyle/>
           <a:p>
+            <a:pPr eaLnBrk="1" hangingPunct="1"/>
             <a:r>
               <a:rPr lang="en-US" smtClean="0"/>
               <a:t>Changes are needed!</a:t>
@@ -12502,6 +12592,7 @@
           <a:bodyPr/>
           <a:lstStyle/>
           <a:p>
+            <a:pPr eaLnBrk="1" hangingPunct="1"/>
             <a:r>
               <a:rPr lang="en-US" smtClean="0"/>
               <a:t>Dependencies and Work Schedule</a:t>
@@ -12524,6 +12615,7 @@
           <a:bodyPr/>
           <a:lstStyle/>
           <a:p>
+            <a:pPr eaLnBrk="1" hangingPunct="1"/>
             <a:r>
               <a:rPr lang="en-US" smtClean="0"/>
               <a:t>Though simple, the project is very large and is very impractical for such a short period of time</a:t>
@@ -12578,6 +12670,7 @@
           <a:bodyPr/>
           <a:lstStyle/>
           <a:p>
+            <a:pPr eaLnBrk="1" hangingPunct="1"/>
             <a:r>
               <a:rPr lang="en-US" smtClean="0"/>
               <a:t>Team Organization</a:t>
@@ -12600,6 +12693,7 @@
           <a:bodyPr/>
           <a:lstStyle/>
           <a:p>
+            <a:pPr eaLnBrk="1" hangingPunct="1"/>
             <a:r>
               <a:rPr lang="en-US" smtClean="0"/>
               <a:t>Modified ego-less approach</a:t>
@@ -12776,15 +12870,15 @@
               <a:avLst/>
               <a:gdLst>
                 <a:gd name="T0" fmla="*/ 0 w 9"/>
-                <a:gd name="T1" fmla="*/ 16 h 17"/>
-                <a:gd name="T2" fmla="*/ 4 w 9"/>
-                <a:gd name="T3" fmla="*/ 16 h 17"/>
-                <a:gd name="T4" fmla="*/ 8 w 9"/>
-                <a:gd name="T5" fmla="*/ 5 h 17"/>
-                <a:gd name="T6" fmla="*/ 4 w 9"/>
+                <a:gd name="T1" fmla="*/ 35 h 17"/>
+                <a:gd name="T2" fmla="*/ 8 w 9"/>
+                <a:gd name="T3" fmla="*/ 35 h 17"/>
+                <a:gd name="T4" fmla="*/ 16 w 9"/>
+                <a:gd name="T5" fmla="*/ 11 h 17"/>
+                <a:gd name="T6" fmla="*/ 8 w 9"/>
                 <a:gd name="T7" fmla="*/ 0 h 17"/>
                 <a:gd name="T8" fmla="*/ 0 w 9"/>
-                <a:gd name="T9" fmla="*/ 16 h 17"/>
+                <a:gd name="T9" fmla="*/ 35 h 17"/>
                 <a:gd name="T10" fmla="*/ 0 60000 65536"/>
                 <a:gd name="T11" fmla="*/ 0 60000 65536"/>
                 <a:gd name="T12" fmla="*/ 0 60000 65536"/>
@@ -12870,16 +12964,16 @@
             <a:custGeom>
               <a:avLst/>
               <a:gdLst>
-                <a:gd name="T0" fmla="*/ 11 w 17"/>
-                <a:gd name="T1" fmla="*/ 24 h 25"/>
+                <a:gd name="T0" fmla="*/ 23 w 17"/>
+                <a:gd name="T1" fmla="*/ 52 h 25"/>
                 <a:gd name="T2" fmla="*/ 0 w 17"/>
-                <a:gd name="T3" fmla="*/ 18 h 25"/>
-                <a:gd name="T4" fmla="*/ 11 w 17"/>
+                <a:gd name="T3" fmla="*/ 39 h 25"/>
+                <a:gd name="T4" fmla="*/ 23 w 17"/>
                 <a:gd name="T5" fmla="*/ 0 h 25"/>
-                <a:gd name="T6" fmla="*/ 16 w 17"/>
-                <a:gd name="T7" fmla="*/ 6 h 25"/>
-                <a:gd name="T8" fmla="*/ 11 w 17"/>
-                <a:gd name="T9" fmla="*/ 24 h 25"/>
+                <a:gd name="T6" fmla="*/ 33 w 17"/>
+                <a:gd name="T7" fmla="*/ 13 h 25"/>
+                <a:gd name="T8" fmla="*/ 23 w 17"/>
+                <a:gd name="T9" fmla="*/ 52 h 25"/>
                 <a:gd name="T10" fmla="*/ 0 60000 65536"/>
                 <a:gd name="T11" fmla="*/ 0 60000 65536"/>
                 <a:gd name="T12" fmla="*/ 0 60000 65536"/>
@@ -12965,16 +13059,16 @@
             <a:custGeom>
               <a:avLst/>
               <a:gdLst>
-                <a:gd name="T0" fmla="*/ 11 w 17"/>
-                <a:gd name="T1" fmla="*/ 16 h 17"/>
-                <a:gd name="T2" fmla="*/ 16 w 17"/>
-                <a:gd name="T3" fmla="*/ 16 h 17"/>
-                <a:gd name="T4" fmla="*/ 5 w 17"/>
+                <a:gd name="T0" fmla="*/ 23 w 17"/>
+                <a:gd name="T1" fmla="*/ 35 h 17"/>
+                <a:gd name="T2" fmla="*/ 34 w 17"/>
+                <a:gd name="T3" fmla="*/ 35 h 17"/>
+                <a:gd name="T4" fmla="*/ 11 w 17"/>
                 <a:gd name="T5" fmla="*/ 0 h 17"/>
                 <a:gd name="T6" fmla="*/ 0 w 17"/>
-                <a:gd name="T7" fmla="*/ 5 h 17"/>
-                <a:gd name="T8" fmla="*/ 11 w 17"/>
-                <a:gd name="T9" fmla="*/ 16 h 17"/>
+                <a:gd name="T7" fmla="*/ 11 h 17"/>
+                <a:gd name="T8" fmla="*/ 23 w 17"/>
+                <a:gd name="T9" fmla="*/ 35 h 17"/>
                 <a:gd name="T10" fmla="*/ 0 60000 65536"/>
                 <a:gd name="T11" fmla="*/ 0 60000 65536"/>
                 <a:gd name="T12" fmla="*/ 0 60000 65536"/>
@@ -13060,16 +13154,16 @@
             <a:custGeom>
               <a:avLst/>
               <a:gdLst>
-                <a:gd name="T0" fmla="*/ 16 w 17"/>
-                <a:gd name="T1" fmla="*/ 11 h 17"/>
-                <a:gd name="T2" fmla="*/ 11 w 17"/>
-                <a:gd name="T3" fmla="*/ 16 h 17"/>
+                <a:gd name="T0" fmla="*/ 33 w 17"/>
+                <a:gd name="T1" fmla="*/ 23 h 17"/>
+                <a:gd name="T2" fmla="*/ 23 w 17"/>
+                <a:gd name="T3" fmla="*/ 34 h 17"/>
                 <a:gd name="T4" fmla="*/ 0 w 17"/>
-                <a:gd name="T5" fmla="*/ 5 h 17"/>
-                <a:gd name="T6" fmla="*/ 5 w 17"/>
+                <a:gd name="T5" fmla="*/ 11 h 17"/>
+                <a:gd name="T6" fmla="*/ 10 w 17"/>
                 <a:gd name="T7" fmla="*/ 0 h 17"/>
-                <a:gd name="T8" fmla="*/ 16 w 17"/>
-                <a:gd name="T9" fmla="*/ 11 h 17"/>
+                <a:gd name="T8" fmla="*/ 33 w 17"/>
+                <a:gd name="T9" fmla="*/ 23 h 17"/>
                 <a:gd name="T10" fmla="*/ 0 60000 65536"/>
                 <a:gd name="T11" fmla="*/ 0 60000 65536"/>
                 <a:gd name="T12" fmla="*/ 0 60000 65536"/>
@@ -13155,16 +13249,16 @@
             <a:custGeom>
               <a:avLst/>
               <a:gdLst>
-                <a:gd name="T0" fmla="*/ 16 w 17"/>
-                <a:gd name="T1" fmla="*/ 16 h 17"/>
-                <a:gd name="T2" fmla="*/ 16 w 17"/>
-                <a:gd name="T3" fmla="*/ 5 h 17"/>
-                <a:gd name="T4" fmla="*/ 5 w 17"/>
+                <a:gd name="T0" fmla="*/ 33 w 17"/>
+                <a:gd name="T1" fmla="*/ 35 h 17"/>
+                <a:gd name="T2" fmla="*/ 33 w 17"/>
+                <a:gd name="T3" fmla="*/ 11 h 17"/>
+                <a:gd name="T4" fmla="*/ 10 w 17"/>
                 <a:gd name="T5" fmla="*/ 0 h 17"/>
                 <a:gd name="T6" fmla="*/ 0 w 17"/>
-                <a:gd name="T7" fmla="*/ 5 h 17"/>
-                <a:gd name="T8" fmla="*/ 16 w 17"/>
-                <a:gd name="T9" fmla="*/ 16 h 17"/>
+                <a:gd name="T7" fmla="*/ 11 h 17"/>
+                <a:gd name="T8" fmla="*/ 33 w 17"/>
+                <a:gd name="T9" fmla="*/ 35 h 17"/>
                 <a:gd name="T10" fmla="*/ 0 60000 65536"/>
                 <a:gd name="T11" fmla="*/ 0 60000 65536"/>
                 <a:gd name="T12" fmla="*/ 0 60000 65536"/>
@@ -13250,16 +13344,16 @@
             <a:custGeom>
               <a:avLst/>
               <a:gdLst>
-                <a:gd name="T0" fmla="*/ 24 w 25"/>
-                <a:gd name="T1" fmla="*/ 11 h 17"/>
-                <a:gd name="T2" fmla="*/ 18 w 25"/>
-                <a:gd name="T3" fmla="*/ 16 h 17"/>
+                <a:gd name="T0" fmla="*/ 50 w 25"/>
+                <a:gd name="T1" fmla="*/ 23 h 17"/>
+                <a:gd name="T2" fmla="*/ 37 w 25"/>
+                <a:gd name="T3" fmla="*/ 34 h 17"/>
                 <a:gd name="T4" fmla="*/ 0 w 25"/>
-                <a:gd name="T5" fmla="*/ 5 h 17"/>
-                <a:gd name="T6" fmla="*/ 6 w 25"/>
+                <a:gd name="T5" fmla="*/ 11 h 17"/>
+                <a:gd name="T6" fmla="*/ 12 w 25"/>
                 <a:gd name="T7" fmla="*/ 0 h 17"/>
-                <a:gd name="T8" fmla="*/ 24 w 25"/>
-                <a:gd name="T9" fmla="*/ 11 h 17"/>
+                <a:gd name="T8" fmla="*/ 50 w 25"/>
+                <a:gd name="T9" fmla="*/ 23 h 17"/>
                 <a:gd name="T10" fmla="*/ 0 60000 65536"/>
                 <a:gd name="T11" fmla="*/ 0 60000 65536"/>
                 <a:gd name="T12" fmla="*/ 0 60000 65536"/>
@@ -13345,16 +13439,16 @@
             <a:custGeom>
               <a:avLst/>
               <a:gdLst>
-                <a:gd name="T0" fmla="*/ 24 w 25"/>
-                <a:gd name="T1" fmla="*/ 11 h 17"/>
-                <a:gd name="T2" fmla="*/ 18 w 25"/>
+                <a:gd name="T0" fmla="*/ 50 w 25"/>
+                <a:gd name="T1" fmla="*/ 24 h 17"/>
+                <a:gd name="T2" fmla="*/ 37 w 25"/>
                 <a:gd name="T3" fmla="*/ 0 h 17"/>
                 <a:gd name="T4" fmla="*/ 0 w 25"/>
-                <a:gd name="T5" fmla="*/ 11 h 17"/>
-                <a:gd name="T6" fmla="*/ 6 w 25"/>
-                <a:gd name="T7" fmla="*/ 16 h 17"/>
-                <a:gd name="T8" fmla="*/ 24 w 25"/>
-                <a:gd name="T9" fmla="*/ 11 h 17"/>
+                <a:gd name="T5" fmla="*/ 24 h 17"/>
+                <a:gd name="T6" fmla="*/ 12 w 25"/>
+                <a:gd name="T7" fmla="*/ 35 h 17"/>
+                <a:gd name="T8" fmla="*/ 50 w 25"/>
+                <a:gd name="T9" fmla="*/ 24 h 17"/>
                 <a:gd name="T10" fmla="*/ 0 60000 65536"/>
                 <a:gd name="T11" fmla="*/ 0 60000 65536"/>
                 <a:gd name="T12" fmla="*/ 0 60000 65536"/>
@@ -13440,15 +13534,15 @@
             <a:custGeom>
               <a:avLst/>
               <a:gdLst>
-                <a:gd name="T0" fmla="*/ 16 w 17"/>
+                <a:gd name="T0" fmla="*/ 33 w 17"/>
                 <a:gd name="T1" fmla="*/ 0 h 9"/>
-                <a:gd name="T2" fmla="*/ 16 w 17"/>
-                <a:gd name="T3" fmla="*/ 4 h 9"/>
-                <a:gd name="T4" fmla="*/ 5 w 17"/>
-                <a:gd name="T5" fmla="*/ 8 h 9"/>
+                <a:gd name="T2" fmla="*/ 33 w 17"/>
+                <a:gd name="T3" fmla="*/ 8 h 9"/>
+                <a:gd name="T4" fmla="*/ 10 w 17"/>
+                <a:gd name="T5" fmla="*/ 17 h 9"/>
                 <a:gd name="T6" fmla="*/ 0 w 17"/>
-                <a:gd name="T7" fmla="*/ 4 h 9"/>
-                <a:gd name="T8" fmla="*/ 16 w 17"/>
+                <a:gd name="T7" fmla="*/ 8 h 9"/>
+                <a:gd name="T8" fmla="*/ 33 w 17"/>
                 <a:gd name="T9" fmla="*/ 0 h 9"/>
                 <a:gd name="T10" fmla="*/ 0 60000 65536"/>
                 <a:gd name="T11" fmla="*/ 0 60000 65536"/>
@@ -13535,15 +13629,15 @@
             <a:custGeom>
               <a:avLst/>
               <a:gdLst>
-                <a:gd name="T0" fmla="*/ 24 w 705"/>
+                <a:gd name="T0" fmla="*/ 50 w 705"/>
                 <a:gd name="T1" fmla="*/ 0 h 1657"/>
                 <a:gd name="T2" fmla="*/ 0 w 705"/>
-                <a:gd name="T3" fmla="*/ 8 h 1657"/>
-                <a:gd name="T4" fmla="*/ 680 w 705"/>
-                <a:gd name="T5" fmla="*/ 1656 h 1657"/>
-                <a:gd name="T6" fmla="*/ 704 w 705"/>
-                <a:gd name="T7" fmla="*/ 1648 h 1657"/>
-                <a:gd name="T8" fmla="*/ 24 w 705"/>
+                <a:gd name="T3" fmla="*/ 17 h 1657"/>
+                <a:gd name="T4" fmla="*/ 1416 w 705"/>
+                <a:gd name="T5" fmla="*/ 3549 h 1657"/>
+                <a:gd name="T6" fmla="*/ 1466 w 705"/>
+                <a:gd name="T7" fmla="*/ 3532 h 1657"/>
+                <a:gd name="T8" fmla="*/ 50 w 705"/>
                 <a:gd name="T9" fmla="*/ 0 h 1657"/>
                 <a:gd name="T10" fmla="*/ 0 60000 65536"/>
                 <a:gd name="T11" fmla="*/ 0 60000 65536"/>
@@ -13630,15 +13724,15 @@
             <a:custGeom>
               <a:avLst/>
               <a:gdLst>
-                <a:gd name="T0" fmla="*/ 5 w 17"/>
+                <a:gd name="T0" fmla="*/ 10 w 17"/>
                 <a:gd name="T1" fmla="*/ 0 h 17"/>
                 <a:gd name="T2" fmla="*/ 0 w 17"/>
-                <a:gd name="T3" fmla="*/ 5 h 17"/>
-                <a:gd name="T4" fmla="*/ 11 w 17"/>
-                <a:gd name="T5" fmla="*/ 16 h 17"/>
-                <a:gd name="T6" fmla="*/ 16 w 17"/>
-                <a:gd name="T7" fmla="*/ 11 h 17"/>
-                <a:gd name="T8" fmla="*/ 5 w 17"/>
+                <a:gd name="T3" fmla="*/ 11 h 17"/>
+                <a:gd name="T4" fmla="*/ 23 w 17"/>
+                <a:gd name="T5" fmla="*/ 35 h 17"/>
+                <a:gd name="T6" fmla="*/ 33 w 17"/>
+                <a:gd name="T7" fmla="*/ 24 h 17"/>
+                <a:gd name="T8" fmla="*/ 10 w 17"/>
                 <a:gd name="T9" fmla="*/ 0 h 17"/>
                 <a:gd name="T10" fmla="*/ 0 60000 65536"/>
                 <a:gd name="T11" fmla="*/ 0 60000 65536"/>
@@ -13726,15 +13820,15 @@
               <a:avLst/>
               <a:gdLst>
                 <a:gd name="T0" fmla="*/ 0 w 17"/>
-                <a:gd name="T1" fmla="*/ 5 h 17"/>
-                <a:gd name="T2" fmla="*/ 5 w 17"/>
+                <a:gd name="T1" fmla="*/ 11 h 17"/>
+                <a:gd name="T2" fmla="*/ 11 w 17"/>
                 <a:gd name="T3" fmla="*/ 0 h 17"/>
-                <a:gd name="T4" fmla="*/ 16 w 17"/>
-                <a:gd name="T5" fmla="*/ 16 h 17"/>
-                <a:gd name="T6" fmla="*/ 11 w 17"/>
-                <a:gd name="T7" fmla="*/ 16 h 17"/>
+                <a:gd name="T4" fmla="*/ 34 w 17"/>
+                <a:gd name="T5" fmla="*/ 35 h 17"/>
+                <a:gd name="T6" fmla="*/ 23 w 17"/>
+                <a:gd name="T7" fmla="*/ 35 h 17"/>
                 <a:gd name="T8" fmla="*/ 0 w 17"/>
-                <a:gd name="T9" fmla="*/ 5 h 17"/>
+                <a:gd name="T9" fmla="*/ 11 h 17"/>
                 <a:gd name="T10" fmla="*/ 0 60000 65536"/>
                 <a:gd name="T11" fmla="*/ 0 60000 65536"/>
                 <a:gd name="T12" fmla="*/ 0 60000 65536"/>
@@ -13821,15 +13915,15 @@
               <a:avLst/>
               <a:gdLst>
                 <a:gd name="T0" fmla="*/ 0 w 9"/>
-                <a:gd name="T1" fmla="*/ 16 h 17"/>
-                <a:gd name="T2" fmla="*/ 4 w 9"/>
-                <a:gd name="T3" fmla="*/ 16 h 17"/>
-                <a:gd name="T4" fmla="*/ 8 w 9"/>
-                <a:gd name="T5" fmla="*/ 5 h 17"/>
-                <a:gd name="T6" fmla="*/ 4 w 9"/>
+                <a:gd name="T1" fmla="*/ 34 h 17"/>
+                <a:gd name="T2" fmla="*/ 9 w 9"/>
+                <a:gd name="T3" fmla="*/ 34 h 17"/>
+                <a:gd name="T4" fmla="*/ 18 w 9"/>
+                <a:gd name="T5" fmla="*/ 11 h 17"/>
+                <a:gd name="T6" fmla="*/ 9 w 9"/>
                 <a:gd name="T7" fmla="*/ 0 h 17"/>
                 <a:gd name="T8" fmla="*/ 0 w 9"/>
-                <a:gd name="T9" fmla="*/ 16 h 17"/>
+                <a:gd name="T9" fmla="*/ 34 h 17"/>
                 <a:gd name="T10" fmla="*/ 0 60000 65536"/>
                 <a:gd name="T11" fmla="*/ 0 60000 65536"/>
                 <a:gd name="T12" fmla="*/ 0 60000 65536"/>
@@ -13915,16 +14009,16 @@
             <a:custGeom>
               <a:avLst/>
               <a:gdLst>
-                <a:gd name="T0" fmla="*/ 11 w 17"/>
-                <a:gd name="T1" fmla="*/ 24 h 25"/>
+                <a:gd name="T0" fmla="*/ 23 w 17"/>
+                <a:gd name="T1" fmla="*/ 52 h 25"/>
                 <a:gd name="T2" fmla="*/ 0 w 17"/>
-                <a:gd name="T3" fmla="*/ 18 h 25"/>
-                <a:gd name="T4" fmla="*/ 11 w 17"/>
+                <a:gd name="T3" fmla="*/ 39 h 25"/>
+                <a:gd name="T4" fmla="*/ 23 w 17"/>
                 <a:gd name="T5" fmla="*/ 0 h 25"/>
-                <a:gd name="T6" fmla="*/ 16 w 17"/>
-                <a:gd name="T7" fmla="*/ 6 h 25"/>
-                <a:gd name="T8" fmla="*/ 11 w 17"/>
-                <a:gd name="T9" fmla="*/ 24 h 25"/>
+                <a:gd name="T6" fmla="*/ 33 w 17"/>
+                <a:gd name="T7" fmla="*/ 13 h 25"/>
+                <a:gd name="T8" fmla="*/ 23 w 17"/>
+                <a:gd name="T9" fmla="*/ 52 h 25"/>
                 <a:gd name="T10" fmla="*/ 0 60000 65536"/>
                 <a:gd name="T11" fmla="*/ 0 60000 65536"/>
                 <a:gd name="T12" fmla="*/ 0 60000 65536"/>
@@ -14010,15 +14104,15 @@
             <a:custGeom>
               <a:avLst/>
               <a:gdLst>
-                <a:gd name="T0" fmla="*/ 4 w 9"/>
+                <a:gd name="T0" fmla="*/ 8 w 9"/>
                 <a:gd name="T1" fmla="*/ 0 h 17"/>
                 <a:gd name="T2" fmla="*/ 0 w 9"/>
-                <a:gd name="T3" fmla="*/ 5 h 17"/>
-                <a:gd name="T4" fmla="*/ 4 w 9"/>
-                <a:gd name="T5" fmla="*/ 16 h 17"/>
-                <a:gd name="T6" fmla="*/ 8 w 9"/>
-                <a:gd name="T7" fmla="*/ 16 h 17"/>
-                <a:gd name="T8" fmla="*/ 4 w 9"/>
+                <a:gd name="T3" fmla="*/ 11 h 17"/>
+                <a:gd name="T4" fmla="*/ 8 w 9"/>
+                <a:gd name="T5" fmla="*/ 34 h 17"/>
+                <a:gd name="T6" fmla="*/ 17 w 9"/>
+                <a:gd name="T7" fmla="*/ 34 h 17"/>
+                <a:gd name="T8" fmla="*/ 8 w 9"/>
                 <a:gd name="T9" fmla="*/ 0 h 17"/>
                 <a:gd name="T10" fmla="*/ 0 60000 65536"/>
                 <a:gd name="T11" fmla="*/ 0 60000 65536"/>
@@ -14106,15 +14200,15 @@
               <a:avLst/>
               <a:gdLst>
                 <a:gd name="T0" fmla="*/ 0 w 17"/>
-                <a:gd name="T1" fmla="*/ 6 h 25"/>
-                <a:gd name="T2" fmla="*/ 5 w 17"/>
+                <a:gd name="T1" fmla="*/ 13 h 25"/>
+                <a:gd name="T2" fmla="*/ 10 w 17"/>
                 <a:gd name="T3" fmla="*/ 0 h 25"/>
-                <a:gd name="T4" fmla="*/ 16 w 17"/>
-                <a:gd name="T5" fmla="*/ 18 h 25"/>
-                <a:gd name="T6" fmla="*/ 5 w 17"/>
-                <a:gd name="T7" fmla="*/ 24 h 25"/>
+                <a:gd name="T4" fmla="*/ 33 w 17"/>
+                <a:gd name="T5" fmla="*/ 39 h 25"/>
+                <a:gd name="T6" fmla="*/ 10 w 17"/>
+                <a:gd name="T7" fmla="*/ 52 h 25"/>
                 <a:gd name="T8" fmla="*/ 0 w 17"/>
-                <a:gd name="T9" fmla="*/ 6 h 25"/>
+                <a:gd name="T9" fmla="*/ 13 h 25"/>
                 <a:gd name="T10" fmla="*/ 0 60000 65536"/>
                 <a:gd name="T11" fmla="*/ 0 60000 65536"/>
                 <a:gd name="T12" fmla="*/ 0 60000 65536"/>
@@ -14200,16 +14294,16 @@
             <a:custGeom>
               <a:avLst/>
               <a:gdLst>
-                <a:gd name="T0" fmla="*/ 16 w 17"/>
-                <a:gd name="T1" fmla="*/ 5 h 17"/>
-                <a:gd name="T2" fmla="*/ 16 w 17"/>
+                <a:gd name="T0" fmla="*/ 34 w 17"/>
+                <a:gd name="T1" fmla="*/ 11 h 17"/>
+                <a:gd name="T2" fmla="*/ 34 w 17"/>
                 <a:gd name="T3" fmla="*/ 0 h 17"/>
                 <a:gd name="T4" fmla="*/ 0 w 17"/>
-                <a:gd name="T5" fmla="*/ 11 h 17"/>
-                <a:gd name="T6" fmla="*/ 5 w 17"/>
-                <a:gd name="T7" fmla="*/ 16 h 17"/>
-                <a:gd name="T8" fmla="*/ 16 w 17"/>
-                <a:gd name="T9" fmla="*/ 5 h 17"/>
+                <a:gd name="T5" fmla="*/ 23 h 17"/>
+                <a:gd name="T6" fmla="*/ 11 w 17"/>
+                <a:gd name="T7" fmla="*/ 34 h 17"/>
+                <a:gd name="T8" fmla="*/ 34 w 17"/>
+                <a:gd name="T9" fmla="*/ 11 h 17"/>
                 <a:gd name="T10" fmla="*/ 0 60000 65536"/>
                 <a:gd name="T11" fmla="*/ 0 60000 65536"/>
                 <a:gd name="T12" fmla="*/ 0 60000 65536"/>
@@ -14295,15 +14389,15 @@
             <a:custGeom>
               <a:avLst/>
               <a:gdLst>
-                <a:gd name="T0" fmla="*/ 11 w 17"/>
+                <a:gd name="T0" fmla="*/ 23 w 17"/>
                 <a:gd name="T1" fmla="*/ 0 h 17"/>
-                <a:gd name="T2" fmla="*/ 16 w 17"/>
-                <a:gd name="T3" fmla="*/ 5 h 17"/>
-                <a:gd name="T4" fmla="*/ 5 w 17"/>
-                <a:gd name="T5" fmla="*/ 16 h 17"/>
+                <a:gd name="T2" fmla="*/ 33 w 17"/>
+                <a:gd name="T3" fmla="*/ 11 h 17"/>
+                <a:gd name="T4" fmla="*/ 10 w 17"/>
+                <a:gd name="T5" fmla="*/ 34 h 17"/>
                 <a:gd name="T6" fmla="*/ 0 w 17"/>
-                <a:gd name="T7" fmla="*/ 11 h 17"/>
-                <a:gd name="T8" fmla="*/ 11 w 17"/>
+                <a:gd name="T7" fmla="*/ 23 h 17"/>
+                <a:gd name="T8" fmla="*/ 23 w 17"/>
                 <a:gd name="T9" fmla="*/ 0 h 17"/>
                 <a:gd name="T10" fmla="*/ 0 60000 65536"/>
                 <a:gd name="T11" fmla="*/ 0 60000 65536"/>
@@ -14731,6 +14825,7 @@
           <a:bodyPr/>
           <a:lstStyle/>
           <a:p>
+            <a:pPr eaLnBrk="1" hangingPunct="1"/>
             <a:r>
               <a:rPr lang="en-US" smtClean="0"/>
               <a:t>Agile</a:t>
@@ -14753,18 +14848,21 @@
           <a:bodyPr/>
           <a:lstStyle/>
           <a:p>
+            <a:pPr eaLnBrk="1" hangingPunct="1"/>
             <a:r>
               <a:rPr lang="en-US" smtClean="0"/>
               <a:t>Design phase was not mutually exclusive to construction or implementation</a:t>
             </a:r>
           </a:p>
           <a:p>
+            <a:pPr eaLnBrk="1" hangingPunct="1"/>
             <a:r>
               <a:rPr lang="en-US" smtClean="0"/>
               <a:t>Each component design requirements were updated during component implementation</a:t>
             </a:r>
           </a:p>
           <a:p>
+            <a:pPr eaLnBrk="1" hangingPunct="1"/>
             <a:r>
               <a:rPr lang="en-US" smtClean="0"/>
               <a:t>Immediately prior to implementation, the component was designed as needed.  This meant that not all components were designed together.</a:t>
@@ -14819,6 +14917,7 @@
           <a:bodyPr/>
           <a:lstStyle/>
           <a:p>
+            <a:pPr eaLnBrk="1" hangingPunct="1"/>
             <a:r>
               <a:rPr lang="en-US" smtClean="0"/>
               <a:t>Cuts</a:t>
@@ -14828,7 +14927,7 @@
       </p:sp>
       <p:sp>
         <p:nvSpPr>
-          <p:cNvPr id="3" name="Content Placeholder 2"/>
+          <p:cNvPr id="71682" name="Content Placeholder 2"/>
           <p:cNvSpPr>
             <a:spLocks noGrp="1"/>
           </p:cNvSpPr>
@@ -14838,12 +14937,10 @@
         </p:nvSpPr>
         <p:spPr/>
         <p:txBody>
-          <a:bodyPr>
-            <a:normAutofit/>
-          </a:bodyPr>
+          <a:bodyPr/>
           <a:lstStyle/>
           <a:p>
-            <a:pPr>
+            <a:pPr eaLnBrk="1" hangingPunct="1">
               <a:lnSpc>
                 <a:spcPct val="90000"/>
               </a:lnSpc>
@@ -14854,7 +14951,7 @@
             </a:r>
           </a:p>
           <a:p>
-            <a:pPr lvl="1">
+            <a:pPr lvl="1" eaLnBrk="1" hangingPunct="1">
               <a:lnSpc>
                 <a:spcPct val="90000"/>
               </a:lnSpc>
@@ -14865,7 +14962,7 @@
             </a:r>
           </a:p>
           <a:p>
-            <a:pPr lvl="1">
+            <a:pPr lvl="1" eaLnBrk="1" hangingPunct="1">
               <a:lnSpc>
                 <a:spcPct val="90000"/>
               </a:lnSpc>
@@ -14876,7 +14973,7 @@
             </a:r>
           </a:p>
           <a:p>
-            <a:pPr lvl="1">
+            <a:pPr lvl="1" eaLnBrk="1" hangingPunct="1">
               <a:lnSpc>
                 <a:spcPct val="90000"/>
               </a:lnSpc>
@@ -14887,7 +14984,7 @@
             </a:r>
           </a:p>
           <a:p>
-            <a:pPr lvl="1">
+            <a:pPr lvl="1" eaLnBrk="1" hangingPunct="1">
               <a:lnSpc>
                 <a:spcPct val="90000"/>
               </a:lnSpc>
@@ -14898,7 +14995,7 @@
             </a:r>
           </a:p>
           <a:p>
-            <a:pPr lvl="1">
+            <a:pPr lvl="1" eaLnBrk="1" hangingPunct="1">
               <a:lnSpc>
                 <a:spcPct val="90000"/>
               </a:lnSpc>
@@ -14909,7 +15006,7 @@
             </a:r>
           </a:p>
           <a:p>
-            <a:pPr lvl="1">
+            <a:pPr lvl="1" eaLnBrk="1" hangingPunct="1">
               <a:lnSpc>
                 <a:spcPct val="90000"/>
               </a:lnSpc>
@@ -14973,6 +15070,7 @@
           <a:bodyPr/>
           <a:lstStyle/>
           <a:p>
+            <a:pPr eaLnBrk="1" hangingPunct="1"/>
             <a:r>
               <a:rPr lang="en-US" smtClean="0"/>
               <a:t>Construction</a:t>
@@ -14997,7 +15095,7 @@
           </a:bodyPr>
           <a:lstStyle/>
           <a:p>
-            <a:pPr fontAlgn="auto">
+            <a:pPr eaLnBrk="1" fontAlgn="auto" hangingPunct="1">
               <a:spcAft>
                 <a:spcPts val="0"/>
               </a:spcAft>
@@ -15059,6 +15157,7 @@
           <a:bodyPr/>
           <a:lstStyle/>
           <a:p>
+            <a:pPr eaLnBrk="1" hangingPunct="1"/>
             <a:r>
               <a:rPr lang="en-US" smtClean="0"/>
               <a:t>Effort Estimation</a:t>
@@ -15081,20 +15180,21 @@
           <a:bodyPr/>
           <a:lstStyle/>
           <a:p>
+            <a:pPr eaLnBrk="1" hangingPunct="1"/>
             <a:r>
               <a:rPr lang="en-US" smtClean="0"/>
               <a:t>Two methods were used to estimate effort time</a:t>
             </a:r>
           </a:p>
           <a:p>
-            <a:pPr lvl="1"/>
+            <a:pPr lvl="1" eaLnBrk="1" hangingPunct="1"/>
             <a:r>
               <a:rPr lang="en-US" smtClean="0"/>
               <a:t>COCOMO II</a:t>
             </a:r>
           </a:p>
           <a:p>
-            <a:pPr lvl="1"/>
+            <a:pPr lvl="1" eaLnBrk="1" hangingPunct="1"/>
             <a:r>
               <a:rPr lang="en-US" smtClean="0"/>
               <a:t>Dependency Graph Analysis</a:t>
@@ -15136,7 +15236,7 @@
       </p:grpSpPr>
       <p:sp>
         <p:nvSpPr>
-          <p:cNvPr id="2" name="Title 1"/>
+          <p:cNvPr id="74753" name="Title 1"/>
           <p:cNvSpPr>
             <a:spLocks noGrp="1"/>
           </p:cNvSpPr>
@@ -15146,11 +15246,10 @@
         </p:nvSpPr>
         <p:spPr/>
         <p:txBody>
-          <a:bodyPr>
-            <a:normAutofit/>
-          </a:bodyPr>
+          <a:bodyPr/>
           <a:lstStyle/>
           <a:p>
+            <a:pPr eaLnBrk="1" hangingPunct="1"/>
             <a:r>
               <a:rPr lang="en-US" sz="2000" smtClean="0"/>
               <a:t>COCOMO II</a:t>
@@ -15174,6 +15273,7 @@
           <a:bodyPr/>
           <a:lstStyle/>
           <a:p>
+            <a:pPr eaLnBrk="1" hangingPunct="1"/>
             <a:r>
               <a:rPr lang="en-US" smtClean="0"/>
               <a:t>Using the COCOMO II Estimation process because we will be taking the project through all  three stages of the development cycle.  </a:t>
@@ -15200,6 +15300,7 @@
             </a:r>
           </a:p>
           <a:p>
+            <a:pPr eaLnBrk="1" hangingPunct="1"/>
             <a:r>
               <a:rPr lang="en-US" b="1" smtClean="0"/>
               <a:t>Estimated Effort</a:t>
@@ -15210,6 +15311,7 @@
             </a:r>
           </a:p>
           <a:p>
+            <a:pPr eaLnBrk="1" hangingPunct="1"/>
             <a:r>
               <a:rPr lang="en-US" smtClean="0"/>
               <a:t>Approximately 500 person hours </a:t>
@@ -15264,6 +15366,7 @@
           <a:bodyPr/>
           <a:lstStyle/>
           <a:p>
+            <a:pPr eaLnBrk="1" hangingPunct="1"/>
             <a:r>
               <a:rPr lang="en-US" smtClean="0"/>
               <a:t>Dependency Graph Analysis</a:t>
@@ -15291,12 +15394,14 @@
           <a:bodyPr/>
           <a:lstStyle/>
           <a:p>
+            <a:pPr eaLnBrk="1" hangingPunct="1"/>
             <a:r>
               <a:rPr lang="en-US" smtClean="0"/>
               <a:t>Defining weights for each link in the Dependency Graph, we were able to find a total amount of effort.</a:t>
             </a:r>
           </a:p>
           <a:p>
+            <a:pPr eaLnBrk="1" hangingPunct="1"/>
             <a:r>
               <a:rPr lang="en-US" smtClean="0"/>
               <a:t>275 Hours</a:t>
@@ -18334,6 +18439,7 @@
           <a:bodyPr/>
           <a:lstStyle/>
           <a:p>
+            <a:pPr eaLnBrk="1" hangingPunct="1"/>
             <a:r>
               <a:rPr lang="en-US" smtClean="0"/>
               <a:t>Component Effort Time</a:t>
@@ -18356,6 +18462,7 @@
           <a:bodyPr/>
           <a:lstStyle/>
           <a:p>
+            <a:pPr eaLnBrk="1" hangingPunct="1"/>
             <a:endParaRPr lang="en-US" smtClean="0"/>
           </a:p>
         </p:txBody>
@@ -18423,6 +18530,7 @@
           <a:bodyPr/>
           <a:lstStyle/>
           <a:p>
+            <a:pPr eaLnBrk="1" hangingPunct="1"/>
             <a:r>
               <a:rPr lang="en-US" smtClean="0"/>
               <a:t>Effort Over Time</a:t>
@@ -18445,6 +18553,7 @@
           <a:bodyPr/>
           <a:lstStyle/>
           <a:p>
+            <a:pPr eaLnBrk="1" hangingPunct="1"/>
             <a:endParaRPr lang="en-US" smtClean="0"/>
           </a:p>
         </p:txBody>
@@ -18512,6 +18621,7 @@
           <a:bodyPr/>
           <a:lstStyle/>
           <a:p>
+            <a:pPr eaLnBrk="1" hangingPunct="1"/>
             <a:r>
               <a:rPr lang="en-US" smtClean="0"/>
               <a:t>Estimation and Actual</a:t>
@@ -18559,42 +18669,46 @@
           <a:bodyPr/>
           <a:lstStyle/>
           <a:p>
+            <a:pPr eaLnBrk="1" hangingPunct="1"/>
             <a:r>
               <a:rPr lang="en-US" smtClean="0"/>
               <a:t>COCOMO II</a:t>
             </a:r>
           </a:p>
           <a:p>
-            <a:pPr lvl="1"/>
+            <a:pPr lvl="1" eaLnBrk="1" hangingPunct="1"/>
             <a:r>
               <a:rPr lang="en-US" smtClean="0"/>
               <a:t>500 Hours</a:t>
             </a:r>
           </a:p>
           <a:p>
+            <a:pPr eaLnBrk="1" hangingPunct="1"/>
             <a:r>
               <a:rPr lang="en-US" smtClean="0"/>
               <a:t>Dependency</a:t>
             </a:r>
           </a:p>
           <a:p>
-            <a:pPr lvl="1"/>
+            <a:pPr lvl="1" eaLnBrk="1" hangingPunct="1"/>
             <a:r>
               <a:rPr lang="en-US" smtClean="0"/>
               <a:t>275 Hours</a:t>
             </a:r>
           </a:p>
           <a:p>
+            <a:pPr eaLnBrk="1" hangingPunct="1"/>
             <a:endParaRPr lang="en-US" smtClean="0"/>
           </a:p>
           <a:p>
+            <a:pPr eaLnBrk="1" hangingPunct="1"/>
             <a:r>
               <a:rPr lang="en-US" smtClean="0"/>
               <a:t>Actual</a:t>
             </a:r>
           </a:p>
           <a:p>
-            <a:pPr lvl="1"/>
+            <a:pPr lvl="1" eaLnBrk="1" hangingPunct="1"/>
             <a:r>
               <a:rPr lang="en-US" smtClean="0"/>
               <a:t>534 Hours</a:t>
@@ -18665,31 +18779,10 @@
           <a:bodyPr/>
           <a:lstStyle/>
           <a:p>
+            <a:pPr eaLnBrk="1" hangingPunct="1"/>
             <a:r>
               <a:rPr lang="en-US" smtClean="0"/>
               <a:t>McCabe’s Metrics</a:t>
-            </a:r>
-          </a:p>
-        </p:txBody>
-      </p:sp>
-      <p:sp>
-        <p:nvSpPr>
-          <p:cNvPr id="80898" name="Content Placeholder 2"/>
-          <p:cNvSpPr>
-            <a:spLocks noGrp="1"/>
-          </p:cNvSpPr>
-          <p:nvPr>
-            <p:ph idx="1"/>
-          </p:nvPr>
-        </p:nvSpPr>
-        <p:spPr/>
-        <p:txBody>
-          <a:bodyPr/>
-          <a:lstStyle/>
-          <a:p>
-            <a:r>
-              <a:rPr lang="en-US" smtClean="0"/>
-              <a:t>Add when possible!!!!</a:t>
             </a:r>
           </a:p>
         </p:txBody>
@@ -18741,6 +18834,7 @@
           <a:bodyPr/>
           <a:lstStyle/>
           <a:p>
+            <a:pPr eaLnBrk="1" hangingPunct="1"/>
             <a:r>
               <a:rPr lang="en-US" smtClean="0"/>
               <a:t>Inception</a:t>
@@ -18763,20 +18857,21 @@
           <a:bodyPr/>
           <a:lstStyle/>
           <a:p>
+            <a:pPr eaLnBrk="1" hangingPunct="1"/>
             <a:r>
               <a:rPr lang="en-US" smtClean="0"/>
               <a:t>Client centered requirements</a:t>
             </a:r>
           </a:p>
           <a:p>
-            <a:pPr lvl="1"/>
+            <a:pPr lvl="1" eaLnBrk="1" hangingPunct="1"/>
             <a:r>
               <a:rPr lang="en-US" smtClean="0"/>
               <a:t>Gamers</a:t>
             </a:r>
           </a:p>
           <a:p>
-            <a:pPr lvl="1"/>
+            <a:pPr lvl="1" eaLnBrk="1" hangingPunct="1"/>
             <a:r>
               <a:rPr lang="en-US" smtClean="0"/>
               <a:t>Customers who would buy this product</a:t>
@@ -18818,76 +18913,58 @@
       </p:grpSpPr>
       <p:sp>
         <p:nvSpPr>
-          <p:cNvPr id="81921" name="Title 3"/>
+          <p:cNvPr id="96258" name="Rectangle 2"/>
           <p:cNvSpPr>
             <a:spLocks noGrp="1"/>
           </p:cNvSpPr>
           <p:nvPr>
-            <p:ph type="ctrTitle"/>
-          </p:nvPr>
-        </p:nvSpPr>
-        <p:spPr>
-          <a:xfrm>
-            <a:off x="990600" y="152400"/>
-            <a:ext cx="7772400" cy="1470025"/>
-          </a:xfrm>
-        </p:spPr>
-        <p:txBody>
-          <a:bodyPr/>
-          <a:lstStyle/>
-          <a:p>
-            <a:r>
-              <a:rPr lang="en-US" smtClean="0"/>
-              <a:t>Transition</a:t>
-            </a:r>
-          </a:p>
-        </p:txBody>
-      </p:sp>
-      <p:sp>
-        <p:nvSpPr>
-          <p:cNvPr id="5" name="Subtitle 4"/>
-          <p:cNvSpPr>
-            <a:spLocks noGrp="1"/>
-          </p:cNvSpPr>
-          <p:nvPr>
-            <p:ph type="subTitle" idx="1"/>
+            <p:ph type="title"/>
           </p:nvPr>
         </p:nvSpPr>
         <p:spPr/>
         <p:txBody>
-          <a:bodyPr rtlCol="0">
-            <a:normAutofit/>
-          </a:bodyPr>
+          <a:bodyPr/>
           <a:lstStyle/>
           <a:p>
-            <a:pPr fontAlgn="auto">
-              <a:spcAft>
-                <a:spcPts val="0"/>
-              </a:spcAft>
-              <a:buFont typeface="Arial" pitchFamily="34" charset="0"/>
-              <a:buNone/>
-              <a:defRPr/>
-            </a:pPr>
-            <a:r>
-              <a:rPr lang="en-US" dirty="0" smtClean="0"/>
-              <a:t>Test and Deploy</a:t>
-            </a:r>
-            <a:endParaRPr lang="en-US" dirty="0"/>
+            <a:pPr eaLnBrk="1" hangingPunct="1"/>
+            <a:r>
+              <a:rPr lang="en-US" smtClean="0"/>
+              <a:t>Average Method Count vs. Complexity</a:t>
+            </a:r>
           </a:p>
         </p:txBody>
       </p:sp>
+      <p:pic>
+        <p:nvPicPr>
+          <p:cNvPr id="96260" name="Picture 4" descr="scatter_plot"/>
+          <p:cNvPicPr>
+            <a:picLocks noChangeAspect="1" noChangeArrowheads="1"/>
+          </p:cNvPicPr>
+          <p:nvPr/>
+        </p:nvPicPr>
+        <p:blipFill>
+          <a:blip r:embed="rId2"/>
+          <a:srcRect/>
+          <a:stretch>
+            <a:fillRect/>
+          </a:stretch>
+        </p:blipFill>
+        <p:spPr bwMode="auto">
+          <a:xfrm>
+            <a:off x="1752600" y="1447800"/>
+            <a:ext cx="5486400" cy="5254625"/>
+          </a:xfrm>
+          <a:prstGeom prst="rect">
+            <a:avLst/>
+          </a:prstGeom>
+          <a:noFill/>
+        </p:spPr>
+      </p:pic>
     </p:spTree>
   </p:cSld>
   <p:clrMapOvr>
     <a:masterClrMapping/>
   </p:clrMapOvr>
-  <p:timing>
-    <p:tnLst>
-      <p:par>
-        <p:cTn id="1" dur="indefinite" restart="never" nodeType="tmRoot"/>
-      </p:par>
-    </p:tnLst>
-  </p:timing>
 </p:sld>
 </file>
 
@@ -18910,7 +18987,7 @@
       </p:grpSpPr>
       <p:sp>
         <p:nvSpPr>
-          <p:cNvPr id="82945" name="Title 1"/>
+          <p:cNvPr id="97282" name="Rectangle 2"/>
           <p:cNvSpPr>
             <a:spLocks noGrp="1"/>
           </p:cNvSpPr>
@@ -18923,65 +19000,45 @@
           <a:bodyPr/>
           <a:lstStyle/>
           <a:p>
-            <a:r>
-              <a:rPr lang="en-US" smtClean="0"/>
-              <a:t>Test Software</a:t>
+            <a:pPr eaLnBrk="1" hangingPunct="1"/>
+            <a:r>
+              <a:rPr lang="en-US" smtClean="0"/>
+              <a:t>Histogram</a:t>
             </a:r>
           </a:p>
         </p:txBody>
       </p:sp>
-      <p:sp>
-        <p:nvSpPr>
-          <p:cNvPr id="82946" name="Content Placeholder 2"/>
-          <p:cNvSpPr>
-            <a:spLocks noGrp="1"/>
-          </p:cNvSpPr>
-          <p:nvPr>
-            <p:ph idx="1"/>
-          </p:nvPr>
-        </p:nvSpPr>
-        <p:spPr/>
-        <p:txBody>
-          <a:bodyPr/>
-          <a:lstStyle/>
-          <a:p>
-            <a:r>
-              <a:rPr lang="en-US" smtClean="0"/>
-              <a:t>Test Log</a:t>
-            </a:r>
-          </a:p>
-          <a:p>
-            <a:r>
-              <a:rPr lang="en-US" smtClean="0"/>
-              <a:t>Mantis (Bug Tracker)</a:t>
-            </a:r>
-          </a:p>
-          <a:p>
-            <a:r>
-              <a:rPr lang="en-US" smtClean="0"/>
-              <a:t>NCover</a:t>
-            </a:r>
-          </a:p>
-          <a:p>
-            <a:r>
-              <a:rPr lang="en-US" smtClean="0"/>
-              <a:t>Nunit</a:t>
-            </a:r>
-          </a:p>
-        </p:txBody>
-      </p:sp>
+      <p:pic>
+        <p:nvPicPr>
+          <p:cNvPr id="97284" name="Picture 4" descr="histogram"/>
+          <p:cNvPicPr>
+            <a:picLocks noChangeAspect="1" noChangeArrowheads="1"/>
+          </p:cNvPicPr>
+          <p:nvPr/>
+        </p:nvPicPr>
+        <p:blipFill>
+          <a:blip r:embed="rId2"/>
+          <a:srcRect/>
+          <a:stretch>
+            <a:fillRect/>
+          </a:stretch>
+        </p:blipFill>
+        <p:spPr bwMode="auto">
+          <a:xfrm>
+            <a:off x="1676400" y="1371600"/>
+            <a:ext cx="5410200" cy="5346700"/>
+          </a:xfrm>
+          <a:prstGeom prst="rect">
+            <a:avLst/>
+          </a:prstGeom>
+          <a:noFill/>
+        </p:spPr>
+      </p:pic>
     </p:spTree>
   </p:cSld>
   <p:clrMapOvr>
     <a:masterClrMapping/>
   </p:clrMapOvr>
-  <p:timing>
-    <p:tnLst>
-      <p:par>
-        <p:cTn id="1" dur="indefinite" restart="never" nodeType="tmRoot"/>
-      </p:par>
-    </p:tnLst>
-  </p:timing>
 </p:sld>
 </file>
 
@@ -19004,7 +19061,7 @@
       </p:grpSpPr>
       <p:sp>
         <p:nvSpPr>
-          <p:cNvPr id="83969" name="Title 1"/>
+          <p:cNvPr id="98306" name="Rectangle 2"/>
           <p:cNvSpPr>
             <a:spLocks noGrp="1"/>
           </p:cNvSpPr>
@@ -19017,88 +19074,45 @@
           <a:bodyPr/>
           <a:lstStyle/>
           <a:p>
-            <a:r>
-              <a:rPr lang="en-US" smtClean="0"/>
-              <a:t>Make Test Plan</a:t>
+            <a:pPr eaLnBrk="1" hangingPunct="1"/>
+            <a:r>
+              <a:rPr lang="en-US" smtClean="0"/>
+              <a:t>Kiviat Diagram</a:t>
             </a:r>
           </a:p>
         </p:txBody>
       </p:sp>
-      <p:sp>
-        <p:nvSpPr>
-          <p:cNvPr id="83970" name="Content Placeholder 2"/>
-          <p:cNvSpPr>
-            <a:spLocks noGrp="1"/>
-          </p:cNvSpPr>
-          <p:nvPr>
-            <p:ph idx="1"/>
-          </p:nvPr>
-        </p:nvSpPr>
-        <p:spPr/>
-        <p:txBody>
-          <a:bodyPr/>
-          <a:lstStyle/>
-          <a:p>
-            <a:r>
-              <a:rPr lang="en-US" smtClean="0"/>
-              <a:t>Outlines a systematic approach for testing the entire system.</a:t>
-            </a:r>
-          </a:p>
-          <a:p>
-            <a:r>
-              <a:rPr lang="en-US" smtClean="0"/>
-              <a:t>The test plan will contain:</a:t>
-            </a:r>
-          </a:p>
-          <a:p>
-            <a:pPr lvl="1"/>
-            <a:r>
-              <a:rPr lang="en-US" smtClean="0"/>
-              <a:t>Test inventory</a:t>
-            </a:r>
-          </a:p>
-          <a:p>
-            <a:pPr lvl="1"/>
-            <a:r>
-              <a:rPr lang="en-US" smtClean="0"/>
-              <a:t>Risk analysis (MITS)</a:t>
-            </a:r>
-          </a:p>
-          <a:p>
-            <a:pPr lvl="1"/>
-            <a:r>
-              <a:rPr lang="en-US" smtClean="0"/>
-              <a:t>Test effort estimation</a:t>
-            </a:r>
-          </a:p>
-          <a:p>
-            <a:pPr lvl="1"/>
-            <a:r>
-              <a:rPr lang="en-US" smtClean="0"/>
-              <a:t>Resources</a:t>
-            </a:r>
-          </a:p>
-          <a:p>
-            <a:pPr lvl="1"/>
-            <a:r>
-              <a:rPr lang="en-US" smtClean="0"/>
-              <a:t>Progress tracking</a:t>
-            </a:r>
-          </a:p>
-        </p:txBody>
-      </p:sp>
+      <p:pic>
+        <p:nvPicPr>
+          <p:cNvPr id="98308" name="Picture 4" descr="kiviat"/>
+          <p:cNvPicPr>
+            <a:picLocks noChangeAspect="1" noChangeArrowheads="1"/>
+          </p:cNvPicPr>
+          <p:nvPr/>
+        </p:nvPicPr>
+        <p:blipFill>
+          <a:blip r:embed="rId2"/>
+          <a:srcRect/>
+          <a:stretch>
+            <a:fillRect/>
+          </a:stretch>
+        </p:blipFill>
+        <p:spPr bwMode="auto">
+          <a:xfrm>
+            <a:off x="1981200" y="1371600"/>
+            <a:ext cx="5227638" cy="5334000"/>
+          </a:xfrm>
+          <a:prstGeom prst="rect">
+            <a:avLst/>
+          </a:prstGeom>
+          <a:noFill/>
+        </p:spPr>
+      </p:pic>
     </p:spTree>
   </p:cSld>
   <p:clrMapOvr>
     <a:masterClrMapping/>
   </p:clrMapOvr>
-  <p:timing>
-    <p:tnLst>
-      <p:par>
-        <p:cTn id="1" dur="indefinite" restart="never" nodeType="tmRoot"/>
-      </p:par>
-    </p:tnLst>
-  </p:timing>
 </p:sld>
 </file>
 
@@ -19121,79 +19135,62 @@
       </p:grpSpPr>
       <p:sp>
         <p:nvSpPr>
-          <p:cNvPr id="84993" name="Title 1"/>
+          <p:cNvPr id="81921" name="Title 3"/>
           <p:cNvSpPr>
             <a:spLocks noGrp="1"/>
           </p:cNvSpPr>
           <p:nvPr>
-            <p:ph type="title"/>
+            <p:ph type="ctrTitle"/>
+          </p:nvPr>
+        </p:nvSpPr>
+        <p:spPr>
+          <a:xfrm>
+            <a:off x="990600" y="152400"/>
+            <a:ext cx="7772400" cy="1470025"/>
+          </a:xfrm>
+        </p:spPr>
+        <p:txBody>
+          <a:bodyPr/>
+          <a:lstStyle/>
+          <a:p>
+            <a:pPr eaLnBrk="1" hangingPunct="1"/>
+            <a:r>
+              <a:rPr lang="en-US" smtClean="0"/>
+              <a:t>Transition</a:t>
+            </a:r>
+          </a:p>
+        </p:txBody>
+      </p:sp>
+      <p:sp>
+        <p:nvSpPr>
+          <p:cNvPr id="5" name="Subtitle 4"/>
+          <p:cNvSpPr>
+            <a:spLocks noGrp="1"/>
+          </p:cNvSpPr>
+          <p:nvPr>
+            <p:ph type="subTitle" idx="1"/>
           </p:nvPr>
         </p:nvSpPr>
         <p:spPr/>
         <p:txBody>
-          <a:bodyPr/>
+          <a:bodyPr rtlCol="0">
+            <a:normAutofit/>
+          </a:bodyPr>
           <a:lstStyle/>
           <a:p>
-            <a:r>
-              <a:rPr lang="en-US" smtClean="0"/>
-              <a:t>Building Test Inventory</a:t>
-            </a:r>
-          </a:p>
-        </p:txBody>
-      </p:sp>
-      <p:sp>
-        <p:nvSpPr>
-          <p:cNvPr id="84994" name="Content Placeholder 2"/>
-          <p:cNvSpPr>
-            <a:spLocks noGrp="1"/>
-          </p:cNvSpPr>
-          <p:nvPr>
-            <p:ph idx="1"/>
-          </p:nvPr>
-        </p:nvSpPr>
-        <p:spPr/>
-        <p:txBody>
-          <a:bodyPr/>
-          <a:lstStyle/>
-          <a:p>
-            <a:r>
-              <a:rPr lang="en-US" smtClean="0"/>
-              <a:t>The test inventory contains all possible tests.</a:t>
-            </a:r>
-          </a:p>
-          <a:p>
-            <a:r>
-              <a:rPr lang="en-US" smtClean="0"/>
-              <a:t>Test cases are generated from:</a:t>
-            </a:r>
-          </a:p>
-          <a:p>
-            <a:pPr lvl="1"/>
-            <a:r>
-              <a:rPr lang="en-US" smtClean="0"/>
-              <a:t>Use Cases</a:t>
-            </a:r>
-          </a:p>
-          <a:p>
-            <a:pPr lvl="1"/>
-            <a:r>
-              <a:rPr lang="en-US" smtClean="0"/>
-              <a:t>Requirements</a:t>
-            </a:r>
-          </a:p>
-          <a:p>
-            <a:pPr lvl="1"/>
-            <a:r>
-              <a:rPr lang="en-US" smtClean="0"/>
-              <a:t>Classes and Components</a:t>
-            </a:r>
-          </a:p>
-          <a:p>
-            <a:pPr lvl="1"/>
-            <a:r>
-              <a:rPr lang="en-US" smtClean="0"/>
-              <a:t>Links between components</a:t>
-            </a:r>
+            <a:pPr eaLnBrk="1" fontAlgn="auto" hangingPunct="1">
+              <a:spcAft>
+                <a:spcPts val="0"/>
+              </a:spcAft>
+              <a:buFont typeface="Arial" pitchFamily="34" charset="0"/>
+              <a:buNone/>
+              <a:defRPr/>
+            </a:pPr>
+            <a:r>
+              <a:rPr lang="en-US" dirty="0" smtClean="0"/>
+              <a:t>Test and Deploy</a:t>
+            </a:r>
+            <a:endParaRPr lang="en-US" dirty="0"/>
           </a:p>
         </p:txBody>
       </p:sp>
@@ -19231,7 +19228,7 @@
       </p:grpSpPr>
       <p:sp>
         <p:nvSpPr>
-          <p:cNvPr id="86017" name="Title 1"/>
+          <p:cNvPr id="82945" name="Title 1"/>
           <p:cNvSpPr>
             <a:spLocks noGrp="1"/>
           </p:cNvSpPr>
@@ -19244,16 +19241,17 @@
           <a:bodyPr/>
           <a:lstStyle/>
           <a:p>
-            <a:r>
-              <a:rPr lang="en-US" smtClean="0"/>
-              <a:t>Test Case Estimation</a:t>
+            <a:pPr eaLnBrk="1" hangingPunct="1"/>
+            <a:r>
+              <a:rPr lang="en-US" smtClean="0"/>
+              <a:t>Test Software</a:t>
             </a:r>
           </a:p>
         </p:txBody>
       </p:sp>
       <p:sp>
         <p:nvSpPr>
-          <p:cNvPr id="86018" name="Content Placeholder 2"/>
+          <p:cNvPr id="82946" name="Content Placeholder 2"/>
           <p:cNvSpPr>
             <a:spLocks noGrp="1"/>
           </p:cNvSpPr>
@@ -19266,33 +19264,31 @@
           <a:bodyPr/>
           <a:lstStyle/>
           <a:p>
-            <a:r>
-              <a:rPr lang="en-US" smtClean="0"/>
-              <a:t>After consideration of McCabe Metrics, it was found that the program is very large.</a:t>
-            </a:r>
-          </a:p>
-          <a:p>
-            <a:r>
-              <a:rPr lang="en-US" smtClean="0"/>
-              <a:t>Over 713 functions would require &gt;= 713 possible unit tests.</a:t>
-            </a:r>
-          </a:p>
-          <a:p>
-            <a:r>
-              <a:rPr lang="en-US" smtClean="0"/>
-              <a:t>Each unit test would take &gt; 30 minutes to perform and implement.</a:t>
-            </a:r>
-          </a:p>
-          <a:p>
-            <a:r>
-              <a:rPr lang="en-US" smtClean="0"/>
-              <a:t>An estimation of the total number of possible test cases is 2097.</a:t>
-            </a:r>
-          </a:p>
-          <a:p>
-            <a:r>
-              <a:rPr lang="en-US" smtClean="0"/>
-              <a:t>THERE ARE TOO MANY!!!!!</a:t>
+            <a:pPr eaLnBrk="1" hangingPunct="1"/>
+            <a:r>
+              <a:rPr lang="en-US" smtClean="0"/>
+              <a:t>Test Log</a:t>
+            </a:r>
+          </a:p>
+          <a:p>
+            <a:pPr eaLnBrk="1" hangingPunct="1"/>
+            <a:r>
+              <a:rPr lang="en-US" smtClean="0"/>
+              <a:t>Mantis (Bug Tracker)</a:t>
+            </a:r>
+          </a:p>
+          <a:p>
+            <a:pPr eaLnBrk="1" hangingPunct="1"/>
+            <a:r>
+              <a:rPr lang="en-US" smtClean="0"/>
+              <a:t>NCover</a:t>
+            </a:r>
+          </a:p>
+          <a:p>
+            <a:pPr eaLnBrk="1" hangingPunct="1"/>
+            <a:r>
+              <a:rPr lang="en-US" smtClean="0"/>
+              <a:t>Nunit</a:t>
             </a:r>
           </a:p>
         </p:txBody>
@@ -19331,7 +19327,7 @@
       </p:grpSpPr>
       <p:sp>
         <p:nvSpPr>
-          <p:cNvPr id="87041" name="Title 1"/>
+          <p:cNvPr id="83969" name="Title 1"/>
           <p:cNvSpPr>
             <a:spLocks noGrp="1"/>
           </p:cNvSpPr>
@@ -19344,16 +19340,17 @@
           <a:bodyPr/>
           <a:lstStyle/>
           <a:p>
-            <a:r>
-              <a:rPr lang="en-US" smtClean="0"/>
-              <a:t>Risk Analysis</a:t>
+            <a:pPr eaLnBrk="1" hangingPunct="1"/>
+            <a:r>
+              <a:rPr lang="en-US" smtClean="0"/>
+              <a:t>Make Test Plan</a:t>
             </a:r>
           </a:p>
         </p:txBody>
       </p:sp>
       <p:sp>
         <p:nvSpPr>
-          <p:cNvPr id="87042" name="Content Placeholder 2"/>
+          <p:cNvPr id="83970" name="Content Placeholder 2"/>
           <p:cNvSpPr>
             <a:spLocks noGrp="1"/>
           </p:cNvSpPr>
@@ -19366,47 +19363,52 @@
           <a:bodyPr/>
           <a:lstStyle/>
           <a:p>
-            <a:r>
-              <a:rPr lang="en-US" smtClean="0"/>
-              <a:t>Using MITS Risk Analysis</a:t>
-            </a:r>
-          </a:p>
-          <a:p>
-            <a:r>
-              <a:rPr lang="en-US" smtClean="0"/>
-              <a:t>Each test case was categorized by:</a:t>
-            </a:r>
-          </a:p>
-          <a:p>
-            <a:pPr lvl="1"/>
-            <a:r>
-              <a:rPr lang="en-US" smtClean="0"/>
-              <a:t>Severity</a:t>
-            </a:r>
-          </a:p>
-          <a:p>
-            <a:pPr lvl="1"/>
-            <a:r>
-              <a:rPr lang="en-US" smtClean="0"/>
-              <a:t>Cost</a:t>
-            </a:r>
-          </a:p>
-          <a:p>
-            <a:r>
-              <a:rPr lang="en-US" smtClean="0"/>
-              <a:t>Each category was given a weight.</a:t>
-            </a:r>
-          </a:p>
-          <a:p>
-            <a:r>
-              <a:rPr lang="en-US" smtClean="0"/>
-              <a:t>The average of the weights were determined for each test case to produce a priority.</a:t>
-            </a:r>
-          </a:p>
-          <a:p>
-            <a:r>
-              <a:rPr lang="en-US" smtClean="0"/>
-              <a:t>The priority determined the test ordering.</a:t>
+            <a:pPr eaLnBrk="1" hangingPunct="1"/>
+            <a:r>
+              <a:rPr lang="en-US" smtClean="0"/>
+              <a:t>Outlines a systematic approach for testing the entire system.</a:t>
+            </a:r>
+          </a:p>
+          <a:p>
+            <a:pPr eaLnBrk="1" hangingPunct="1"/>
+            <a:r>
+              <a:rPr lang="en-US" smtClean="0"/>
+              <a:t>The test plan will contain:</a:t>
+            </a:r>
+          </a:p>
+          <a:p>
+            <a:pPr lvl="1" eaLnBrk="1" hangingPunct="1"/>
+            <a:r>
+              <a:rPr lang="en-US" smtClean="0"/>
+              <a:t>Test inventory</a:t>
+            </a:r>
+          </a:p>
+          <a:p>
+            <a:pPr lvl="1" eaLnBrk="1" hangingPunct="1"/>
+            <a:r>
+              <a:rPr lang="en-US" smtClean="0"/>
+              <a:t>Risk analysis (MITS)</a:t>
+            </a:r>
+          </a:p>
+          <a:p>
+            <a:pPr lvl="1" eaLnBrk="1" hangingPunct="1"/>
+            <a:r>
+              <a:rPr lang="en-US" smtClean="0"/>
+              <a:t>Test effort estimation</a:t>
+            </a:r>
+          </a:p>
+          <a:p>
+            <a:pPr lvl="1" eaLnBrk="1" hangingPunct="1"/>
+            <a:r>
+              <a:rPr lang="en-US" smtClean="0"/>
+              <a:t>Resources</a:t>
+            </a:r>
+          </a:p>
+          <a:p>
+            <a:pPr lvl="1" eaLnBrk="1" hangingPunct="1"/>
+            <a:r>
+              <a:rPr lang="en-US" smtClean="0"/>
+              <a:t>Progress tracking</a:t>
             </a:r>
           </a:p>
         </p:txBody>
@@ -19445,7 +19447,7 @@
       </p:grpSpPr>
       <p:sp>
         <p:nvSpPr>
-          <p:cNvPr id="88065" name="Title 1"/>
+          <p:cNvPr id="84993" name="Title 1"/>
           <p:cNvSpPr>
             <a:spLocks noGrp="1"/>
           </p:cNvSpPr>
@@ -19458,16 +19460,17 @@
           <a:bodyPr/>
           <a:lstStyle/>
           <a:p>
-            <a:r>
-              <a:rPr lang="en-US" smtClean="0"/>
-              <a:t>Test Cases (that survived)</a:t>
+            <a:pPr eaLnBrk="1" hangingPunct="1"/>
+            <a:r>
+              <a:rPr lang="en-US" smtClean="0"/>
+              <a:t>Building Test Inventory</a:t>
             </a:r>
           </a:p>
         </p:txBody>
       </p:sp>
       <p:sp>
         <p:nvSpPr>
-          <p:cNvPr id="88066" name="Content Placeholder 2"/>
+          <p:cNvPr id="84994" name="Content Placeholder 2"/>
           <p:cNvSpPr>
             <a:spLocks noGrp="1"/>
           </p:cNvSpPr>
@@ -19480,42 +19483,46 @@
           <a:bodyPr/>
           <a:lstStyle/>
           <a:p>
-            <a:r>
-              <a:rPr lang="en-US" smtClean="0"/>
-              <a:t>Acceptance Tests – test for requirement validation.</a:t>
-            </a:r>
-          </a:p>
-          <a:p>
-            <a:pPr lvl="1"/>
-            <a:r>
-              <a:rPr lang="en-US" smtClean="0"/>
-              <a:t>Menu screen test to begin game and select options.</a:t>
-            </a:r>
-          </a:p>
-          <a:p>
-            <a:pPr lvl="1"/>
-            <a:r>
-              <a:rPr lang="en-US" smtClean="0"/>
-              <a:t>Cursor test for GUI.</a:t>
-            </a:r>
-          </a:p>
-          <a:p>
-            <a:pPr lvl="1"/>
-            <a:r>
-              <a:rPr lang="en-US" smtClean="0"/>
-              <a:t>Split screen test for game play.</a:t>
-            </a:r>
-          </a:p>
-          <a:p>
-            <a:pPr lvl="1"/>
-            <a:r>
-              <a:rPr lang="en-US" smtClean="0"/>
-              <a:t>Game stats test for game play.</a:t>
-            </a:r>
-          </a:p>
-          <a:p>
-            <a:pPr lvl="1"/>
-            <a:endParaRPr lang="en-US" smtClean="0"/>
+            <a:pPr eaLnBrk="1" hangingPunct="1"/>
+            <a:r>
+              <a:rPr lang="en-US" smtClean="0"/>
+              <a:t>The test inventory contains all possible tests.</a:t>
+            </a:r>
+          </a:p>
+          <a:p>
+            <a:pPr eaLnBrk="1" hangingPunct="1"/>
+            <a:r>
+              <a:rPr lang="en-US" smtClean="0"/>
+              <a:t>Test cases are generated from:</a:t>
+            </a:r>
+          </a:p>
+          <a:p>
+            <a:pPr lvl="1" eaLnBrk="1" hangingPunct="1"/>
+            <a:r>
+              <a:rPr lang="en-US" smtClean="0"/>
+              <a:t>Use Cases</a:t>
+            </a:r>
+          </a:p>
+          <a:p>
+            <a:pPr lvl="1" eaLnBrk="1" hangingPunct="1"/>
+            <a:r>
+              <a:rPr lang="en-US" smtClean="0"/>
+              <a:t>Requirements</a:t>
+            </a:r>
+          </a:p>
+          <a:p>
+            <a:pPr lvl="1" eaLnBrk="1" hangingPunct="1"/>
+            <a:r>
+              <a:rPr lang="en-US" smtClean="0"/>
+              <a:t>Classes and Components</a:t>
+            </a:r>
+          </a:p>
+          <a:p>
+            <a:pPr lvl="1" eaLnBrk="1" hangingPunct="1"/>
+            <a:r>
+              <a:rPr lang="en-US" smtClean="0"/>
+              <a:t>Links between components</a:t>
+            </a:r>
           </a:p>
         </p:txBody>
       </p:sp>
@@ -19553,7 +19560,7 @@
       </p:grpSpPr>
       <p:sp>
         <p:nvSpPr>
-          <p:cNvPr id="89089" name="Title 1"/>
+          <p:cNvPr id="86017" name="Title 1"/>
           <p:cNvSpPr>
             <a:spLocks noGrp="1"/>
           </p:cNvSpPr>
@@ -19566,16 +19573,17 @@
           <a:bodyPr/>
           <a:lstStyle/>
           <a:p>
-            <a:r>
-              <a:rPr lang="en-US" smtClean="0"/>
-              <a:t>Test Cases (that survived)</a:t>
+            <a:pPr eaLnBrk="1" hangingPunct="1"/>
+            <a:r>
+              <a:rPr lang="en-US" smtClean="0"/>
+              <a:t>Test Case Estimation</a:t>
             </a:r>
           </a:p>
         </p:txBody>
       </p:sp>
       <p:sp>
         <p:nvSpPr>
-          <p:cNvPr id="89090" name="Content Placeholder 2"/>
+          <p:cNvPr id="86018" name="Content Placeholder 2"/>
           <p:cNvSpPr>
             <a:spLocks noGrp="1"/>
           </p:cNvSpPr>
@@ -19588,30 +19596,38 @@
           <a:bodyPr/>
           <a:lstStyle/>
           <a:p>
-            <a:r>
-              <a:rPr lang="en-US" smtClean="0"/>
-              <a:t>System Tests</a:t>
-            </a:r>
-          </a:p>
-          <a:p>
-            <a:pPr lvl="1"/>
-            <a:r>
-              <a:rPr lang="en-US" smtClean="0"/>
-              <a:t>Test the make sure cube start shuffled.</a:t>
-            </a:r>
-          </a:p>
-          <a:p>
-            <a:pPr lvl="1"/>
-            <a:r>
-              <a:rPr lang="en-US" smtClean="0"/>
-              <a:t>Test to see game goes to the title screen after a win.</a:t>
-            </a:r>
-          </a:p>
-          <a:p>
-            <a:pPr lvl="1"/>
-            <a:r>
-              <a:rPr lang="en-US" smtClean="0"/>
-              <a:t>Test to see the cursor makes a sound when rotating.</a:t>
+            <a:pPr eaLnBrk="1" hangingPunct="1"/>
+            <a:r>
+              <a:rPr lang="en-US" smtClean="0"/>
+              <a:t>After consideration of McCabe Metrics, it was found that the program is very large.</a:t>
+            </a:r>
+          </a:p>
+          <a:p>
+            <a:pPr eaLnBrk="1" hangingPunct="1"/>
+            <a:r>
+              <a:rPr lang="en-US" smtClean="0"/>
+              <a:t>Over 713 functions would require &gt;= 713 possible unit tests.</a:t>
+            </a:r>
+          </a:p>
+          <a:p>
+            <a:pPr eaLnBrk="1" hangingPunct="1"/>
+            <a:r>
+              <a:rPr lang="en-US" smtClean="0"/>
+              <a:t>Each unit test would take &gt; 30 minutes to perform and implement.</a:t>
+            </a:r>
+          </a:p>
+          <a:p>
+            <a:pPr eaLnBrk="1" hangingPunct="1"/>
+            <a:r>
+              <a:rPr lang="en-US" smtClean="0"/>
+              <a:t>An estimation of the total number of possible test cases is 2097.</a:t>
+            </a:r>
+          </a:p>
+          <a:p>
+            <a:pPr eaLnBrk="1" hangingPunct="1"/>
+            <a:r>
+              <a:rPr lang="en-US" smtClean="0"/>
+              <a:t>THERE ARE TOO MANY!!!!!</a:t>
             </a:r>
           </a:p>
         </p:txBody>
@@ -19650,7 +19666,7 @@
       </p:grpSpPr>
       <p:sp>
         <p:nvSpPr>
-          <p:cNvPr id="90113" name="Title 1"/>
+          <p:cNvPr id="87041" name="Title 1"/>
           <p:cNvSpPr>
             <a:spLocks noGrp="1"/>
           </p:cNvSpPr>
@@ -19663,16 +19679,17 @@
           <a:bodyPr/>
           <a:lstStyle/>
           <a:p>
-            <a:r>
-              <a:rPr lang="en-US" smtClean="0"/>
-              <a:t>Test Cases (that survived)</a:t>
+            <a:pPr eaLnBrk="1" hangingPunct="1"/>
+            <a:r>
+              <a:rPr lang="en-US" smtClean="0"/>
+              <a:t>Risk Analysis</a:t>
             </a:r>
           </a:p>
         </p:txBody>
       </p:sp>
       <p:sp>
         <p:nvSpPr>
-          <p:cNvPr id="90114" name="Content Placeholder 2"/>
+          <p:cNvPr id="87042" name="Content Placeholder 2"/>
           <p:cNvSpPr>
             <a:spLocks noGrp="1"/>
           </p:cNvSpPr>
@@ -19685,30 +19702,52 @@
           <a:bodyPr/>
           <a:lstStyle/>
           <a:p>
-            <a:r>
-              <a:rPr lang="en-US" smtClean="0"/>
-              <a:t>Integration Tests</a:t>
-            </a:r>
-          </a:p>
-          <a:p>
-            <a:pPr lvl="1"/>
-            <a:r>
-              <a:rPr lang="en-US" smtClean="0"/>
-              <a:t>Test to see if a scene was drawn and updated.</a:t>
-            </a:r>
-          </a:p>
-          <a:p>
-            <a:pPr lvl="1"/>
-            <a:r>
-              <a:rPr lang="en-US" smtClean="0"/>
-              <a:t>Test to see if picking subsystem works.</a:t>
-            </a:r>
-          </a:p>
-          <a:p>
-            <a:pPr lvl="1"/>
-            <a:r>
-              <a:rPr lang="en-US" smtClean="0"/>
-              <a:t>Test to see if GUI receives an input.</a:t>
+            <a:pPr eaLnBrk="1" hangingPunct="1"/>
+            <a:r>
+              <a:rPr lang="en-US" smtClean="0"/>
+              <a:t>Using MITS Risk Analysis</a:t>
+            </a:r>
+          </a:p>
+          <a:p>
+            <a:pPr eaLnBrk="1" hangingPunct="1"/>
+            <a:r>
+              <a:rPr lang="en-US" smtClean="0"/>
+              <a:t>Each test case was categorized by:</a:t>
+            </a:r>
+          </a:p>
+          <a:p>
+            <a:pPr lvl="1" eaLnBrk="1" hangingPunct="1"/>
+            <a:r>
+              <a:rPr lang="en-US" smtClean="0"/>
+              <a:t>Severity</a:t>
+            </a:r>
+          </a:p>
+          <a:p>
+            <a:pPr lvl="1" eaLnBrk="1" hangingPunct="1"/>
+            <a:r>
+              <a:rPr lang="en-US" smtClean="0"/>
+              <a:t>Cost</a:t>
+            </a:r>
+          </a:p>
+          <a:p>
+            <a:pPr eaLnBrk="1" hangingPunct="1"/>
+            <a:r>
+              <a:rPr lang="en-US" smtClean="0"/>
+              <a:t>Each category was given a weight.</a:t>
+            </a:r>
+          </a:p>
+          <a:p>
+            <a:pPr eaLnBrk="1" hangingPunct="1"/>
+            <a:r>
+              <a:rPr lang="en-US" smtClean="0"/>
+              <a:t>The average of the weights were determined for each test case to produce a priority.</a:t>
+            </a:r>
+          </a:p>
+          <a:p>
+            <a:pPr eaLnBrk="1" hangingPunct="1"/>
+            <a:r>
+              <a:rPr lang="en-US" smtClean="0"/>
+              <a:t>The priority determined the test ordering.</a:t>
             </a:r>
           </a:p>
         </p:txBody>
@@ -19747,7 +19786,7 @@
       </p:grpSpPr>
       <p:sp>
         <p:nvSpPr>
-          <p:cNvPr id="91137" name="Title 1"/>
+          <p:cNvPr id="88065" name="Title 1"/>
           <p:cNvSpPr>
             <a:spLocks noGrp="1"/>
           </p:cNvSpPr>
@@ -19760,16 +19799,17 @@
           <a:bodyPr/>
           <a:lstStyle/>
           <a:p>
-            <a:r>
-              <a:rPr lang="en-US" smtClean="0"/>
-              <a:t>Test Cases After MITS</a:t>
+            <a:pPr eaLnBrk="1" hangingPunct="1"/>
+            <a:r>
+              <a:rPr lang="en-US" smtClean="0"/>
+              <a:t>Test Cases (that survived)</a:t>
             </a:r>
           </a:p>
         </p:txBody>
       </p:sp>
       <p:sp>
         <p:nvSpPr>
-          <p:cNvPr id="91138" name="Content Placeholder 2"/>
+          <p:cNvPr id="88066" name="Content Placeholder 2"/>
           <p:cNvSpPr>
             <a:spLocks noGrp="1"/>
           </p:cNvSpPr>
@@ -19782,16 +19822,43 @@
           <a:bodyPr/>
           <a:lstStyle/>
           <a:p>
-            <a:r>
-              <a:rPr lang="en-US" smtClean="0"/>
-              <a:t>No Unit Tests survived the MITS Risk Analysis.</a:t>
-            </a:r>
-          </a:p>
-          <a:p>
-            <a:r>
-              <a:rPr lang="en-US" smtClean="0"/>
-              <a:t>We made sure that every requirement was covered in test case selection.</a:t>
-            </a:r>
+            <a:pPr eaLnBrk="1" hangingPunct="1"/>
+            <a:r>
+              <a:rPr lang="en-US" smtClean="0"/>
+              <a:t>Acceptance Tests – test for requirement validation.</a:t>
+            </a:r>
+          </a:p>
+          <a:p>
+            <a:pPr lvl="1" eaLnBrk="1" hangingPunct="1"/>
+            <a:r>
+              <a:rPr lang="en-US" smtClean="0"/>
+              <a:t>Menu screen test to begin game and select options.</a:t>
+            </a:r>
+          </a:p>
+          <a:p>
+            <a:pPr lvl="1" eaLnBrk="1" hangingPunct="1"/>
+            <a:r>
+              <a:rPr lang="en-US" smtClean="0"/>
+              <a:t>Cursor test for GUI.</a:t>
+            </a:r>
+          </a:p>
+          <a:p>
+            <a:pPr lvl="1" eaLnBrk="1" hangingPunct="1"/>
+            <a:r>
+              <a:rPr lang="en-US" smtClean="0"/>
+              <a:t>Split screen test for game play.</a:t>
+            </a:r>
+          </a:p>
+          <a:p>
+            <a:pPr lvl="1" eaLnBrk="1" hangingPunct="1"/>
+            <a:r>
+              <a:rPr lang="en-US" smtClean="0"/>
+              <a:t>Game stats test for game play.</a:t>
+            </a:r>
+          </a:p>
+          <a:p>
+            <a:pPr lvl="1" eaLnBrk="1" hangingPunct="1"/>
+            <a:endParaRPr lang="en-US" smtClean="0"/>
           </a:p>
         </p:txBody>
       </p:sp>
@@ -19842,6 +19909,7 @@
           <a:bodyPr/>
           <a:lstStyle/>
           <a:p>
+            <a:pPr eaLnBrk="1" hangingPunct="1"/>
             <a:r>
               <a:rPr lang="en-US" smtClean="0"/>
               <a:t>Choosing Client</a:t>
@@ -19864,18 +19932,21 @@
           <a:bodyPr/>
           <a:lstStyle/>
           <a:p>
+            <a:pPr eaLnBrk="1" hangingPunct="1"/>
             <a:r>
               <a:rPr lang="en-US" smtClean="0"/>
               <a:t>We are not looking at one customer</a:t>
             </a:r>
           </a:p>
           <a:p>
+            <a:pPr eaLnBrk="1" hangingPunct="1"/>
             <a:r>
               <a:rPr lang="en-US" smtClean="0"/>
               <a:t>We are looking at a group of potential customers and catering our requirement for them</a:t>
             </a:r>
           </a:p>
           <a:p>
+            <a:pPr eaLnBrk="1" hangingPunct="1"/>
             <a:r>
               <a:rPr lang="en-US" smtClean="0"/>
               <a:t>Leaning towards the population that interested in puzzle games in a competitive environment</a:t>
@@ -19917,6 +19988,289 @@
       </p:grpSpPr>
       <p:sp>
         <p:nvSpPr>
+          <p:cNvPr id="89089" name="Title 1"/>
+          <p:cNvSpPr>
+            <a:spLocks noGrp="1"/>
+          </p:cNvSpPr>
+          <p:nvPr>
+            <p:ph type="title"/>
+          </p:nvPr>
+        </p:nvSpPr>
+        <p:spPr/>
+        <p:txBody>
+          <a:bodyPr/>
+          <a:lstStyle/>
+          <a:p>
+            <a:pPr eaLnBrk="1" hangingPunct="1"/>
+            <a:r>
+              <a:rPr lang="en-US" smtClean="0"/>
+              <a:t>Test Cases (that survived)</a:t>
+            </a:r>
+          </a:p>
+        </p:txBody>
+      </p:sp>
+      <p:sp>
+        <p:nvSpPr>
+          <p:cNvPr id="89090" name="Content Placeholder 2"/>
+          <p:cNvSpPr>
+            <a:spLocks noGrp="1"/>
+          </p:cNvSpPr>
+          <p:nvPr>
+            <p:ph idx="1"/>
+          </p:nvPr>
+        </p:nvSpPr>
+        <p:spPr/>
+        <p:txBody>
+          <a:bodyPr/>
+          <a:lstStyle/>
+          <a:p>
+            <a:pPr eaLnBrk="1" hangingPunct="1"/>
+            <a:r>
+              <a:rPr lang="en-US" smtClean="0"/>
+              <a:t>System Tests</a:t>
+            </a:r>
+          </a:p>
+          <a:p>
+            <a:pPr lvl="1" eaLnBrk="1" hangingPunct="1"/>
+            <a:r>
+              <a:rPr lang="en-US" smtClean="0"/>
+              <a:t>Test the make sure cube start shuffled.</a:t>
+            </a:r>
+          </a:p>
+          <a:p>
+            <a:pPr lvl="1" eaLnBrk="1" hangingPunct="1"/>
+            <a:r>
+              <a:rPr lang="en-US" smtClean="0"/>
+              <a:t>Test to see game goes to the title screen after a win.</a:t>
+            </a:r>
+          </a:p>
+          <a:p>
+            <a:pPr lvl="1" eaLnBrk="1" hangingPunct="1"/>
+            <a:r>
+              <a:rPr lang="en-US" smtClean="0"/>
+              <a:t>Test to see the cursor makes a sound when rotating.</a:t>
+            </a:r>
+          </a:p>
+        </p:txBody>
+      </p:sp>
+    </p:spTree>
+  </p:cSld>
+  <p:clrMapOvr>
+    <a:masterClrMapping/>
+  </p:clrMapOvr>
+  <p:timing>
+    <p:tnLst>
+      <p:par>
+        <p:cTn id="1" dur="indefinite" restart="never" nodeType="tmRoot"/>
+      </p:par>
+    </p:tnLst>
+  </p:timing>
+</p:sld>
+</file>
+
+<file path=ppt/slides/slide61.xml><?xml version="1.0" encoding="utf-8"?>
+<p:sld xmlns:a="http://schemas.openxmlformats.org/drawingml/2006/main" xmlns:r="http://schemas.openxmlformats.org/officeDocument/2006/relationships" xmlns:p="http://schemas.openxmlformats.org/presentationml/2006/main">
+  <p:cSld>
+    <p:spTree>
+      <p:nvGrpSpPr>
+        <p:cNvPr id="1" name=""/>
+        <p:cNvGrpSpPr/>
+        <p:nvPr/>
+      </p:nvGrpSpPr>
+      <p:grpSpPr>
+        <a:xfrm>
+          <a:off x="0" y="0"/>
+          <a:ext cx="0" cy="0"/>
+          <a:chOff x="0" y="0"/>
+          <a:chExt cx="0" cy="0"/>
+        </a:xfrm>
+      </p:grpSpPr>
+      <p:sp>
+        <p:nvSpPr>
+          <p:cNvPr id="90113" name="Title 1"/>
+          <p:cNvSpPr>
+            <a:spLocks noGrp="1"/>
+          </p:cNvSpPr>
+          <p:nvPr>
+            <p:ph type="title"/>
+          </p:nvPr>
+        </p:nvSpPr>
+        <p:spPr/>
+        <p:txBody>
+          <a:bodyPr/>
+          <a:lstStyle/>
+          <a:p>
+            <a:pPr eaLnBrk="1" hangingPunct="1"/>
+            <a:r>
+              <a:rPr lang="en-US" smtClean="0"/>
+              <a:t>Test Cases (that survived)</a:t>
+            </a:r>
+          </a:p>
+        </p:txBody>
+      </p:sp>
+      <p:sp>
+        <p:nvSpPr>
+          <p:cNvPr id="90114" name="Content Placeholder 2"/>
+          <p:cNvSpPr>
+            <a:spLocks noGrp="1"/>
+          </p:cNvSpPr>
+          <p:nvPr>
+            <p:ph idx="1"/>
+          </p:nvPr>
+        </p:nvSpPr>
+        <p:spPr/>
+        <p:txBody>
+          <a:bodyPr/>
+          <a:lstStyle/>
+          <a:p>
+            <a:pPr eaLnBrk="1" hangingPunct="1"/>
+            <a:r>
+              <a:rPr lang="en-US" smtClean="0"/>
+              <a:t>Integration Tests</a:t>
+            </a:r>
+          </a:p>
+          <a:p>
+            <a:pPr lvl="1" eaLnBrk="1" hangingPunct="1"/>
+            <a:r>
+              <a:rPr lang="en-US" smtClean="0"/>
+              <a:t>Test to see if a scene was drawn and updated.</a:t>
+            </a:r>
+          </a:p>
+          <a:p>
+            <a:pPr lvl="1" eaLnBrk="1" hangingPunct="1"/>
+            <a:r>
+              <a:rPr lang="en-US" smtClean="0"/>
+              <a:t>Test to see if picking subsystem works.</a:t>
+            </a:r>
+          </a:p>
+          <a:p>
+            <a:pPr lvl="1" eaLnBrk="1" hangingPunct="1"/>
+            <a:r>
+              <a:rPr lang="en-US" smtClean="0"/>
+              <a:t>Test to see if GUI receives an input.</a:t>
+            </a:r>
+          </a:p>
+        </p:txBody>
+      </p:sp>
+    </p:spTree>
+  </p:cSld>
+  <p:clrMapOvr>
+    <a:masterClrMapping/>
+  </p:clrMapOvr>
+  <p:timing>
+    <p:tnLst>
+      <p:par>
+        <p:cTn id="1" dur="indefinite" restart="never" nodeType="tmRoot"/>
+      </p:par>
+    </p:tnLst>
+  </p:timing>
+</p:sld>
+</file>
+
+<file path=ppt/slides/slide62.xml><?xml version="1.0" encoding="utf-8"?>
+<p:sld xmlns:a="http://schemas.openxmlformats.org/drawingml/2006/main" xmlns:r="http://schemas.openxmlformats.org/officeDocument/2006/relationships" xmlns:p="http://schemas.openxmlformats.org/presentationml/2006/main">
+  <p:cSld>
+    <p:spTree>
+      <p:nvGrpSpPr>
+        <p:cNvPr id="1" name=""/>
+        <p:cNvGrpSpPr/>
+        <p:nvPr/>
+      </p:nvGrpSpPr>
+      <p:grpSpPr>
+        <a:xfrm>
+          <a:off x="0" y="0"/>
+          <a:ext cx="0" cy="0"/>
+          <a:chOff x="0" y="0"/>
+          <a:chExt cx="0" cy="0"/>
+        </a:xfrm>
+      </p:grpSpPr>
+      <p:sp>
+        <p:nvSpPr>
+          <p:cNvPr id="91137" name="Title 1"/>
+          <p:cNvSpPr>
+            <a:spLocks noGrp="1"/>
+          </p:cNvSpPr>
+          <p:nvPr>
+            <p:ph type="title"/>
+          </p:nvPr>
+        </p:nvSpPr>
+        <p:spPr/>
+        <p:txBody>
+          <a:bodyPr/>
+          <a:lstStyle/>
+          <a:p>
+            <a:pPr eaLnBrk="1" hangingPunct="1"/>
+            <a:r>
+              <a:rPr lang="en-US" smtClean="0"/>
+              <a:t>Test Cases After MITS</a:t>
+            </a:r>
+          </a:p>
+        </p:txBody>
+      </p:sp>
+      <p:sp>
+        <p:nvSpPr>
+          <p:cNvPr id="91138" name="Content Placeholder 2"/>
+          <p:cNvSpPr>
+            <a:spLocks noGrp="1"/>
+          </p:cNvSpPr>
+          <p:nvPr>
+            <p:ph idx="1"/>
+          </p:nvPr>
+        </p:nvSpPr>
+        <p:spPr/>
+        <p:txBody>
+          <a:bodyPr/>
+          <a:lstStyle/>
+          <a:p>
+            <a:pPr eaLnBrk="1" hangingPunct="1"/>
+            <a:r>
+              <a:rPr lang="en-US" smtClean="0"/>
+              <a:t>No Unit Tests survived the MITS Risk Analysis.</a:t>
+            </a:r>
+          </a:p>
+          <a:p>
+            <a:pPr eaLnBrk="1" hangingPunct="1"/>
+            <a:r>
+              <a:rPr lang="en-US" smtClean="0"/>
+              <a:t>We made sure that every requirement was covered in test case selection.</a:t>
+            </a:r>
+          </a:p>
+        </p:txBody>
+      </p:sp>
+    </p:spTree>
+  </p:cSld>
+  <p:clrMapOvr>
+    <a:masterClrMapping/>
+  </p:clrMapOvr>
+  <p:timing>
+    <p:tnLst>
+      <p:par>
+        <p:cTn id="1" dur="indefinite" restart="never" nodeType="tmRoot"/>
+      </p:par>
+    </p:tnLst>
+  </p:timing>
+</p:sld>
+</file>
+
+<file path=ppt/slides/slide63.xml><?xml version="1.0" encoding="utf-8"?>
+<p:sld xmlns:a="http://schemas.openxmlformats.org/drawingml/2006/main" xmlns:r="http://schemas.openxmlformats.org/officeDocument/2006/relationships" xmlns:p="http://schemas.openxmlformats.org/presentationml/2006/main">
+  <p:cSld>
+    <p:spTree>
+      <p:nvGrpSpPr>
+        <p:cNvPr id="1" name=""/>
+        <p:cNvGrpSpPr/>
+        <p:nvPr/>
+      </p:nvGrpSpPr>
+      <p:grpSpPr>
+        <a:xfrm>
+          <a:off x="0" y="0"/>
+          <a:ext cx="0" cy="0"/>
+          <a:chOff x="0" y="0"/>
+          <a:chExt cx="0" cy="0"/>
+        </a:xfrm>
+      </p:grpSpPr>
+      <p:sp>
+        <p:nvSpPr>
           <p:cNvPr id="92161" name="Title 1"/>
           <p:cNvSpPr>
             <a:spLocks noGrp="1"/>
@@ -19935,6 +20289,7 @@
           <a:bodyPr/>
           <a:lstStyle/>
           <a:p>
+            <a:pPr eaLnBrk="1" hangingPunct="1"/>
             <a:r>
               <a:rPr lang="en-US" smtClean="0"/>
               <a:t>Test Status</a:t>
@@ -19957,6 +20312,7 @@
           <a:bodyPr/>
           <a:lstStyle/>
           <a:p>
+            <a:pPr eaLnBrk="1" hangingPunct="1"/>
             <a:endParaRPr lang="en-US" smtClean="0"/>
           </a:p>
         </p:txBody>
@@ -20008,7 +20364,95 @@
 </p:sld>
 </file>
 
-<file path=ppt/slides/slide61.xml><?xml version="1.0" encoding="utf-8"?>
+<file path=ppt/slides/slide64.xml><?xml version="1.0" encoding="utf-8"?>
+<p:sld xmlns:a="http://schemas.openxmlformats.org/drawingml/2006/main" xmlns:r="http://schemas.openxmlformats.org/officeDocument/2006/relationships" xmlns:p="http://schemas.openxmlformats.org/presentationml/2006/main">
+  <p:cSld>
+    <p:spTree>
+      <p:nvGrpSpPr>
+        <p:cNvPr id="1" name=""/>
+        <p:cNvGrpSpPr/>
+        <p:nvPr/>
+      </p:nvGrpSpPr>
+      <p:grpSpPr>
+        <a:xfrm>
+          <a:off x="0" y="0"/>
+          <a:ext cx="0" cy="0"/>
+          <a:chOff x="0" y="0"/>
+          <a:chExt cx="0" cy="0"/>
+        </a:xfrm>
+      </p:grpSpPr>
+      <p:sp>
+        <p:nvSpPr>
+          <p:cNvPr id="100354" name="Rectangle 2"/>
+          <p:cNvSpPr>
+            <a:spLocks noGrp="1"/>
+          </p:cNvSpPr>
+          <p:nvPr>
+            <p:ph type="title"/>
+          </p:nvPr>
+        </p:nvSpPr>
+        <p:spPr/>
+        <p:txBody>
+          <a:bodyPr/>
+          <a:lstStyle/>
+          <a:p>
+            <a:pPr eaLnBrk="1" hangingPunct="1"/>
+            <a:r>
+              <a:rPr lang="en-US" smtClean="0"/>
+              <a:t>Test Effort</a:t>
+            </a:r>
+          </a:p>
+        </p:txBody>
+      </p:sp>
+      <p:pic>
+        <p:nvPicPr>
+          <p:cNvPr id="100356" name="Picture 4"/>
+          <p:cNvPicPr>
+            <a:picLocks noChangeAspect="1" noChangeArrowheads="1"/>
+          </p:cNvPicPr>
+          <p:nvPr/>
+        </p:nvPicPr>
+        <p:blipFill>
+          <a:blip r:embed="rId2"/>
+          <a:srcRect t="14008" r="38138" b="-1801"/>
+          <a:stretch>
+            <a:fillRect/>
+          </a:stretch>
+        </p:blipFill>
+        <p:spPr bwMode="auto">
+          <a:xfrm>
+            <a:off x="304800" y="974725"/>
+            <a:ext cx="8839200" cy="5730875"/>
+          </a:xfrm>
+          <a:prstGeom prst="rect">
+            <a:avLst/>
+          </a:prstGeom>
+          <a:noFill/>
+          <a:ln w="9525">
+            <a:noFill/>
+            <a:miter lim="800000"/>
+            <a:headEnd/>
+            <a:tailEnd/>
+          </a:ln>
+          <a:effectLst/>
+        </p:spPr>
+      </p:pic>
+    </p:spTree>
+  </p:cSld>
+  <p:clrMapOvr>
+    <a:masterClrMapping/>
+  </p:clrMapOvr>
+  <p:timing>
+    <p:tnLst>
+      <p:par>
+        <p:cTn id="1" dur="indefinite" restart="never" nodeType="tmRoot"/>
+      </p:par>
+    </p:tnLst>
+  </p:timing>
+</p:sld>
+</file>
+
+<file path=ppt/slides/slide65.xml><?xml version="1.0" encoding="utf-8"?>
 <p:sld xmlns:a="http://schemas.openxmlformats.org/drawingml/2006/main" xmlns:r="http://schemas.openxmlformats.org/officeDocument/2006/relationships" xmlns:p="http://schemas.openxmlformats.org/presentationml/2006/main">
   <p:cSld>
     <p:spTree>
@@ -20040,6 +20484,7 @@
           <a:bodyPr/>
           <a:lstStyle/>
           <a:p>
+            <a:pPr eaLnBrk="1" hangingPunct="1"/>
             <a:r>
               <a:rPr lang="en-US" smtClean="0"/>
               <a:t>Bug Finding and Fixing</a:t>
@@ -20062,6 +20507,7 @@
           <a:bodyPr/>
           <a:lstStyle/>
           <a:p>
+            <a:pPr eaLnBrk="1" hangingPunct="1"/>
             <a:endParaRPr lang="en-US" smtClean="0"/>
           </a:p>
         </p:txBody>
@@ -20099,7 +20545,7 @@
 </p:sld>
 </file>
 
-<file path=ppt/slides/slide62.xml><?xml version="1.0" encoding="utf-8"?>
+<file path=ppt/slides/slide66.xml><?xml version="1.0" encoding="utf-8"?>
 <p:sld xmlns:a="http://schemas.openxmlformats.org/drawingml/2006/main" xmlns:r="http://schemas.openxmlformats.org/officeDocument/2006/relationships" xmlns:p="http://schemas.openxmlformats.org/presentationml/2006/main">
   <p:cSld>
     <p:spTree>
@@ -20131,6 +20577,7 @@
           <a:bodyPr/>
           <a:lstStyle/>
           <a:p>
+            <a:pPr eaLnBrk="1" hangingPunct="1"/>
             <a:r>
               <a:rPr lang="en-US" smtClean="0"/>
               <a:t>Error Rate</a:t>
@@ -20153,6 +20600,7 @@
           <a:bodyPr/>
           <a:lstStyle/>
           <a:p>
+            <a:pPr eaLnBrk="1" hangingPunct="1"/>
             <a:endParaRPr lang="en-US" smtClean="0"/>
           </a:p>
         </p:txBody>
@@ -20190,7 +20638,7 @@
 </p:sld>
 </file>
 
-<file path=ppt/slides/slide63.xml><?xml version="1.0" encoding="utf-8"?>
+<file path=ppt/slides/slide67.xml><?xml version="1.0" encoding="utf-8"?>
 <p:sld xmlns:a="http://schemas.openxmlformats.org/drawingml/2006/main" xmlns:r="http://schemas.openxmlformats.org/officeDocument/2006/relationships" xmlns:p="http://schemas.openxmlformats.org/presentationml/2006/main">
   <p:cSld>
     <p:spTree>
@@ -20222,6 +20670,7 @@
           <a:bodyPr/>
           <a:lstStyle/>
           <a:p>
+            <a:pPr eaLnBrk="1" hangingPunct="1"/>
             <a:r>
               <a:rPr lang="en-US" smtClean="0"/>
               <a:t>DEMO TIME!</a:t>
@@ -20244,13 +20693,14 @@
           <a:bodyPr/>
           <a:lstStyle/>
           <a:p>
+            <a:pPr eaLnBrk="1" hangingPunct="1"/>
             <a:endParaRPr lang="en-US" smtClean="0"/>
           </a:p>
         </p:txBody>
       </p:sp>
       <p:pic>
         <p:nvPicPr>
-          <p:cNvPr id="95236" name="Picture 4"/>
+          <p:cNvPr id="95235" name="Picture 4"/>
           <p:cNvPicPr>
             <a:picLocks noChangeAspect="1" noChangeArrowheads="1"/>
           </p:cNvPicPr>
@@ -20278,7 +20728,6 @@
             <a:headEnd/>
             <a:tailEnd/>
           </a:ln>
-          <a:effectLst/>
         </p:spPr>
       </p:pic>
     </p:spTree>
@@ -20328,6 +20777,7 @@
           <a:bodyPr/>
           <a:lstStyle/>
           <a:p>
+            <a:pPr eaLnBrk="1" hangingPunct="1"/>
             <a:r>
               <a:rPr lang="en-US" smtClean="0"/>
               <a:t>Client Requirements</a:t>
@@ -20350,18 +20800,21 @@
           <a:bodyPr/>
           <a:lstStyle/>
           <a:p>
+            <a:pPr eaLnBrk="1" hangingPunct="1"/>
             <a:r>
               <a:rPr lang="en-US" smtClean="0"/>
               <a:t>The client is where the game is played</a:t>
             </a:r>
           </a:p>
           <a:p>
+            <a:pPr eaLnBrk="1" hangingPunct="1"/>
             <a:r>
               <a:rPr lang="en-US" smtClean="0"/>
               <a:t>Communicates with the server and allows networked multiplayer games</a:t>
             </a:r>
           </a:p>
           <a:p>
+            <a:pPr eaLnBrk="1" hangingPunct="1"/>
             <a:r>
               <a:rPr lang="en-US" smtClean="0"/>
               <a:t>The following slides detail the client’s requirements</a:t>
@@ -20416,6 +20869,7 @@
           <a:bodyPr/>
           <a:lstStyle/>
           <a:p>
+            <a:pPr eaLnBrk="1" hangingPunct="1"/>
             <a:r>
               <a:rPr lang="en-US" smtClean="0"/>
               <a:t>Sound Requirements</a:t>
@@ -20438,12 +20892,14 @@
           <a:bodyPr/>
           <a:lstStyle/>
           <a:p>
+            <a:pPr eaLnBrk="1" hangingPunct="1"/>
             <a:r>
               <a:rPr lang="en-US" smtClean="0"/>
               <a:t>Plays sound for particular actions that occur during game process</a:t>
             </a:r>
           </a:p>
           <a:p>
+            <a:pPr eaLnBrk="1" hangingPunct="1"/>
             <a:r>
               <a:rPr lang="en-US" smtClean="0"/>
               <a:t>Background music will play through out the game</a:t>
@@ -20498,6 +20954,7 @@
           <a:bodyPr/>
           <a:lstStyle/>
           <a:p>
+            <a:pPr eaLnBrk="1" hangingPunct="1"/>
             <a:r>
               <a:rPr lang="en-US" smtClean="0"/>
               <a:t>Input Requirements</a:t>
@@ -20520,40 +20977,42 @@
           <a:bodyPr/>
           <a:lstStyle/>
           <a:p>
+            <a:pPr eaLnBrk="1" hangingPunct="1"/>
             <a:r>
               <a:rPr lang="en-US" smtClean="0"/>
               <a:t>Client will expose an abstract input system capable of collecting input from different input devices</a:t>
             </a:r>
           </a:p>
           <a:p>
+            <a:pPr eaLnBrk="1" hangingPunct="1"/>
             <a:r>
               <a:rPr lang="en-US" smtClean="0"/>
               <a:t>These include</a:t>
             </a:r>
           </a:p>
           <a:p>
-            <a:pPr lvl="1"/>
+            <a:pPr lvl="1" eaLnBrk="1" hangingPunct="1"/>
             <a:r>
               <a:rPr lang="en-US" smtClean="0"/>
               <a:t>Mouse</a:t>
             </a:r>
           </a:p>
           <a:p>
-            <a:pPr lvl="1"/>
+            <a:pPr lvl="1" eaLnBrk="1" hangingPunct="1"/>
             <a:r>
               <a:rPr lang="en-US" smtClean="0"/>
               <a:t>Keyboard</a:t>
             </a:r>
           </a:p>
           <a:p>
-            <a:pPr lvl="1"/>
+            <a:pPr lvl="1" eaLnBrk="1" hangingPunct="1"/>
             <a:r>
               <a:rPr lang="en-US" smtClean="0"/>
               <a:t>XBox 360 Controller</a:t>
             </a:r>
           </a:p>
           <a:p>
-            <a:pPr lvl="1"/>
+            <a:pPr lvl="1" eaLnBrk="1" hangingPunct="1"/>
             <a:r>
               <a:rPr lang="en-US" smtClean="0"/>
               <a:t>And misc devices</a:t>

</xml_diff>